<commit_message>
PPT W/ updated sequence diagram
</commit_message>
<xml_diff>
--- a/Online Car Dealer System.pptx
+++ b/Online Car Dealer System.pptx
@@ -4,6 +4,9 @@
   <p:sldMasterIdLst>
     <p:sldMasterId id="2147483696" r:id="rId1"/>
   </p:sldMasterIdLst>
+  <p:notesMasterIdLst>
+    <p:notesMasterId r:id="rId19"/>
+  </p:notesMasterIdLst>
   <p:sldIdLst>
     <p:sldId id="256" r:id="rId2"/>
     <p:sldId id="257" r:id="rId3"/>
@@ -123,6 +126,440 @@
 </p:presentation>
 </file>
 
+<file path=ppt/notesMasters/notesMaster1.xml><?xml version="1.0" encoding="utf-8"?>
+<p:notesMaster xmlns:a="http://schemas.openxmlformats.org/drawingml/2006/main" xmlns:r="http://schemas.openxmlformats.org/officeDocument/2006/relationships" xmlns:p="http://schemas.openxmlformats.org/presentationml/2006/main">
+  <p:cSld>
+    <p:bg>
+      <p:bgRef idx="1001">
+        <a:schemeClr val="bg1"/>
+      </p:bgRef>
+    </p:bg>
+    <p:spTree>
+      <p:nvGrpSpPr>
+        <p:cNvPr id="1" name=""/>
+        <p:cNvGrpSpPr/>
+        <p:nvPr/>
+      </p:nvGrpSpPr>
+      <p:grpSpPr>
+        <a:xfrm>
+          <a:off x="0" y="0"/>
+          <a:ext cx="0" cy="0"/>
+          <a:chOff x="0" y="0"/>
+          <a:chExt cx="0" cy="0"/>
+        </a:xfrm>
+      </p:grpSpPr>
+      <p:sp>
+        <p:nvSpPr>
+          <p:cNvPr id="2" name="Header Placeholder 1"/>
+          <p:cNvSpPr>
+            <a:spLocks noGrp="1"/>
+          </p:cNvSpPr>
+          <p:nvPr>
+            <p:ph type="hdr" sz="quarter"/>
+          </p:nvPr>
+        </p:nvSpPr>
+        <p:spPr>
+          <a:xfrm>
+            <a:off x="0" y="0"/>
+            <a:ext cx="2971800" cy="457200"/>
+          </a:xfrm>
+          <a:prstGeom prst="rect">
+            <a:avLst/>
+          </a:prstGeom>
+        </p:spPr>
+        <p:txBody>
+          <a:bodyPr vert="horz" lIns="91440" tIns="45720" rIns="91440" bIns="45720" rtlCol="0"/>
+          <a:lstStyle>
+            <a:lvl1pPr algn="l">
+              <a:defRPr sz="1200"/>
+            </a:lvl1pPr>
+          </a:lstStyle>
+          <a:p>
+            <a:endParaRPr lang="en-US"/>
+          </a:p>
+        </p:txBody>
+      </p:sp>
+      <p:sp>
+        <p:nvSpPr>
+          <p:cNvPr id="3" name="Date Placeholder 2"/>
+          <p:cNvSpPr>
+            <a:spLocks noGrp="1"/>
+          </p:cNvSpPr>
+          <p:nvPr>
+            <p:ph type="dt" idx="1"/>
+          </p:nvPr>
+        </p:nvSpPr>
+        <p:spPr>
+          <a:xfrm>
+            <a:off x="3884613" y="0"/>
+            <a:ext cx="2971800" cy="457200"/>
+          </a:xfrm>
+          <a:prstGeom prst="rect">
+            <a:avLst/>
+          </a:prstGeom>
+        </p:spPr>
+        <p:txBody>
+          <a:bodyPr vert="horz" lIns="91440" tIns="45720" rIns="91440" bIns="45720" rtlCol="0"/>
+          <a:lstStyle>
+            <a:lvl1pPr algn="r">
+              <a:defRPr sz="1200"/>
+            </a:lvl1pPr>
+          </a:lstStyle>
+          <a:p>
+            <a:fld id="{893068A3-A88F-4198-BA78-261442291243}" type="datetimeFigureOut">
+              <a:rPr lang="en-US" smtClean="0"/>
+              <a:t>2/11/2014</a:t>
+            </a:fld>
+            <a:endParaRPr lang="en-US"/>
+          </a:p>
+        </p:txBody>
+      </p:sp>
+      <p:sp>
+        <p:nvSpPr>
+          <p:cNvPr id="4" name="Slide Image Placeholder 3"/>
+          <p:cNvSpPr>
+            <a:spLocks noGrp="1" noRot="1" noChangeAspect="1"/>
+          </p:cNvSpPr>
+          <p:nvPr>
+            <p:ph type="sldImg" idx="2"/>
+          </p:nvPr>
+        </p:nvSpPr>
+        <p:spPr>
+          <a:xfrm>
+            <a:off x="1143000" y="685800"/>
+            <a:ext cx="4572000" cy="3429000"/>
+          </a:xfrm>
+          <a:prstGeom prst="rect">
+            <a:avLst/>
+          </a:prstGeom>
+          <a:noFill/>
+          <a:ln w="12700">
+            <a:solidFill>
+              <a:prstClr val="black"/>
+            </a:solidFill>
+          </a:ln>
+        </p:spPr>
+        <p:txBody>
+          <a:bodyPr vert="horz" lIns="91440" tIns="45720" rIns="91440" bIns="45720" rtlCol="0" anchor="ctr"/>
+          <a:lstStyle/>
+          <a:p>
+            <a:endParaRPr lang="en-US"/>
+          </a:p>
+        </p:txBody>
+      </p:sp>
+      <p:sp>
+        <p:nvSpPr>
+          <p:cNvPr id="5" name="Notes Placeholder 4"/>
+          <p:cNvSpPr>
+            <a:spLocks noGrp="1"/>
+          </p:cNvSpPr>
+          <p:nvPr>
+            <p:ph type="body" sz="quarter" idx="3"/>
+          </p:nvPr>
+        </p:nvSpPr>
+        <p:spPr>
+          <a:xfrm>
+            <a:off x="685800" y="4343400"/>
+            <a:ext cx="5486400" cy="4114800"/>
+          </a:xfrm>
+          <a:prstGeom prst="rect">
+            <a:avLst/>
+          </a:prstGeom>
+        </p:spPr>
+        <p:txBody>
+          <a:bodyPr vert="horz" lIns="91440" tIns="45720" rIns="91440" bIns="45720" rtlCol="0"/>
+          <a:lstStyle/>
+          <a:p>
+            <a:pPr lvl="0"/>
+            <a:r>
+              <a:rPr lang="en-US" smtClean="0"/>
+              <a:t>Click to edit Master text styles</a:t>
+            </a:r>
+          </a:p>
+          <a:p>
+            <a:pPr lvl="1"/>
+            <a:r>
+              <a:rPr lang="en-US" smtClean="0"/>
+              <a:t>Second level</a:t>
+            </a:r>
+          </a:p>
+          <a:p>
+            <a:pPr lvl="2"/>
+            <a:r>
+              <a:rPr lang="en-US" smtClean="0"/>
+              <a:t>Third level</a:t>
+            </a:r>
+          </a:p>
+          <a:p>
+            <a:pPr lvl="3"/>
+            <a:r>
+              <a:rPr lang="en-US" smtClean="0"/>
+              <a:t>Fourth level</a:t>
+            </a:r>
+          </a:p>
+          <a:p>
+            <a:pPr lvl="4"/>
+            <a:r>
+              <a:rPr lang="en-US" smtClean="0"/>
+              <a:t>Fifth level</a:t>
+            </a:r>
+            <a:endParaRPr lang="en-US"/>
+          </a:p>
+        </p:txBody>
+      </p:sp>
+      <p:sp>
+        <p:nvSpPr>
+          <p:cNvPr id="6" name="Footer Placeholder 5"/>
+          <p:cNvSpPr>
+            <a:spLocks noGrp="1"/>
+          </p:cNvSpPr>
+          <p:nvPr>
+            <p:ph type="ftr" sz="quarter" idx="4"/>
+          </p:nvPr>
+        </p:nvSpPr>
+        <p:spPr>
+          <a:xfrm>
+            <a:off x="0" y="8685213"/>
+            <a:ext cx="2971800" cy="457200"/>
+          </a:xfrm>
+          <a:prstGeom prst="rect">
+            <a:avLst/>
+          </a:prstGeom>
+        </p:spPr>
+        <p:txBody>
+          <a:bodyPr vert="horz" lIns="91440" tIns="45720" rIns="91440" bIns="45720" rtlCol="0" anchor="b"/>
+          <a:lstStyle>
+            <a:lvl1pPr algn="l">
+              <a:defRPr sz="1200"/>
+            </a:lvl1pPr>
+          </a:lstStyle>
+          <a:p>
+            <a:endParaRPr lang="en-US"/>
+          </a:p>
+        </p:txBody>
+      </p:sp>
+      <p:sp>
+        <p:nvSpPr>
+          <p:cNvPr id="7" name="Slide Number Placeholder 6"/>
+          <p:cNvSpPr>
+            <a:spLocks noGrp="1"/>
+          </p:cNvSpPr>
+          <p:nvPr>
+            <p:ph type="sldNum" sz="quarter" idx="5"/>
+          </p:nvPr>
+        </p:nvSpPr>
+        <p:spPr>
+          <a:xfrm>
+            <a:off x="3884613" y="8685213"/>
+            <a:ext cx="2971800" cy="457200"/>
+          </a:xfrm>
+          <a:prstGeom prst="rect">
+            <a:avLst/>
+          </a:prstGeom>
+        </p:spPr>
+        <p:txBody>
+          <a:bodyPr vert="horz" lIns="91440" tIns="45720" rIns="91440" bIns="45720" rtlCol="0" anchor="b"/>
+          <a:lstStyle>
+            <a:lvl1pPr algn="r">
+              <a:defRPr sz="1200"/>
+            </a:lvl1pPr>
+          </a:lstStyle>
+          <a:p>
+            <a:fld id="{D5C44368-5094-43CA-9CC5-FF5F025E0E37}" type="slidenum">
+              <a:rPr lang="en-US" smtClean="0"/>
+              <a:t>‹#›</a:t>
+            </a:fld>
+            <a:endParaRPr lang="en-US"/>
+          </a:p>
+        </p:txBody>
+      </p:sp>
+    </p:spTree>
+    <p:extLst>
+      <p:ext uri="{BB962C8B-B14F-4D97-AF65-F5344CB8AC3E}">
+        <p14:creationId xmlns:p14="http://schemas.microsoft.com/office/powerpoint/2010/main" val="1497710176"/>
+      </p:ext>
+    </p:extLst>
+  </p:cSld>
+  <p:clrMap bg1="lt1" tx1="dk1" bg2="lt2" tx2="dk2" accent1="accent1" accent2="accent2" accent3="accent3" accent4="accent4" accent5="accent5" accent6="accent6" hlink="hlink" folHlink="folHlink"/>
+  <p:notesStyle>
+    <a:lvl1pPr marL="0" algn="l" defTabSz="914400" rtl="0" eaLnBrk="1" latinLnBrk="0" hangingPunct="1">
+      <a:defRPr sz="1200" kern="1200">
+        <a:solidFill>
+          <a:schemeClr val="tx1"/>
+        </a:solidFill>
+        <a:latin typeface="+mn-lt"/>
+        <a:ea typeface="+mn-ea"/>
+        <a:cs typeface="+mn-cs"/>
+      </a:defRPr>
+    </a:lvl1pPr>
+    <a:lvl2pPr marL="457200" algn="l" defTabSz="914400" rtl="0" eaLnBrk="1" latinLnBrk="0" hangingPunct="1">
+      <a:defRPr sz="1200" kern="1200">
+        <a:solidFill>
+          <a:schemeClr val="tx1"/>
+        </a:solidFill>
+        <a:latin typeface="+mn-lt"/>
+        <a:ea typeface="+mn-ea"/>
+        <a:cs typeface="+mn-cs"/>
+      </a:defRPr>
+    </a:lvl2pPr>
+    <a:lvl3pPr marL="914400" algn="l" defTabSz="914400" rtl="0" eaLnBrk="1" latinLnBrk="0" hangingPunct="1">
+      <a:defRPr sz="1200" kern="1200">
+        <a:solidFill>
+          <a:schemeClr val="tx1"/>
+        </a:solidFill>
+        <a:latin typeface="+mn-lt"/>
+        <a:ea typeface="+mn-ea"/>
+        <a:cs typeface="+mn-cs"/>
+      </a:defRPr>
+    </a:lvl3pPr>
+    <a:lvl4pPr marL="1371600" algn="l" defTabSz="914400" rtl="0" eaLnBrk="1" latinLnBrk="0" hangingPunct="1">
+      <a:defRPr sz="1200" kern="1200">
+        <a:solidFill>
+          <a:schemeClr val="tx1"/>
+        </a:solidFill>
+        <a:latin typeface="+mn-lt"/>
+        <a:ea typeface="+mn-ea"/>
+        <a:cs typeface="+mn-cs"/>
+      </a:defRPr>
+    </a:lvl4pPr>
+    <a:lvl5pPr marL="1828800" algn="l" defTabSz="914400" rtl="0" eaLnBrk="1" latinLnBrk="0" hangingPunct="1">
+      <a:defRPr sz="1200" kern="1200">
+        <a:solidFill>
+          <a:schemeClr val="tx1"/>
+        </a:solidFill>
+        <a:latin typeface="+mn-lt"/>
+        <a:ea typeface="+mn-ea"/>
+        <a:cs typeface="+mn-cs"/>
+      </a:defRPr>
+    </a:lvl5pPr>
+    <a:lvl6pPr marL="2286000" algn="l" defTabSz="914400" rtl="0" eaLnBrk="1" latinLnBrk="0" hangingPunct="1">
+      <a:defRPr sz="1200" kern="1200">
+        <a:solidFill>
+          <a:schemeClr val="tx1"/>
+        </a:solidFill>
+        <a:latin typeface="+mn-lt"/>
+        <a:ea typeface="+mn-ea"/>
+        <a:cs typeface="+mn-cs"/>
+      </a:defRPr>
+    </a:lvl6pPr>
+    <a:lvl7pPr marL="2743200" algn="l" defTabSz="914400" rtl="0" eaLnBrk="1" latinLnBrk="0" hangingPunct="1">
+      <a:defRPr sz="1200" kern="1200">
+        <a:solidFill>
+          <a:schemeClr val="tx1"/>
+        </a:solidFill>
+        <a:latin typeface="+mn-lt"/>
+        <a:ea typeface="+mn-ea"/>
+        <a:cs typeface="+mn-cs"/>
+      </a:defRPr>
+    </a:lvl7pPr>
+    <a:lvl8pPr marL="3200400" algn="l" defTabSz="914400" rtl="0" eaLnBrk="1" latinLnBrk="0" hangingPunct="1">
+      <a:defRPr sz="1200" kern="1200">
+        <a:solidFill>
+          <a:schemeClr val="tx1"/>
+        </a:solidFill>
+        <a:latin typeface="+mn-lt"/>
+        <a:ea typeface="+mn-ea"/>
+        <a:cs typeface="+mn-cs"/>
+      </a:defRPr>
+    </a:lvl8pPr>
+    <a:lvl9pPr marL="3657600" algn="l" defTabSz="914400" rtl="0" eaLnBrk="1" latinLnBrk="0" hangingPunct="1">
+      <a:defRPr sz="1200" kern="1200">
+        <a:solidFill>
+          <a:schemeClr val="tx1"/>
+        </a:solidFill>
+        <a:latin typeface="+mn-lt"/>
+        <a:ea typeface="+mn-ea"/>
+        <a:cs typeface="+mn-cs"/>
+      </a:defRPr>
+    </a:lvl9pPr>
+  </p:notesStyle>
+</p:notesMaster>
+</file>
+
+<file path=ppt/notesSlides/notesSlide1.xml><?xml version="1.0" encoding="utf-8"?>
+<p:notes xmlns:a="http://schemas.openxmlformats.org/drawingml/2006/main" xmlns:r="http://schemas.openxmlformats.org/officeDocument/2006/relationships" xmlns:p="http://schemas.openxmlformats.org/presentationml/2006/main">
+  <p:cSld>
+    <p:spTree>
+      <p:nvGrpSpPr>
+        <p:cNvPr id="1" name=""/>
+        <p:cNvGrpSpPr/>
+        <p:nvPr/>
+      </p:nvGrpSpPr>
+      <p:grpSpPr>
+        <a:xfrm>
+          <a:off x="0" y="0"/>
+          <a:ext cx="0" cy="0"/>
+          <a:chOff x="0" y="0"/>
+          <a:chExt cx="0" cy="0"/>
+        </a:xfrm>
+      </p:grpSpPr>
+      <p:sp>
+        <p:nvSpPr>
+          <p:cNvPr id="2" name="Slide Image Placeholder 1"/>
+          <p:cNvSpPr>
+            <a:spLocks noGrp="1" noRot="1" noChangeAspect="1"/>
+          </p:cNvSpPr>
+          <p:nvPr>
+            <p:ph type="sldImg"/>
+          </p:nvPr>
+        </p:nvSpPr>
+        <p:spPr/>
+      </p:sp>
+      <p:sp>
+        <p:nvSpPr>
+          <p:cNvPr id="3" name="Notes Placeholder 2"/>
+          <p:cNvSpPr>
+            <a:spLocks noGrp="1"/>
+          </p:cNvSpPr>
+          <p:nvPr>
+            <p:ph type="body" idx="1"/>
+          </p:nvPr>
+        </p:nvSpPr>
+        <p:spPr/>
+        <p:txBody>
+          <a:bodyPr/>
+          <a:lstStyle/>
+          <a:p>
+            <a:endParaRPr lang="en-US" dirty="0"/>
+          </a:p>
+        </p:txBody>
+      </p:sp>
+      <p:sp>
+        <p:nvSpPr>
+          <p:cNvPr id="4" name="Slide Number Placeholder 3"/>
+          <p:cNvSpPr>
+            <a:spLocks noGrp="1"/>
+          </p:cNvSpPr>
+          <p:nvPr>
+            <p:ph type="sldNum" sz="quarter" idx="10"/>
+          </p:nvPr>
+        </p:nvSpPr>
+        <p:spPr/>
+        <p:txBody>
+          <a:bodyPr/>
+          <a:lstStyle/>
+          <a:p>
+            <a:fld id="{D5C44368-5094-43CA-9CC5-FF5F025E0E37}" type="slidenum">
+              <a:rPr lang="en-US" smtClean="0"/>
+              <a:t>7</a:t>
+            </a:fld>
+            <a:endParaRPr lang="en-US"/>
+          </a:p>
+        </p:txBody>
+      </p:sp>
+    </p:spTree>
+    <p:extLst>
+      <p:ext uri="{BB962C8B-B14F-4D97-AF65-F5344CB8AC3E}">
+        <p14:creationId xmlns:p14="http://schemas.microsoft.com/office/powerpoint/2010/main" val="180946886"/>
+      </p:ext>
+    </p:extLst>
+  </p:cSld>
+  <p:clrMapOvr>
+    <a:masterClrMapping/>
+  </p:clrMapOvr>
+</p:notes>
+</file>
+
 <file path=ppt/slideLayouts/slideLayout1.xml><?xml version="1.0" encoding="utf-8"?>
 <p:sldLayout xmlns:a="http://schemas.openxmlformats.org/drawingml/2006/main" xmlns:r="http://schemas.openxmlformats.org/officeDocument/2006/relationships" xmlns:p="http://schemas.openxmlformats.org/presentationml/2006/main" type="title" preserve="1">
   <p:cSld name="Title Slide">
@@ -364,6 +801,9 @@
   <p:clrMapOvr>
     <a:masterClrMapping/>
   </p:clrMapOvr>
+  <p:transition spd="slow">
+    <p:push dir="u"/>
+  </p:transition>
 </p:sldLayout>
 </file>
 
@@ -536,6 +976,9 @@
   <p:clrMapOvr>
     <a:masterClrMapping/>
   </p:clrMapOvr>
+  <p:transition spd="slow">
+    <p:push dir="u"/>
+  </p:transition>
 </p:sldLayout>
 </file>
 
@@ -718,6 +1161,9 @@
   <p:clrMapOvr>
     <a:masterClrMapping/>
   </p:clrMapOvr>
+  <p:transition spd="slow">
+    <p:push dir="u"/>
+  </p:transition>
 </p:sldLayout>
 </file>
 
@@ -890,6 +1336,9 @@
   <p:clrMapOvr>
     <a:masterClrMapping/>
   </p:clrMapOvr>
+  <p:transition spd="slow">
+    <p:push dir="u"/>
+  </p:transition>
 </p:sldLayout>
 </file>
 
@@ -1138,6 +1587,9 @@
   <p:clrMapOvr>
     <a:masterClrMapping/>
   </p:clrMapOvr>
+  <p:transition spd="slow">
+    <p:push dir="u"/>
+  </p:transition>
 </p:sldLayout>
 </file>
 
@@ -1428,6 +1880,9 @@
   <p:clrMapOvr>
     <a:masterClrMapping/>
   </p:clrMapOvr>
+  <p:transition spd="slow">
+    <p:push dir="u"/>
+  </p:transition>
 </p:sldLayout>
 </file>
 
@@ -1852,6 +2307,9 @@
   <p:clrMapOvr>
     <a:masterClrMapping/>
   </p:clrMapOvr>
+  <p:transition spd="slow">
+    <p:push dir="u"/>
+  </p:transition>
 </p:sldLayout>
 </file>
 
@@ -1972,6 +2430,9 @@
   <p:clrMapOvr>
     <a:masterClrMapping/>
   </p:clrMapOvr>
+  <p:transition spd="slow">
+    <p:push dir="u"/>
+  </p:transition>
 </p:sldLayout>
 </file>
 
@@ -2069,6 +2530,9 @@
   <p:clrMapOvr>
     <a:masterClrMapping/>
   </p:clrMapOvr>
+  <p:transition spd="slow">
+    <p:push dir="u"/>
+  </p:transition>
 </p:sldLayout>
 </file>
 
@@ -2348,6 +2812,9 @@
   <p:clrMapOvr>
     <a:masterClrMapping/>
   </p:clrMapOvr>
+  <p:transition spd="slow">
+    <p:push dir="u"/>
+  </p:transition>
 </p:sldLayout>
 </file>
 
@@ -2603,6 +3070,9 @@
   <p:clrMapOvr>
     <a:masterClrMapping/>
   </p:clrMapOvr>
+  <p:transition spd="slow">
+    <p:push dir="u"/>
+  </p:transition>
 </p:sldLayout>
 </file>
 
@@ -2865,6 +3335,9 @@
     <p:sldLayoutId id="2147483706" r:id="rId10"/>
     <p:sldLayoutId id="2147483707" r:id="rId11"/>
   </p:sldLayoutIdLst>
+  <p:transition spd="slow">
+    <p:push dir="u"/>
+  </p:transition>
   <p:txStyles>
     <p:titleStyle>
       <a:lvl1pPr algn="ctr" defTabSz="914400" rtl="0" eaLnBrk="1" latinLnBrk="0" hangingPunct="1">
@@ -3236,6 +3709,25 @@
   <p:clrMapOvr>
     <a:masterClrMapping/>
   </p:clrMapOvr>
+  <mc:AlternateContent xmlns:mc="http://schemas.openxmlformats.org/markup-compatibility/2006">
+    <mc:Choice xmlns:p14="http://schemas.microsoft.com/office/powerpoint/2010/main" Requires="p14">
+      <p:transition spd="slow" p14:dur="1500">
+        <p:split orient="vert"/>
+      </p:transition>
+    </mc:Choice>
+    <mc:Fallback>
+      <p:transition spd="slow">
+        <p:split orient="vert"/>
+      </p:transition>
+    </mc:Fallback>
+  </mc:AlternateContent>
+  <p:timing>
+    <p:tnLst>
+      <p:par>
+        <p:cTn id="1" dur="indefinite" restart="never" nodeType="tmRoot"/>
+      </p:par>
+    </p:tnLst>
+  </p:timing>
 </p:sld>
 </file>
 
@@ -3312,29 +3804,19 @@
               <a:rPr lang="en-US" dirty="0" smtClean="0"/>
               <a:t>Entry Condition: </a:t>
             </a:r>
-            <a:endParaRPr lang="en-US" dirty="0" smtClean="0"/>
           </a:p>
           <a:p>
             <a:pPr lvl="1"/>
             <a:r>
               <a:rPr lang="en-US" dirty="0" smtClean="0"/>
-              <a:t>Logged </a:t>
-            </a:r>
-            <a:r>
-              <a:rPr lang="en-US" dirty="0" smtClean="0"/>
-              <a:t>in as admin </a:t>
-            </a:r>
-            <a:endParaRPr lang="en-US" dirty="0" smtClean="0"/>
+              <a:t>Logged in as admin </a:t>
+            </a:r>
           </a:p>
           <a:p>
             <a:pPr lvl="1"/>
             <a:r>
               <a:rPr lang="en-US" dirty="0" smtClean="0"/>
-              <a:t>On </a:t>
-            </a:r>
-            <a:r>
-              <a:rPr lang="en-US" dirty="0" smtClean="0"/>
-              <a:t>the page with the “Edit Cars” function</a:t>
+              <a:t>On the page with the “Edit Cars” function</a:t>
             </a:r>
           </a:p>
           <a:p>
@@ -3367,21 +3849,8 @@
           <a:p>
             <a:r>
               <a:rPr lang="en-US" dirty="0" smtClean="0"/>
-              <a:t>Exit Condition: Admin </a:t>
-            </a:r>
-            <a:r>
-              <a:rPr lang="en-US" dirty="0" smtClean="0"/>
-              <a:t>updated </a:t>
-            </a:r>
-            <a:r>
-              <a:rPr lang="en-US" dirty="0" smtClean="0"/>
-              <a:t>a car </a:t>
-            </a:r>
-            <a:r>
-              <a:rPr lang="en-US" dirty="0" smtClean="0"/>
-              <a:t>information.</a:t>
-            </a:r>
-            <a:endParaRPr lang="en-US" dirty="0" smtClean="0"/>
+              <a:t>Exit Condition: Admin updated a car information.</a:t>
+            </a:r>
           </a:p>
           <a:p>
             <a:r>
@@ -3421,6 +3890,16 @@
   <p:clrMapOvr>
     <a:masterClrMapping/>
   </p:clrMapOvr>
+  <p:transition spd="slow">
+    <p:push dir="u"/>
+  </p:transition>
+  <p:timing>
+    <p:tnLst>
+      <p:par>
+        <p:cTn id="1" dur="indefinite" restart="never" nodeType="tmRoot"/>
+      </p:par>
+    </p:tnLst>
+  </p:timing>
 </p:sld>
 </file>
 
@@ -3488,8 +3967,8 @@
         </p:blipFill>
         <p:spPr>
           <a:xfrm>
-            <a:off x="-381000" y="1219200"/>
-            <a:ext cx="9753600" cy="6231467"/>
+            <a:off x="-457200" y="1219200"/>
+            <a:ext cx="9829800" cy="6231467"/>
           </a:xfrm>
         </p:spPr>
       </p:pic>
@@ -3503,6 +3982,16 @@
   <p:clrMapOvr>
     <a:masterClrMapping/>
   </p:clrMapOvr>
+  <p:transition spd="slow">
+    <p:push dir="u"/>
+  </p:transition>
+  <p:timing>
+    <p:tnLst>
+      <p:par>
+        <p:cTn id="1" dur="indefinite" restart="never" nodeType="tmRoot"/>
+      </p:par>
+    </p:tnLst>
+  </p:timing>
 </p:sld>
 </file>
 
@@ -3564,8 +4053,8 @@
         </p:blipFill>
         <p:spPr>
           <a:xfrm>
-            <a:off x="-76200" y="1788840"/>
-            <a:ext cx="9677399" cy="4611960"/>
+            <a:off x="-76200" y="1371600"/>
+            <a:ext cx="9677399" cy="5105400"/>
           </a:xfrm>
         </p:spPr>
       </p:pic>
@@ -3579,6 +4068,16 @@
   <p:clrMapOvr>
     <a:masterClrMapping/>
   </p:clrMapOvr>
+  <p:transition spd="slow">
+    <p:push dir="u"/>
+  </p:transition>
+  <p:timing>
+    <p:tnLst>
+      <p:par>
+        <p:cTn id="1" dur="indefinite" restart="never" nodeType="tmRoot"/>
+      </p:par>
+    </p:tnLst>
+  </p:timing>
 </p:sld>
 </file>
 
@@ -3665,6 +4164,16 @@
   <p:clrMapOvr>
     <a:masterClrMapping/>
   </p:clrMapOvr>
+  <p:transition spd="slow">
+    <p:push dir="u"/>
+  </p:transition>
+  <p:timing>
+    <p:tnLst>
+      <p:par>
+        <p:cTn id="1" dur="indefinite" restart="never" nodeType="tmRoot"/>
+      </p:par>
+    </p:tnLst>
+  </p:timing>
 </p:sld>
 </file>
 
@@ -3792,6 +4301,9 @@
   <p:clrMapOvr>
     <a:masterClrMapping/>
   </p:clrMapOvr>
+  <p:transition spd="slow">
+    <p:push dir="u"/>
+  </p:transition>
   <p:timing>
     <p:tnLst>
       <p:par>
@@ -3844,7 +4356,7 @@
       </p:sp>
       <p:pic>
         <p:nvPicPr>
-          <p:cNvPr id="4" name="Content Placeholder 3" descr="SeqDiag1.PNG"/>
+          <p:cNvPr id="5" name="Content Placeholder 4"/>
           <p:cNvPicPr>
             <a:picLocks noGrp="1" noChangeAspect="1"/>
           </p:cNvPicPr>
@@ -3853,15 +4365,21 @@
           </p:nvPr>
         </p:nvPicPr>
         <p:blipFill>
-          <a:blip r:embed="rId2"/>
+          <a:blip r:embed="rId2">
+            <a:extLst>
+              <a:ext uri="{28A0092B-C50C-407E-A947-70E740481C1C}">
+                <a14:useLocalDpi xmlns:a14="http://schemas.microsoft.com/office/drawing/2010/main" val="0"/>
+              </a:ext>
+            </a:extLst>
+          </a:blip>
           <a:stretch>
             <a:fillRect/>
           </a:stretch>
         </p:blipFill>
         <p:spPr>
           <a:xfrm>
-            <a:off x="304800" y="1143000"/>
-            <a:ext cx="8458200" cy="5862119"/>
+            <a:off x="381000" y="1295400"/>
+            <a:ext cx="8382000" cy="5334000"/>
           </a:xfrm>
         </p:spPr>
       </p:pic>
@@ -3875,6 +4393,9 @@
   <p:clrMapOvr>
     <a:masterClrMapping/>
   </p:clrMapOvr>
+  <p:transition spd="slow">
+    <p:push dir="u"/>
+  </p:transition>
   <p:timing>
     <p:tnLst>
       <p:par>
@@ -3927,7 +4448,7 @@
       </p:sp>
       <p:pic>
         <p:nvPicPr>
-          <p:cNvPr id="4" name="Content Placeholder 3" descr="SeqDiag2.PNG"/>
+          <p:cNvPr id="5" name="Content Placeholder 4"/>
           <p:cNvPicPr>
             <a:picLocks noGrp="1" noChangeAspect="1"/>
           </p:cNvPicPr>
@@ -3936,15 +4457,21 @@
           </p:nvPr>
         </p:nvPicPr>
         <p:blipFill>
-          <a:blip r:embed="rId2"/>
+          <a:blip r:embed="rId2">
+            <a:extLst>
+              <a:ext uri="{28A0092B-C50C-407E-A947-70E740481C1C}">
+                <a14:useLocalDpi xmlns:a14="http://schemas.microsoft.com/office/drawing/2010/main" val="0"/>
+              </a:ext>
+            </a:extLst>
+          </a:blip>
           <a:stretch>
             <a:fillRect/>
           </a:stretch>
         </p:blipFill>
         <p:spPr>
           <a:xfrm>
-            <a:off x="304800" y="1142999"/>
-            <a:ext cx="8077200" cy="5802085"/>
+            <a:off x="304800" y="1295400"/>
+            <a:ext cx="8534400" cy="5334000"/>
           </a:xfrm>
         </p:spPr>
       </p:pic>
@@ -3958,6 +4485,9 @@
   <p:clrMapOvr>
     <a:masterClrMapping/>
   </p:clrMapOvr>
+  <p:transition spd="slow">
+    <p:push dir="u"/>
+  </p:transition>
   <p:timing>
     <p:tnLst>
       <p:par>
@@ -4077,6 +4607,9 @@
   <p:clrMapOvr>
     <a:masterClrMapping/>
   </p:clrMapOvr>
+  <p:transition spd="slow">
+    <p:push dir="u"/>
+  </p:transition>
   <p:timing>
     <p:tnLst>
       <p:par>
@@ -4224,6 +4757,16 @@
   <p:clrMapOvr>
     <a:masterClrMapping/>
   </p:clrMapOvr>
+  <p:transition spd="slow">
+    <p:push dir="u"/>
+  </p:transition>
+  <p:timing>
+    <p:tnLst>
+      <p:par>
+        <p:cTn id="1" dur="indefinite" restart="never" nodeType="tmRoot"/>
+      </p:par>
+    </p:tnLst>
+  </p:timing>
 </p:sld>
 </file>
 
@@ -4495,6 +5038,16 @@
   <p:clrMapOvr>
     <a:masterClrMapping/>
   </p:clrMapOvr>
+  <p:transition spd="slow">
+    <p:push dir="u"/>
+  </p:transition>
+  <p:timing>
+    <p:tnLst>
+      <p:par>
+        <p:cTn id="1" dur="indefinite" restart="never" nodeType="tmRoot"/>
+      </p:par>
+    </p:tnLst>
+  </p:timing>
 </p:sld>
 </file>
 
@@ -4798,6 +5351,16 @@
   <p:clrMapOvr>
     <a:masterClrMapping/>
   </p:clrMapOvr>
+  <p:transition spd="slow">
+    <p:push dir="u"/>
+  </p:transition>
+  <p:timing>
+    <p:tnLst>
+      <p:par>
+        <p:cTn id="1" dur="indefinite" restart="never" nodeType="tmRoot"/>
+      </p:par>
+    </p:tnLst>
+  </p:timing>
 </p:sld>
 </file>
 
@@ -5110,6 +5673,16 @@
   <p:clrMapOvr>
     <a:masterClrMapping/>
   </p:clrMapOvr>
+  <p:transition spd="slow">
+    <p:push dir="u"/>
+  </p:transition>
+  <p:timing>
+    <p:tnLst>
+      <p:par>
+        <p:cTn id="1" dur="indefinite" restart="never" nodeType="tmRoot"/>
+      </p:par>
+    </p:tnLst>
+  </p:timing>
 </p:sld>
 </file>
 
@@ -5278,6 +5851,16 @@
   <p:clrMapOvr>
     <a:masterClrMapping/>
   </p:clrMapOvr>
+  <p:transition spd="slow">
+    <p:push dir="u"/>
+  </p:transition>
+  <p:timing>
+    <p:tnLst>
+      <p:par>
+        <p:cTn id="1" dur="indefinite" restart="never" nodeType="tmRoot"/>
+      </p:par>
+    </p:tnLst>
+  </p:timing>
 </p:sld>
 </file>
 
@@ -5364,79 +5947,67 @@
             <a:pPr lvl="1"/>
             <a:r>
               <a:rPr lang="en-US" dirty="0" smtClean="0"/>
-              <a:t>User/Admin must be at the login web page of </a:t>
-            </a:r>
-            <a:r>
-              <a:rPr lang="en-US" dirty="0" smtClean="0"/>
+              <a:t>User/Admin must be at the login web page of Sunshine Online Car Dealer System.</a:t>
+            </a:r>
+          </a:p>
+          <a:p>
+            <a:pPr lvl="1"/>
+            <a:r>
+              <a:rPr lang="en-US" dirty="0" smtClean="0"/>
+              <a:t>User/Admin has a valid username and password.</a:t>
+            </a:r>
+          </a:p>
+          <a:p>
+            <a:r>
+              <a:rPr lang="en-US" dirty="0" smtClean="0"/>
+              <a:t>Event Flow: </a:t>
+            </a:r>
+          </a:p>
+          <a:p>
+            <a:pPr lvl="1"/>
+            <a:r>
+              <a:rPr lang="en-US" dirty="0" smtClean="0"/>
+              <a:t>User/Admin input username and password into the Login web page.</a:t>
+            </a:r>
+          </a:p>
+          <a:p>
+            <a:pPr lvl="1"/>
+            <a:r>
+              <a:rPr lang="en-US" dirty="0" smtClean="0"/>
+              <a:t>Sunshine Online Car Dealer System </a:t>
+            </a:r>
+            <a:r>
+              <a:rPr lang="en-US" dirty="0"/>
+              <a:t>match username/password entered with list of stored </a:t>
+            </a:r>
+            <a:r>
+              <a:rPr lang="en-US" dirty="0" smtClean="0"/>
+              <a:t>users/admin.</a:t>
+            </a:r>
+          </a:p>
+          <a:p>
+            <a:pPr lvl="1"/>
+            <a:r>
+              <a:rPr lang="en-US" dirty="0"/>
               <a:t>Sunshine </a:t>
             </a:r>
             <a:r>
               <a:rPr lang="en-US" dirty="0" smtClean="0"/>
-              <a:t>Online Car Dealer System.</a:t>
+              <a:t>Online Car Dealer System logs User/Admin</a:t>
+            </a:r>
+            <a:r>
+              <a:rPr lang="en-US" dirty="0"/>
+              <a:t> into the system</a:t>
+            </a:r>
+            <a:r>
+              <a:rPr lang="en-US" dirty="0" smtClean="0"/>
+              <a:t>.</a:t>
             </a:r>
           </a:p>
           <a:p>
             <a:pPr lvl="1"/>
             <a:r>
               <a:rPr lang="en-US" dirty="0" smtClean="0"/>
-              <a:t>User/Admin has a valid username and password.</a:t>
-            </a:r>
-          </a:p>
-          <a:p>
-            <a:r>
-              <a:rPr lang="en-US" dirty="0" smtClean="0"/>
-              <a:t>Event Flow: </a:t>
-            </a:r>
-          </a:p>
-          <a:p>
-            <a:pPr lvl="1"/>
-            <a:r>
-              <a:rPr lang="en-US" dirty="0" smtClean="0"/>
-              <a:t>User/Admin input username and password into the Login web page.</a:t>
-            </a:r>
-          </a:p>
-          <a:p>
-            <a:pPr lvl="1"/>
-            <a:r>
-              <a:rPr lang="en-US" dirty="0" smtClean="0"/>
-              <a:t>Sunshine </a:t>
-            </a:r>
-            <a:r>
-              <a:rPr lang="en-US" dirty="0" smtClean="0"/>
-              <a:t>Online Car Dealer System </a:t>
-            </a:r>
-            <a:r>
-              <a:rPr lang="en-US" dirty="0"/>
-              <a:t>match username/password entered with list of stored </a:t>
-            </a:r>
-            <a:r>
-              <a:rPr lang="en-US" dirty="0" smtClean="0"/>
-              <a:t>users/admin.</a:t>
-            </a:r>
-          </a:p>
-          <a:p>
-            <a:pPr lvl="1"/>
-            <a:r>
-              <a:rPr lang="en-US" dirty="0"/>
-              <a:t>Sunshine </a:t>
-            </a:r>
-            <a:r>
-              <a:rPr lang="en-US" dirty="0" smtClean="0"/>
-              <a:t>Online Car Dealer System logs User/Admin</a:t>
-            </a:r>
-            <a:r>
-              <a:rPr lang="en-US" dirty="0"/>
-              <a:t> into the system</a:t>
-            </a:r>
-            <a:r>
-              <a:rPr lang="en-US" dirty="0" smtClean="0"/>
-              <a:t>.</a:t>
-            </a:r>
-          </a:p>
-          <a:p>
-            <a:pPr lvl="1"/>
-            <a:r>
-              <a:rPr lang="en-US" dirty="0" smtClean="0"/>
               <a:t>User/Admin </a:t>
             </a:r>
             <a:r>
@@ -5476,11 +6047,7 @@
             </a:r>
             <a:r>
               <a:rPr lang="en-US" dirty="0"/>
-              <a:t> is logged into </a:t>
-            </a:r>
-            <a:r>
-              <a:rPr lang="en-US" dirty="0"/>
-              <a:t>Sunshine </a:t>
+              <a:t> is logged into Sunshine </a:t>
             </a:r>
             <a:r>
               <a:rPr lang="en-US" dirty="0" smtClean="0"/>
@@ -5532,6 +6099,16 @@
   <p:clrMapOvr>
     <a:masterClrMapping/>
   </p:clrMapOvr>
+  <p:transition spd="slow">
+    <p:push dir="u"/>
+  </p:transition>
+  <p:timing>
+    <p:tnLst>
+      <p:par>
+        <p:cTn id="1" dur="indefinite" restart="never" nodeType="tmRoot"/>
+      </p:par>
+    </p:tnLst>
+  </p:timing>
 </p:sld>
 </file>
 
@@ -5618,19 +6195,66 @@
             <a:pPr lvl="1"/>
             <a:r>
               <a:rPr lang="en-US" dirty="0"/>
-              <a:t>User must be at a web page of </a:t>
-            </a:r>
+              <a:t>User must be at a web page of Sunshine </a:t>
+            </a:r>
+            <a:r>
+              <a:rPr lang="en-US" dirty="0" smtClean="0"/>
+              <a:t>Online Car Dealer System </a:t>
+            </a:r>
+            <a:r>
+              <a:rPr lang="en-US" dirty="0"/>
+              <a:t>displaying a list of cars</a:t>
+            </a:r>
+            <a:r>
+              <a:rPr lang="en-US" dirty="0" smtClean="0"/>
+              <a:t>.</a:t>
+            </a:r>
+          </a:p>
+          <a:p>
+            <a:pPr lvl="1"/>
+            <a:r>
+              <a:rPr lang="en-US" dirty="0"/>
+              <a:t>User must be logged in</a:t>
+            </a:r>
+            <a:r>
+              <a:rPr lang="en-US" dirty="0" smtClean="0"/>
+              <a:t>.</a:t>
+            </a:r>
+          </a:p>
+          <a:p>
+            <a:r>
+              <a:rPr lang="en-US" dirty="0" smtClean="0"/>
+              <a:t>Event Flow:</a:t>
+            </a:r>
+          </a:p>
+          <a:p>
+            <a:pPr lvl="1"/>
+            <a:r>
+              <a:rPr lang="en-US" dirty="0" smtClean="0"/>
+              <a:t>User </a:t>
+            </a:r>
+            <a:r>
+              <a:rPr lang="en-US" dirty="0"/>
+              <a:t>selects car to be purchased</a:t>
+            </a:r>
+            <a:r>
+              <a:rPr lang="en-US" dirty="0" smtClean="0"/>
+              <a:t>.</a:t>
+            </a:r>
+          </a:p>
+          <a:p>
+            <a:pPr lvl="1"/>
             <a:r>
               <a:rPr lang="en-US" dirty="0"/>
               <a:t>Sunshine </a:t>
             </a:r>
             <a:r>
               <a:rPr lang="en-US" dirty="0" smtClean="0"/>
-              <a:t>Online Car Dealer System </a:t>
-            </a:r>
-            <a:r>
-              <a:rPr lang="en-US" dirty="0"/>
-              <a:t>displaying a list of cars</a:t>
+              <a:t>Online Car Dealer System displays </a:t>
+            </a:r>
+            <a:r>
+              <a:rPr lang="en-US" dirty="0"/>
+              <a:t>the car details including price</a:t>
             </a:r>
             <a:r>
               <a:rPr lang="en-US" dirty="0" smtClean="0"/>
@@ -5641,7 +6265,7 @@
             <a:pPr lvl="1"/>
             <a:r>
               <a:rPr lang="en-US" dirty="0"/>
-              <a:t>User must be logged in</a:t>
+              <a:t>User selects Purchase option</a:t>
             </a:r>
             <a:r>
               <a:rPr lang="en-US" dirty="0" smtClean="0"/>
@@ -5649,67 +6273,15 @@
             </a:r>
           </a:p>
           <a:p>
-            <a:r>
-              <a:rPr lang="en-US" dirty="0" smtClean="0"/>
-              <a:t>Event Flow:</a:t>
-            </a:r>
-          </a:p>
-          <a:p>
             <a:pPr lvl="1"/>
             <a:r>
-              <a:rPr lang="en-US" dirty="0" smtClean="0"/>
+              <a:rPr lang="en-US" dirty="0"/>
               <a:t>User </a:t>
             </a:r>
             <a:r>
-              <a:rPr lang="en-US" dirty="0"/>
-              <a:t>selects car to be purchased</a:t>
-            </a:r>
-            <a:r>
-              <a:rPr lang="en-US" dirty="0" smtClean="0"/>
-              <a:t>.</a:t>
-            </a:r>
-          </a:p>
-          <a:p>
-            <a:pPr lvl="1"/>
-            <a:r>
-              <a:rPr lang="en-US" dirty="0"/>
-              <a:t>Sunshine </a:t>
-            </a:r>
-            <a:r>
-              <a:rPr lang="en-US" dirty="0" smtClean="0"/>
-              <a:t>Online Car Dealer System displays </a:t>
-            </a:r>
-            <a:r>
-              <a:rPr lang="en-US" dirty="0"/>
-              <a:t>the car details including price</a:t>
-            </a:r>
-            <a:r>
-              <a:rPr lang="en-US" dirty="0" smtClean="0"/>
-              <a:t>.</a:t>
-            </a:r>
-          </a:p>
-          <a:p>
-            <a:pPr lvl="1"/>
-            <a:r>
-              <a:rPr lang="en-US" dirty="0"/>
-              <a:t>User selects Purchase option</a:t>
-            </a:r>
-            <a:r>
-              <a:rPr lang="en-US" dirty="0" smtClean="0"/>
-              <a:t>.</a:t>
-            </a:r>
-          </a:p>
-          <a:p>
-            <a:pPr lvl="1"/>
-            <a:r>
-              <a:rPr lang="en-US" dirty="0"/>
-              <a:t>User </a:t>
-            </a:r>
-            <a:r>
               <a:rPr lang="en-US" dirty="0" smtClean="0"/>
               <a:t>enters the credit car information to purchase the selected car.</a:t>
             </a:r>
-            <a:endParaRPr lang="en-US" dirty="0" smtClean="0"/>
           </a:p>
           <a:p>
             <a:pPr lvl="1"/>
@@ -5804,6 +6376,16 @@
   <p:clrMapOvr>
     <a:masterClrMapping/>
   </p:clrMapOvr>
+  <p:transition spd="slow">
+    <p:push dir="u"/>
+  </p:transition>
+  <p:timing>
+    <p:tnLst>
+      <p:par>
+        <p:cTn id="1" dur="indefinite" restart="never" nodeType="tmRoot"/>
+      </p:par>
+    </p:tnLst>
+  </p:timing>
 </p:sld>
 </file>
 
@@ -5880,17 +6462,12 @@
               <a:rPr lang="en-US" dirty="0" smtClean="0"/>
               <a:t>Entry Condition: </a:t>
             </a:r>
-            <a:endParaRPr lang="en-US" dirty="0" smtClean="0"/>
           </a:p>
           <a:p>
             <a:pPr lvl="1"/>
             <a:r>
               <a:rPr lang="en-US" dirty="0" smtClean="0"/>
-              <a:t>Logged </a:t>
-            </a:r>
-            <a:r>
-              <a:rPr lang="en-US" dirty="0" smtClean="0"/>
-              <a:t>in as admin </a:t>
+              <a:t>Logged in as admin </a:t>
             </a:r>
             <a:endParaRPr lang="en-US" dirty="0"/>
           </a:p>
@@ -5898,11 +6475,7 @@
             <a:pPr lvl="1"/>
             <a:r>
               <a:rPr lang="en-US" dirty="0" smtClean="0"/>
-              <a:t>On </a:t>
-            </a:r>
-            <a:r>
-              <a:rPr lang="en-US" dirty="0" smtClean="0"/>
-              <a:t>the page with the “Add Admin” function</a:t>
+              <a:t>On the page with the “Add Admin” function</a:t>
             </a:r>
           </a:p>
           <a:p>
@@ -5935,13 +6508,8 @@
           <a:p>
             <a:r>
               <a:rPr lang="en-US" dirty="0" smtClean="0"/>
-              <a:t>Exit Condition: A new Admin User is created in the </a:t>
-            </a:r>
-            <a:r>
-              <a:rPr lang="en-US" dirty="0" smtClean="0"/>
-              <a:t>system.</a:t>
-            </a:r>
-            <a:endParaRPr lang="en-US" dirty="0" smtClean="0"/>
+              <a:t>Exit Condition: A new Admin User is created in the system.</a:t>
+            </a:r>
           </a:p>
           <a:p>
             <a:r>
@@ -5960,13 +6528,8 @@
             <a:pPr lvl="1"/>
             <a:r>
               <a:rPr lang="en-US" dirty="0" smtClean="0"/>
-              <a:t>“Username already </a:t>
-            </a:r>
-            <a:r>
-              <a:rPr lang="en-US" dirty="0" smtClean="0"/>
-              <a:t>exists”</a:t>
-            </a:r>
-            <a:endParaRPr lang="en-US" dirty="0" smtClean="0"/>
+              <a:t>“Username already exists”</a:t>
+            </a:r>
           </a:p>
           <a:p>
             <a:r>
@@ -5987,6 +6550,16 @@
   <p:clrMapOvr>
     <a:masterClrMapping/>
   </p:clrMapOvr>
+  <p:transition spd="slow">
+    <p:push dir="u"/>
+  </p:transition>
+  <p:timing>
+    <p:tnLst>
+      <p:par>
+        <p:cTn id="1" dur="indefinite" restart="never" nodeType="tmRoot"/>
+      </p:par>
+    </p:tnLst>
+  </p:timing>
 </p:sld>
 </file>
 
@@ -6273,4 +6846,289 @@
   <a:objectDefaults/>
   <a:extraClrSchemeLst/>
 </a:theme>
+</file>
+
+<file path=ppt/theme/theme2.xml><?xml version="1.0" encoding="utf-8"?>
+<a:theme xmlns:a="http://schemas.openxmlformats.org/drawingml/2006/main" name="Office Theme">
+  <a:themeElements>
+    <a:clrScheme name="Office">
+      <a:dk1>
+        <a:sysClr val="windowText" lastClr="000000"/>
+      </a:dk1>
+      <a:lt1>
+        <a:sysClr val="window" lastClr="FFFFFF"/>
+      </a:lt1>
+      <a:dk2>
+        <a:srgbClr val="1F497D"/>
+      </a:dk2>
+      <a:lt2>
+        <a:srgbClr val="EEECE1"/>
+      </a:lt2>
+      <a:accent1>
+        <a:srgbClr val="4F81BD"/>
+      </a:accent1>
+      <a:accent2>
+        <a:srgbClr val="C0504D"/>
+      </a:accent2>
+      <a:accent3>
+        <a:srgbClr val="9BBB59"/>
+      </a:accent3>
+      <a:accent4>
+        <a:srgbClr val="8064A2"/>
+      </a:accent4>
+      <a:accent5>
+        <a:srgbClr val="4BACC6"/>
+      </a:accent5>
+      <a:accent6>
+        <a:srgbClr val="F79646"/>
+      </a:accent6>
+      <a:hlink>
+        <a:srgbClr val="0000FF"/>
+      </a:hlink>
+      <a:folHlink>
+        <a:srgbClr val="800080"/>
+      </a:folHlink>
+    </a:clrScheme>
+    <a:fontScheme name="Office">
+      <a:majorFont>
+        <a:latin typeface="Calibri"/>
+        <a:ea typeface=""/>
+        <a:cs typeface=""/>
+        <a:font script="Jpan" typeface="ＭＳ Ｐゴシック"/>
+        <a:font script="Hang" typeface="맑은 고딕"/>
+        <a:font script="Hans" typeface="宋体"/>
+        <a:font script="Hant" typeface="新細明體"/>
+        <a:font script="Arab" typeface="Times New Roman"/>
+        <a:font script="Hebr" typeface="Times New Roman"/>
+        <a:font script="Thai" typeface="Angsana New"/>
+        <a:font script="Ethi" typeface="Nyala"/>
+        <a:font script="Beng" typeface="Vrinda"/>
+        <a:font script="Gujr" typeface="Shruti"/>
+        <a:font script="Khmr" typeface="MoolBoran"/>
+        <a:font script="Knda" typeface="Tunga"/>
+        <a:font script="Guru" typeface="Raavi"/>
+        <a:font script="Cans" typeface="Euphemia"/>
+        <a:font script="Cher" typeface="Plantagenet Cherokee"/>
+        <a:font script="Yiii" typeface="Microsoft Yi Baiti"/>
+        <a:font script="Tibt" typeface="Microsoft Himalaya"/>
+        <a:font script="Thaa" typeface="MV Boli"/>
+        <a:font script="Deva" typeface="Mangal"/>
+        <a:font script="Telu" typeface="Gautami"/>
+        <a:font script="Taml" typeface="Latha"/>
+        <a:font script="Syrc" typeface="Estrangelo Edessa"/>
+        <a:font script="Orya" typeface="Kalinga"/>
+        <a:font script="Mlym" typeface="Kartika"/>
+        <a:font script="Laoo" typeface="DokChampa"/>
+        <a:font script="Sinh" typeface="Iskoola Pota"/>
+        <a:font script="Mong" typeface="Mongolian Baiti"/>
+        <a:font script="Viet" typeface="Times New Roman"/>
+        <a:font script="Uigh" typeface="Microsoft Uighur"/>
+        <a:font script="Geor" typeface="Sylfaen"/>
+      </a:majorFont>
+      <a:minorFont>
+        <a:latin typeface="Calibri"/>
+        <a:ea typeface=""/>
+        <a:cs typeface=""/>
+        <a:font script="Jpan" typeface="ＭＳ Ｐゴシック"/>
+        <a:font script="Hang" typeface="맑은 고딕"/>
+        <a:font script="Hans" typeface="宋体"/>
+        <a:font script="Hant" typeface="新細明體"/>
+        <a:font script="Arab" typeface="Arial"/>
+        <a:font script="Hebr" typeface="Arial"/>
+        <a:font script="Thai" typeface="Cordia New"/>
+        <a:font script="Ethi" typeface="Nyala"/>
+        <a:font script="Beng" typeface="Vrinda"/>
+        <a:font script="Gujr" typeface="Shruti"/>
+        <a:font script="Khmr" typeface="DaunPenh"/>
+        <a:font script="Knda" typeface="Tunga"/>
+        <a:font script="Guru" typeface="Raavi"/>
+        <a:font script="Cans" typeface="Euphemia"/>
+        <a:font script="Cher" typeface="Plantagenet Cherokee"/>
+        <a:font script="Yiii" typeface="Microsoft Yi Baiti"/>
+        <a:font script="Tibt" typeface="Microsoft Himalaya"/>
+        <a:font script="Thaa" typeface="MV Boli"/>
+        <a:font script="Deva" typeface="Mangal"/>
+        <a:font script="Telu" typeface="Gautami"/>
+        <a:font script="Taml" typeface="Latha"/>
+        <a:font script="Syrc" typeface="Estrangelo Edessa"/>
+        <a:font script="Orya" typeface="Kalinga"/>
+        <a:font script="Mlym" typeface="Kartika"/>
+        <a:font script="Laoo" typeface="DokChampa"/>
+        <a:font script="Sinh" typeface="Iskoola Pota"/>
+        <a:font script="Mong" typeface="Mongolian Baiti"/>
+        <a:font script="Viet" typeface="Arial"/>
+        <a:font script="Uigh" typeface="Microsoft Uighur"/>
+        <a:font script="Geor" typeface="Sylfaen"/>
+      </a:minorFont>
+    </a:fontScheme>
+    <a:fmtScheme name="Office">
+      <a:fillStyleLst>
+        <a:solidFill>
+          <a:schemeClr val="phClr"/>
+        </a:solidFill>
+        <a:gradFill rotWithShape="1">
+          <a:gsLst>
+            <a:gs pos="0">
+              <a:schemeClr val="phClr">
+                <a:tint val="50000"/>
+                <a:satMod val="300000"/>
+              </a:schemeClr>
+            </a:gs>
+            <a:gs pos="35000">
+              <a:schemeClr val="phClr">
+                <a:tint val="37000"/>
+                <a:satMod val="300000"/>
+              </a:schemeClr>
+            </a:gs>
+            <a:gs pos="100000">
+              <a:schemeClr val="phClr">
+                <a:tint val="15000"/>
+                <a:satMod val="350000"/>
+              </a:schemeClr>
+            </a:gs>
+          </a:gsLst>
+          <a:lin ang="16200000" scaled="1"/>
+        </a:gradFill>
+        <a:gradFill rotWithShape="1">
+          <a:gsLst>
+            <a:gs pos="0">
+              <a:schemeClr val="phClr">
+                <a:shade val="51000"/>
+                <a:satMod val="130000"/>
+              </a:schemeClr>
+            </a:gs>
+            <a:gs pos="80000">
+              <a:schemeClr val="phClr">
+                <a:shade val="93000"/>
+                <a:satMod val="130000"/>
+              </a:schemeClr>
+            </a:gs>
+            <a:gs pos="100000">
+              <a:schemeClr val="phClr">
+                <a:shade val="94000"/>
+                <a:satMod val="135000"/>
+              </a:schemeClr>
+            </a:gs>
+          </a:gsLst>
+          <a:lin ang="16200000" scaled="0"/>
+        </a:gradFill>
+      </a:fillStyleLst>
+      <a:lnStyleLst>
+        <a:ln w="9525" cap="flat" cmpd="sng" algn="ctr">
+          <a:solidFill>
+            <a:schemeClr val="phClr">
+              <a:shade val="95000"/>
+              <a:satMod val="105000"/>
+            </a:schemeClr>
+          </a:solidFill>
+          <a:prstDash val="solid"/>
+        </a:ln>
+        <a:ln w="25400" cap="flat" cmpd="sng" algn="ctr">
+          <a:solidFill>
+            <a:schemeClr val="phClr"/>
+          </a:solidFill>
+          <a:prstDash val="solid"/>
+        </a:ln>
+        <a:ln w="38100" cap="flat" cmpd="sng" algn="ctr">
+          <a:solidFill>
+            <a:schemeClr val="phClr"/>
+          </a:solidFill>
+          <a:prstDash val="solid"/>
+        </a:ln>
+      </a:lnStyleLst>
+      <a:effectStyleLst>
+        <a:effectStyle>
+          <a:effectLst>
+            <a:outerShdw blurRad="40000" dist="20000" dir="5400000" rotWithShape="0">
+              <a:srgbClr val="000000">
+                <a:alpha val="38000"/>
+              </a:srgbClr>
+            </a:outerShdw>
+          </a:effectLst>
+        </a:effectStyle>
+        <a:effectStyle>
+          <a:effectLst>
+            <a:outerShdw blurRad="40000" dist="23000" dir="5400000" rotWithShape="0">
+              <a:srgbClr val="000000">
+                <a:alpha val="35000"/>
+              </a:srgbClr>
+            </a:outerShdw>
+          </a:effectLst>
+        </a:effectStyle>
+        <a:effectStyle>
+          <a:effectLst>
+            <a:outerShdw blurRad="40000" dist="23000" dir="5400000" rotWithShape="0">
+              <a:srgbClr val="000000">
+                <a:alpha val="35000"/>
+              </a:srgbClr>
+            </a:outerShdw>
+          </a:effectLst>
+          <a:scene3d>
+            <a:camera prst="orthographicFront">
+              <a:rot lat="0" lon="0" rev="0"/>
+            </a:camera>
+            <a:lightRig rig="threePt" dir="t">
+              <a:rot lat="0" lon="0" rev="1200000"/>
+            </a:lightRig>
+          </a:scene3d>
+          <a:sp3d>
+            <a:bevelT w="63500" h="25400"/>
+          </a:sp3d>
+        </a:effectStyle>
+      </a:effectStyleLst>
+      <a:bgFillStyleLst>
+        <a:solidFill>
+          <a:schemeClr val="phClr"/>
+        </a:solidFill>
+        <a:gradFill rotWithShape="1">
+          <a:gsLst>
+            <a:gs pos="0">
+              <a:schemeClr val="phClr">
+                <a:tint val="40000"/>
+                <a:satMod val="350000"/>
+              </a:schemeClr>
+            </a:gs>
+            <a:gs pos="40000">
+              <a:schemeClr val="phClr">
+                <a:tint val="45000"/>
+                <a:shade val="99000"/>
+                <a:satMod val="350000"/>
+              </a:schemeClr>
+            </a:gs>
+            <a:gs pos="100000">
+              <a:schemeClr val="phClr">
+                <a:shade val="20000"/>
+                <a:satMod val="255000"/>
+              </a:schemeClr>
+            </a:gs>
+          </a:gsLst>
+          <a:path path="circle">
+            <a:fillToRect l="50000" t="-80000" r="50000" b="180000"/>
+          </a:path>
+        </a:gradFill>
+        <a:gradFill rotWithShape="1">
+          <a:gsLst>
+            <a:gs pos="0">
+              <a:schemeClr val="phClr">
+                <a:tint val="80000"/>
+                <a:satMod val="300000"/>
+              </a:schemeClr>
+            </a:gs>
+            <a:gs pos="100000">
+              <a:schemeClr val="phClr">
+                <a:shade val="30000"/>
+                <a:satMod val="200000"/>
+              </a:schemeClr>
+            </a:gs>
+          </a:gsLst>
+          <a:path path="circle">
+            <a:fillToRect l="50000" t="50000" r="50000" b="50000"/>
+          </a:path>
+        </a:gradFill>
+      </a:bgFillStyleLst>
+    </a:fmtScheme>
+  </a:themeElements>
+  <a:objectDefaults/>
+  <a:extraClrSchemeLst/>
+</a:theme>
 </file>
</xml_diff>

<commit_message>
Revised with Constrains and Sequence Diagrams
</commit_message>
<xml_diff>
--- a/Online Car Dealer System.pptx
+++ b/Online Car Dealer System.pptx
@@ -208,6 +208,7 @@
           <a:p>
             <a:fld id="{893068A3-A88F-4198-BA78-261442291243}" type="datetimeFigureOut">
               <a:rPr lang="en-US" smtClean="0"/>
+              <a:pPr/>
               <a:t>2/11/2014</a:t>
             </a:fld>
             <a:endParaRPr lang="en-US"/>
@@ -367,6 +368,7 @@
           <a:p>
             <a:fld id="{D5C44368-5094-43CA-9CC5-FF5F025E0E37}" type="slidenum">
               <a:rPr lang="en-US" smtClean="0"/>
+              <a:pPr/>
               <a:t>‹#›</a:t>
             </a:fld>
             <a:endParaRPr lang="en-US"/>
@@ -376,7 +378,7 @@
     </p:spTree>
     <p:extLst>
       <p:ext uri="{BB962C8B-B14F-4D97-AF65-F5344CB8AC3E}">
-        <p14:creationId xmlns:p14="http://schemas.microsoft.com/office/powerpoint/2010/main" val="1497710176"/>
+        <p14:creationId xmlns="" xmlns:p14="http://schemas.microsoft.com/office/powerpoint/2010/main" val="1497710176"/>
       </p:ext>
     </p:extLst>
   </p:cSld>
@@ -541,6 +543,7 @@
           <a:p>
             <a:fld id="{D5C44368-5094-43CA-9CC5-FF5F025E0E37}" type="slidenum">
               <a:rPr lang="en-US" smtClean="0"/>
+              <a:pPr/>
               <a:t>7</a:t>
             </a:fld>
             <a:endParaRPr lang="en-US"/>
@@ -550,7 +553,7 @@
     </p:spTree>
     <p:extLst>
       <p:ext uri="{BB962C8B-B14F-4D97-AF65-F5344CB8AC3E}">
-        <p14:creationId xmlns:p14="http://schemas.microsoft.com/office/powerpoint/2010/main" val="180946886"/>
+        <p14:creationId xmlns="" xmlns:p14="http://schemas.microsoft.com/office/powerpoint/2010/main" val="180946886"/>
       </p:ext>
     </p:extLst>
   </p:cSld>
@@ -794,7 +797,7 @@
     </p:spTree>
     <p:extLst>
       <p:ext uri="{BB962C8B-B14F-4D97-AF65-F5344CB8AC3E}">
-        <p14:creationId xmlns:p14="http://schemas.microsoft.com/office/powerpoint/2010/main" val="1279415240"/>
+        <p14:creationId xmlns="" xmlns:p14="http://schemas.microsoft.com/office/powerpoint/2010/main" val="1279415240"/>
       </p:ext>
     </p:extLst>
   </p:cSld>
@@ -969,7 +972,7 @@
     </p:spTree>
     <p:extLst>
       <p:ext uri="{BB962C8B-B14F-4D97-AF65-F5344CB8AC3E}">
-        <p14:creationId xmlns:p14="http://schemas.microsoft.com/office/powerpoint/2010/main" val="2697128604"/>
+        <p14:creationId xmlns="" xmlns:p14="http://schemas.microsoft.com/office/powerpoint/2010/main" val="2697128604"/>
       </p:ext>
     </p:extLst>
   </p:cSld>
@@ -1154,7 +1157,7 @@
     </p:spTree>
     <p:extLst>
       <p:ext uri="{BB962C8B-B14F-4D97-AF65-F5344CB8AC3E}">
-        <p14:creationId xmlns:p14="http://schemas.microsoft.com/office/powerpoint/2010/main" val="2205083904"/>
+        <p14:creationId xmlns="" xmlns:p14="http://schemas.microsoft.com/office/powerpoint/2010/main" val="2205083904"/>
       </p:ext>
     </p:extLst>
   </p:cSld>
@@ -1329,7 +1332,7 @@
     </p:spTree>
     <p:extLst>
       <p:ext uri="{BB962C8B-B14F-4D97-AF65-F5344CB8AC3E}">
-        <p14:creationId xmlns:p14="http://schemas.microsoft.com/office/powerpoint/2010/main" val="1925561068"/>
+        <p14:creationId xmlns="" xmlns:p14="http://schemas.microsoft.com/office/powerpoint/2010/main" val="1925561068"/>
       </p:ext>
     </p:extLst>
   </p:cSld>
@@ -1580,7 +1583,7 @@
     </p:spTree>
     <p:extLst>
       <p:ext uri="{BB962C8B-B14F-4D97-AF65-F5344CB8AC3E}">
-        <p14:creationId xmlns:p14="http://schemas.microsoft.com/office/powerpoint/2010/main" val="3494111062"/>
+        <p14:creationId xmlns="" xmlns:p14="http://schemas.microsoft.com/office/powerpoint/2010/main" val="3494111062"/>
       </p:ext>
     </p:extLst>
   </p:cSld>
@@ -1873,7 +1876,7 @@
     </p:spTree>
     <p:extLst>
       <p:ext uri="{BB962C8B-B14F-4D97-AF65-F5344CB8AC3E}">
-        <p14:creationId xmlns:p14="http://schemas.microsoft.com/office/powerpoint/2010/main" val="1975756522"/>
+        <p14:creationId xmlns="" xmlns:p14="http://schemas.microsoft.com/office/powerpoint/2010/main" val="1975756522"/>
       </p:ext>
     </p:extLst>
   </p:cSld>
@@ -2300,7 +2303,7 @@
     </p:spTree>
     <p:extLst>
       <p:ext uri="{BB962C8B-B14F-4D97-AF65-F5344CB8AC3E}">
-        <p14:creationId xmlns:p14="http://schemas.microsoft.com/office/powerpoint/2010/main" val="3874859315"/>
+        <p14:creationId xmlns="" xmlns:p14="http://schemas.microsoft.com/office/powerpoint/2010/main" val="3874859315"/>
       </p:ext>
     </p:extLst>
   </p:cSld>
@@ -2423,7 +2426,7 @@
     </p:spTree>
     <p:extLst>
       <p:ext uri="{BB962C8B-B14F-4D97-AF65-F5344CB8AC3E}">
-        <p14:creationId xmlns:p14="http://schemas.microsoft.com/office/powerpoint/2010/main" val="2919489863"/>
+        <p14:creationId xmlns="" xmlns:p14="http://schemas.microsoft.com/office/powerpoint/2010/main" val="2919489863"/>
       </p:ext>
     </p:extLst>
   </p:cSld>
@@ -2523,7 +2526,7 @@
     </p:spTree>
     <p:extLst>
       <p:ext uri="{BB962C8B-B14F-4D97-AF65-F5344CB8AC3E}">
-        <p14:creationId xmlns:p14="http://schemas.microsoft.com/office/powerpoint/2010/main" val="1167458238"/>
+        <p14:creationId xmlns="" xmlns:p14="http://schemas.microsoft.com/office/powerpoint/2010/main" val="1167458238"/>
       </p:ext>
     </p:extLst>
   </p:cSld>
@@ -2805,7 +2808,7 @@
     </p:spTree>
     <p:extLst>
       <p:ext uri="{BB962C8B-B14F-4D97-AF65-F5344CB8AC3E}">
-        <p14:creationId xmlns:p14="http://schemas.microsoft.com/office/powerpoint/2010/main" val="2811716044"/>
+        <p14:creationId xmlns="" xmlns:p14="http://schemas.microsoft.com/office/powerpoint/2010/main" val="2811716044"/>
       </p:ext>
     </p:extLst>
   </p:cSld>
@@ -3063,7 +3066,7 @@
     </p:spTree>
     <p:extLst>
       <p:ext uri="{BB962C8B-B14F-4D97-AF65-F5344CB8AC3E}">
-        <p14:creationId xmlns:p14="http://schemas.microsoft.com/office/powerpoint/2010/main" val="2356666417"/>
+        <p14:creationId xmlns="" xmlns:p14="http://schemas.microsoft.com/office/powerpoint/2010/main" val="2356666417"/>
       </p:ext>
     </p:extLst>
   </p:cSld>
@@ -3317,7 +3320,7 @@
     </p:spTree>
     <p:extLst>
       <p:ext uri="{BB962C8B-B14F-4D97-AF65-F5344CB8AC3E}">
-        <p14:creationId xmlns:p14="http://schemas.microsoft.com/office/powerpoint/2010/main" val="957811692"/>
+        <p14:creationId xmlns="" xmlns:p14="http://schemas.microsoft.com/office/powerpoint/2010/main" val="957811692"/>
       </p:ext>
     </p:extLst>
   </p:cSld>
@@ -3702,7 +3705,7 @@
     </p:spTree>
     <p:extLst>
       <p:ext uri="{BB962C8B-B14F-4D97-AF65-F5344CB8AC3E}">
-        <p14:creationId xmlns:p14="http://schemas.microsoft.com/office/powerpoint/2010/main" val="1079363708"/>
+        <p14:creationId xmlns="" xmlns:p14="http://schemas.microsoft.com/office/powerpoint/2010/main" val="1079363708"/>
       </p:ext>
     </p:extLst>
   </p:cSld>
@@ -3710,7 +3713,7 @@
     <a:masterClrMapping/>
   </p:clrMapOvr>
   <mc:AlternateContent xmlns:mc="http://schemas.openxmlformats.org/markup-compatibility/2006">
-    <mc:Choice xmlns:p14="http://schemas.microsoft.com/office/powerpoint/2010/main" Requires="p14">
+    <mc:Choice xmlns="" xmlns:p14="http://schemas.microsoft.com/office/powerpoint/2010/main" Requires="p14">
       <p:transition spd="slow" p14:dur="1500">
         <p:split orient="vert"/>
       </p:transition>
@@ -3883,7 +3886,7 @@
     </p:spTree>
     <p:extLst>
       <p:ext uri="{BB962C8B-B14F-4D97-AF65-F5344CB8AC3E}">
-        <p14:creationId xmlns:p14="http://schemas.microsoft.com/office/powerpoint/2010/main" val="1731634201"/>
+        <p14:creationId xmlns="" xmlns:p14="http://schemas.microsoft.com/office/powerpoint/2010/main" val="1731634201"/>
       </p:ext>
     </p:extLst>
   </p:cSld>
@@ -3957,7 +3960,7 @@
           <a:blip r:embed="rId2">
             <a:extLst>
               <a:ext uri="{28A0092B-C50C-407E-A947-70E740481C1C}">
-                <a14:useLocalDpi xmlns:a14="http://schemas.microsoft.com/office/drawing/2010/main" val="0"/>
+                <a14:useLocalDpi xmlns="" xmlns:a14="http://schemas.microsoft.com/office/drawing/2010/main" val="0"/>
               </a:ext>
             </a:extLst>
           </a:blip>
@@ -3975,7 +3978,7 @@
     </p:spTree>
     <p:extLst>
       <p:ext uri="{BB962C8B-B14F-4D97-AF65-F5344CB8AC3E}">
-        <p14:creationId xmlns:p14="http://schemas.microsoft.com/office/powerpoint/2010/main" val="119344913"/>
+        <p14:creationId xmlns="" xmlns:p14="http://schemas.microsoft.com/office/powerpoint/2010/main" val="119344913"/>
       </p:ext>
     </p:extLst>
   </p:cSld>
@@ -4061,7 +4064,7 @@
     </p:spTree>
     <p:extLst>
       <p:ext uri="{BB962C8B-B14F-4D97-AF65-F5344CB8AC3E}">
-        <p14:creationId xmlns:p14="http://schemas.microsoft.com/office/powerpoint/2010/main" val="3373920446"/>
+        <p14:creationId xmlns="" xmlns:p14="http://schemas.microsoft.com/office/powerpoint/2010/main" val="3373920446"/>
       </p:ext>
     </p:extLst>
   </p:cSld>
@@ -4157,7 +4160,7 @@
     </p:spTree>
     <p:extLst>
       <p:ext uri="{BB962C8B-B14F-4D97-AF65-F5344CB8AC3E}">
-        <p14:creationId xmlns:p14="http://schemas.microsoft.com/office/powerpoint/2010/main" val="3373920446"/>
+        <p14:creationId xmlns="" xmlns:p14="http://schemas.microsoft.com/office/powerpoint/2010/main" val="3373920446"/>
       </p:ext>
     </p:extLst>
   </p:cSld>
@@ -4294,7 +4297,7 @@
     </p:spTree>
     <p:extLst>
       <p:ext uri="{BB962C8B-B14F-4D97-AF65-F5344CB8AC3E}">
-        <p14:creationId xmlns:p14="http://schemas.microsoft.com/office/powerpoint/2010/main" val="3260999506"/>
+        <p14:creationId xmlns="" xmlns:p14="http://schemas.microsoft.com/office/powerpoint/2010/main" val="3260999506"/>
       </p:ext>
     </p:extLst>
   </p:cSld>
@@ -4356,7 +4359,7 @@
       </p:sp>
       <p:pic>
         <p:nvPicPr>
-          <p:cNvPr id="5" name="Content Placeholder 4"/>
+          <p:cNvPr id="6" name="Content Placeholder 5" descr="SeqDiag1.PNG"/>
           <p:cNvPicPr>
             <a:picLocks noGrp="1" noChangeAspect="1"/>
           </p:cNvPicPr>
@@ -4365,28 +4368,22 @@
           </p:nvPr>
         </p:nvPicPr>
         <p:blipFill>
-          <a:blip r:embed="rId2">
-            <a:extLst>
-              <a:ext uri="{28A0092B-C50C-407E-A947-70E740481C1C}">
-                <a14:useLocalDpi xmlns:a14="http://schemas.microsoft.com/office/drawing/2010/main" val="0"/>
-              </a:ext>
-            </a:extLst>
-          </a:blip>
+          <a:blip r:embed="rId2"/>
           <a:stretch>
             <a:fillRect/>
           </a:stretch>
         </p:blipFill>
         <p:spPr>
           <a:xfrm>
-            <a:off x="381000" y="1295400"/>
-            <a:ext cx="8382000" cy="5334000"/>
+            <a:off x="457200" y="1371600"/>
+            <a:ext cx="8153400" cy="5181600"/>
           </a:xfrm>
         </p:spPr>
       </p:pic>
     </p:spTree>
     <p:extLst>
       <p:ext uri="{BB962C8B-B14F-4D97-AF65-F5344CB8AC3E}">
-        <p14:creationId xmlns:p14="http://schemas.microsoft.com/office/powerpoint/2010/main" val="560217405"/>
+        <p14:creationId xmlns="" xmlns:p14="http://schemas.microsoft.com/office/powerpoint/2010/main" val="560217405"/>
       </p:ext>
     </p:extLst>
   </p:cSld>
@@ -4448,7 +4445,7 @@
       </p:sp>
       <p:pic>
         <p:nvPicPr>
-          <p:cNvPr id="5" name="Content Placeholder 4"/>
+          <p:cNvPr id="6" name="Content Placeholder 5" descr="SeqDiag2.PNG"/>
           <p:cNvPicPr>
             <a:picLocks noGrp="1" noChangeAspect="1"/>
           </p:cNvPicPr>
@@ -4457,28 +4454,22 @@
           </p:nvPr>
         </p:nvPicPr>
         <p:blipFill>
-          <a:blip r:embed="rId2">
-            <a:extLst>
-              <a:ext uri="{28A0092B-C50C-407E-A947-70E740481C1C}">
-                <a14:useLocalDpi xmlns:a14="http://schemas.microsoft.com/office/drawing/2010/main" val="0"/>
-              </a:ext>
-            </a:extLst>
-          </a:blip>
+          <a:blip r:embed="rId2"/>
           <a:stretch>
             <a:fillRect/>
           </a:stretch>
         </p:blipFill>
         <p:spPr>
           <a:xfrm>
-            <a:off x="304800" y="1295400"/>
-            <a:ext cx="8534400" cy="5334000"/>
+            <a:off x="381000" y="1295400"/>
+            <a:ext cx="8305800" cy="5181600"/>
           </a:xfrm>
         </p:spPr>
       </p:pic>
     </p:spTree>
     <p:extLst>
       <p:ext uri="{BB962C8B-B14F-4D97-AF65-F5344CB8AC3E}">
-        <p14:creationId xmlns:p14="http://schemas.microsoft.com/office/powerpoint/2010/main" val="560217405"/>
+        <p14:creationId xmlns="" xmlns:p14="http://schemas.microsoft.com/office/powerpoint/2010/main" val="560217405"/>
       </p:ext>
     </p:extLst>
   </p:cSld>
@@ -4600,7 +4591,7 @@
     </p:spTree>
     <p:extLst>
       <p:ext uri="{BB962C8B-B14F-4D97-AF65-F5344CB8AC3E}">
-        <p14:creationId xmlns:p14="http://schemas.microsoft.com/office/powerpoint/2010/main" val="650407036"/>
+        <p14:creationId xmlns="" xmlns:p14="http://schemas.microsoft.com/office/powerpoint/2010/main" val="650407036"/>
       </p:ext>
     </p:extLst>
   </p:cSld>
@@ -4750,7 +4741,7 @@
     </p:spTree>
     <p:extLst>
       <p:ext uri="{BB962C8B-B14F-4D97-AF65-F5344CB8AC3E}">
-        <p14:creationId xmlns:p14="http://schemas.microsoft.com/office/powerpoint/2010/main" val="1904782738"/>
+        <p14:creationId xmlns="" xmlns:p14="http://schemas.microsoft.com/office/powerpoint/2010/main" val="1904782738"/>
       </p:ext>
     </p:extLst>
   </p:cSld>
@@ -5031,7 +5022,7 @@
     </p:spTree>
     <p:extLst>
       <p:ext uri="{BB962C8B-B14F-4D97-AF65-F5344CB8AC3E}">
-        <p14:creationId xmlns:p14="http://schemas.microsoft.com/office/powerpoint/2010/main" val="1366422554"/>
+        <p14:creationId xmlns="" xmlns:p14="http://schemas.microsoft.com/office/powerpoint/2010/main" val="1366422554"/>
       </p:ext>
     </p:extLst>
   </p:cSld>
@@ -5344,7 +5335,7 @@
     </p:spTree>
     <p:extLst>
       <p:ext uri="{BB962C8B-B14F-4D97-AF65-F5344CB8AC3E}">
-        <p14:creationId xmlns:p14="http://schemas.microsoft.com/office/powerpoint/2010/main" val="1018291567"/>
+        <p14:creationId xmlns="" xmlns:p14="http://schemas.microsoft.com/office/powerpoint/2010/main" val="1018291567"/>
       </p:ext>
     </p:extLst>
   </p:cSld>
@@ -5666,7 +5657,7 @@
     </p:spTree>
     <p:extLst>
       <p:ext uri="{BB962C8B-B14F-4D97-AF65-F5344CB8AC3E}">
-        <p14:creationId xmlns:p14="http://schemas.microsoft.com/office/powerpoint/2010/main" val="2400752179"/>
+        <p14:creationId xmlns="" xmlns:p14="http://schemas.microsoft.com/office/powerpoint/2010/main" val="2400752179"/>
       </p:ext>
     </p:extLst>
   </p:cSld>
@@ -5739,7 +5730,7 @@
         <p:spPr/>
         <p:txBody>
           <a:bodyPr>
-            <a:normAutofit lnSpcReduction="10000"/>
+            <a:normAutofit fontScale="92500"/>
           </a:bodyPr>
           <a:lstStyle/>
           <a:p>
@@ -5747,7 +5738,6 @@
               <a:rPr lang="en-US" dirty="0" smtClean="0"/>
               <a:t>Client Constraints:</a:t>
             </a:r>
-            <a:endParaRPr lang="en-US" dirty="0"/>
           </a:p>
           <a:p>
             <a:pPr lvl="1">
@@ -5767,12 +5757,8 @@
               </a:lnSpc>
             </a:pPr>
             <a:r>
-              <a:rPr lang="en-US" dirty="0"/>
-              <a:t>Sunshine Online Car Dealer System must </a:t>
-            </a:r>
-            <a:r>
-              <a:rPr lang="en-US" dirty="0" smtClean="0"/>
-              <a:t>contain a </a:t>
+              <a:rPr lang="en-US" dirty="0" smtClean="0"/>
+              <a:t>Sunshine Online Car Dealer System must contain a </a:t>
             </a:r>
             <a:r>
               <a:rPr lang="en-US" dirty="0" err="1" smtClean="0"/>
@@ -5791,7 +5777,7 @@
             </a:pPr>
             <a:r>
               <a:rPr lang="en-US" dirty="0" smtClean="0"/>
-              <a:t>It will assign a session to every user accessing a domain web page.</a:t>
+              <a:t>It must assign a session to every user accessing a domain web page.</a:t>
             </a:r>
           </a:p>
           <a:p>
@@ -5813,15 +5799,7 @@
             </a:pPr>
             <a:r>
               <a:rPr lang="en-US" dirty="0" smtClean="0"/>
-              <a:t>The </a:t>
-            </a:r>
-            <a:r>
-              <a:rPr lang="en-US" dirty="0"/>
-              <a:t>Sunshine Online Car Dealer System will </a:t>
-            </a:r>
-            <a:r>
-              <a:rPr lang="en-US" dirty="0" smtClean="0"/>
-              <a:t>sell cars with minimal human supervision.</a:t>
+              <a:t>The Sunshine Online Car Dealer System has to sell cars with minimal human supervision.</a:t>
             </a:r>
           </a:p>
           <a:p>
@@ -5832,9 +5810,8 @@
             </a:pPr>
             <a:r>
               <a:rPr lang="en-US" dirty="0" smtClean="0"/>
-              <a:t>The system will sell 1 car a time.</a:t>
-            </a:r>
-            <a:endParaRPr lang="en-US" dirty="0"/>
+              <a:t>The system sells 1 car at a time per user transaction.</a:t>
+            </a:r>
           </a:p>
           <a:p>
             <a:endParaRPr lang="en-US" dirty="0"/>
@@ -5844,7 +5821,7 @@
     </p:spTree>
     <p:extLst>
       <p:ext uri="{BB962C8B-B14F-4D97-AF65-F5344CB8AC3E}">
-        <p14:creationId xmlns:p14="http://schemas.microsoft.com/office/powerpoint/2010/main" val="1457262062"/>
+        <p14:creationId xmlns="" xmlns:p14="http://schemas.microsoft.com/office/powerpoint/2010/main" val="1457262062"/>
       </p:ext>
     </p:extLst>
   </p:cSld>
@@ -6092,7 +6069,7 @@
     </p:spTree>
     <p:extLst>
       <p:ext uri="{BB962C8B-B14F-4D97-AF65-F5344CB8AC3E}">
-        <p14:creationId xmlns:p14="http://schemas.microsoft.com/office/powerpoint/2010/main" val="2554732056"/>
+        <p14:creationId xmlns="" xmlns:p14="http://schemas.microsoft.com/office/powerpoint/2010/main" val="2554732056"/>
       </p:ext>
     </p:extLst>
   </p:cSld>
@@ -6369,7 +6346,7 @@
     </p:spTree>
     <p:extLst>
       <p:ext uri="{BB962C8B-B14F-4D97-AF65-F5344CB8AC3E}">
-        <p14:creationId xmlns:p14="http://schemas.microsoft.com/office/powerpoint/2010/main" val="3930061998"/>
+        <p14:creationId xmlns="" xmlns:p14="http://schemas.microsoft.com/office/powerpoint/2010/main" val="3930061998"/>
       </p:ext>
     </p:extLst>
   </p:cSld>
@@ -6543,7 +6520,7 @@
     </p:spTree>
     <p:extLst>
       <p:ext uri="{BB962C8B-B14F-4D97-AF65-F5344CB8AC3E}">
-        <p14:creationId xmlns:p14="http://schemas.microsoft.com/office/powerpoint/2010/main" val="3369059010"/>
+        <p14:creationId xmlns="" xmlns:p14="http://schemas.microsoft.com/office/powerpoint/2010/main" val="3369059010"/>
       </p:ext>
     </p:extLst>
   </p:cSld>

</xml_diff>

<commit_message>
fixed ppt to email the professor
</commit_message>
<xml_diff>
--- a/Online Car Dealer System.pptx
+++ b/Online Car Dealer System.pptx
@@ -5,26 +5,25 @@
     <p:sldMasterId id="2147483696" r:id="rId1"/>
   </p:sldMasterIdLst>
   <p:notesMasterIdLst>
-    <p:notesMasterId r:id="rId19"/>
+    <p:notesMasterId r:id="rId18"/>
   </p:notesMasterIdLst>
   <p:sldIdLst>
     <p:sldId id="256" r:id="rId2"/>
     <p:sldId id="257" r:id="rId3"/>
     <p:sldId id="258" r:id="rId4"/>
     <p:sldId id="259" r:id="rId5"/>
-    <p:sldId id="272" r:id="rId6"/>
-    <p:sldId id="271" r:id="rId7"/>
-    <p:sldId id="260" r:id="rId8"/>
-    <p:sldId id="261" r:id="rId9"/>
-    <p:sldId id="262" r:id="rId10"/>
-    <p:sldId id="263" r:id="rId11"/>
-    <p:sldId id="264" r:id="rId12"/>
-    <p:sldId id="270" r:id="rId13"/>
-    <p:sldId id="273" r:id="rId14"/>
-    <p:sldId id="265" r:id="rId15"/>
-    <p:sldId id="266" r:id="rId16"/>
-    <p:sldId id="274" r:id="rId17"/>
-    <p:sldId id="269" r:id="rId18"/>
+    <p:sldId id="271" r:id="rId6"/>
+    <p:sldId id="260" r:id="rId7"/>
+    <p:sldId id="261" r:id="rId8"/>
+    <p:sldId id="262" r:id="rId9"/>
+    <p:sldId id="263" r:id="rId10"/>
+    <p:sldId id="264" r:id="rId11"/>
+    <p:sldId id="270" r:id="rId12"/>
+    <p:sldId id="273" r:id="rId13"/>
+    <p:sldId id="265" r:id="rId14"/>
+    <p:sldId id="266" r:id="rId15"/>
+    <p:sldId id="274" r:id="rId16"/>
+    <p:sldId id="269" r:id="rId17"/>
   </p:sldIdLst>
   <p:sldSz cx="9144000" cy="6858000" type="screen4x3"/>
   <p:notesSz cx="6858000" cy="9144000"/>
@@ -208,8 +207,7 @@
           <a:p>
             <a:fld id="{893068A3-A88F-4198-BA78-261442291243}" type="datetimeFigureOut">
               <a:rPr lang="en-US" smtClean="0"/>
-              <a:pPr/>
-              <a:t>2/11/2014</a:t>
+              <a:t>2/18/2014</a:t>
             </a:fld>
             <a:endParaRPr lang="en-US"/>
           </a:p>
@@ -368,7 +366,6 @@
           <a:p>
             <a:fld id="{D5C44368-5094-43CA-9CC5-FF5F025E0E37}" type="slidenum">
               <a:rPr lang="en-US" smtClean="0"/>
-              <a:pPr/>
               <a:t>‹#›</a:t>
             </a:fld>
             <a:endParaRPr lang="en-US"/>
@@ -378,7 +375,7 @@
     </p:spTree>
     <p:extLst>
       <p:ext uri="{BB962C8B-B14F-4D97-AF65-F5344CB8AC3E}">
-        <p14:creationId xmlns="" xmlns:p14="http://schemas.microsoft.com/office/powerpoint/2010/main" val="1497710176"/>
+        <p14:creationId xmlns:p14="http://schemas.microsoft.com/office/powerpoint/2010/main" val="1497710176"/>
       </p:ext>
     </p:extLst>
   </p:cSld>
@@ -543,8 +540,7 @@
           <a:p>
             <a:fld id="{D5C44368-5094-43CA-9CC5-FF5F025E0E37}" type="slidenum">
               <a:rPr lang="en-US" smtClean="0"/>
-              <a:pPr/>
-              <a:t>7</a:t>
+              <a:t>6</a:t>
             </a:fld>
             <a:endParaRPr lang="en-US"/>
           </a:p>
@@ -553,7 +549,7 @@
     </p:spTree>
     <p:extLst>
       <p:ext uri="{BB962C8B-B14F-4D97-AF65-F5344CB8AC3E}">
-        <p14:creationId xmlns="" xmlns:p14="http://schemas.microsoft.com/office/powerpoint/2010/main" val="180946886"/>
+        <p14:creationId xmlns:p14="http://schemas.microsoft.com/office/powerpoint/2010/main" val="180946886"/>
       </p:ext>
     </p:extLst>
   </p:cSld>
@@ -745,7 +741,7 @@
             <a:fld id="{A08AC9C0-284C-4CD9-8972-BFFC3F420DB7}" type="datetimeFigureOut">
               <a:rPr lang="en-US" smtClean="0"/>
               <a:pPr/>
-              <a:t>2/11/2014</a:t>
+              <a:t>2/18/2014</a:t>
             </a:fld>
             <a:endParaRPr lang="en-US"/>
           </a:p>
@@ -797,7 +793,7 @@
     </p:spTree>
     <p:extLst>
       <p:ext uri="{BB962C8B-B14F-4D97-AF65-F5344CB8AC3E}">
-        <p14:creationId xmlns="" xmlns:p14="http://schemas.microsoft.com/office/powerpoint/2010/main" val="1279415240"/>
+        <p14:creationId xmlns:p14="http://schemas.microsoft.com/office/powerpoint/2010/main" val="1279415240"/>
       </p:ext>
     </p:extLst>
   </p:cSld>
@@ -920,7 +916,7 @@
             <a:fld id="{A08AC9C0-284C-4CD9-8972-BFFC3F420DB7}" type="datetimeFigureOut">
               <a:rPr lang="en-US" smtClean="0"/>
               <a:pPr/>
-              <a:t>2/11/2014</a:t>
+              <a:t>2/18/2014</a:t>
             </a:fld>
             <a:endParaRPr lang="en-US"/>
           </a:p>
@@ -972,7 +968,7 @@
     </p:spTree>
     <p:extLst>
       <p:ext uri="{BB962C8B-B14F-4D97-AF65-F5344CB8AC3E}">
-        <p14:creationId xmlns="" xmlns:p14="http://schemas.microsoft.com/office/powerpoint/2010/main" val="2697128604"/>
+        <p14:creationId xmlns:p14="http://schemas.microsoft.com/office/powerpoint/2010/main" val="2697128604"/>
       </p:ext>
     </p:extLst>
   </p:cSld>
@@ -1105,7 +1101,7 @@
             <a:fld id="{A08AC9C0-284C-4CD9-8972-BFFC3F420DB7}" type="datetimeFigureOut">
               <a:rPr lang="en-US" smtClean="0"/>
               <a:pPr/>
-              <a:t>2/11/2014</a:t>
+              <a:t>2/18/2014</a:t>
             </a:fld>
             <a:endParaRPr lang="en-US"/>
           </a:p>
@@ -1157,7 +1153,7 @@
     </p:spTree>
     <p:extLst>
       <p:ext uri="{BB962C8B-B14F-4D97-AF65-F5344CB8AC3E}">
-        <p14:creationId xmlns="" xmlns:p14="http://schemas.microsoft.com/office/powerpoint/2010/main" val="2205083904"/>
+        <p14:creationId xmlns:p14="http://schemas.microsoft.com/office/powerpoint/2010/main" val="2205083904"/>
       </p:ext>
     </p:extLst>
   </p:cSld>
@@ -1280,7 +1276,7 @@
             <a:fld id="{A08AC9C0-284C-4CD9-8972-BFFC3F420DB7}" type="datetimeFigureOut">
               <a:rPr lang="en-US" smtClean="0"/>
               <a:pPr/>
-              <a:t>2/11/2014</a:t>
+              <a:t>2/18/2014</a:t>
             </a:fld>
             <a:endParaRPr lang="en-US"/>
           </a:p>
@@ -1332,7 +1328,7 @@
     </p:spTree>
     <p:extLst>
       <p:ext uri="{BB962C8B-B14F-4D97-AF65-F5344CB8AC3E}">
-        <p14:creationId xmlns="" xmlns:p14="http://schemas.microsoft.com/office/powerpoint/2010/main" val="1925561068"/>
+        <p14:creationId xmlns:p14="http://schemas.microsoft.com/office/powerpoint/2010/main" val="1925561068"/>
       </p:ext>
     </p:extLst>
   </p:cSld>
@@ -1531,7 +1527,7 @@
             <a:fld id="{A08AC9C0-284C-4CD9-8972-BFFC3F420DB7}" type="datetimeFigureOut">
               <a:rPr lang="en-US" smtClean="0"/>
               <a:pPr/>
-              <a:t>2/11/2014</a:t>
+              <a:t>2/18/2014</a:t>
             </a:fld>
             <a:endParaRPr lang="en-US"/>
           </a:p>
@@ -1583,7 +1579,7 @@
     </p:spTree>
     <p:extLst>
       <p:ext uri="{BB962C8B-B14F-4D97-AF65-F5344CB8AC3E}">
-        <p14:creationId xmlns="" xmlns:p14="http://schemas.microsoft.com/office/powerpoint/2010/main" val="3494111062"/>
+        <p14:creationId xmlns:p14="http://schemas.microsoft.com/office/powerpoint/2010/main" val="3494111062"/>
       </p:ext>
     </p:extLst>
   </p:cSld>
@@ -1824,7 +1820,7 @@
             <a:fld id="{A08AC9C0-284C-4CD9-8972-BFFC3F420DB7}" type="datetimeFigureOut">
               <a:rPr lang="en-US" smtClean="0"/>
               <a:pPr/>
-              <a:t>2/11/2014</a:t>
+              <a:t>2/18/2014</a:t>
             </a:fld>
             <a:endParaRPr lang="en-US"/>
           </a:p>
@@ -1876,7 +1872,7 @@
     </p:spTree>
     <p:extLst>
       <p:ext uri="{BB962C8B-B14F-4D97-AF65-F5344CB8AC3E}">
-        <p14:creationId xmlns="" xmlns:p14="http://schemas.microsoft.com/office/powerpoint/2010/main" val="1975756522"/>
+        <p14:creationId xmlns:p14="http://schemas.microsoft.com/office/powerpoint/2010/main" val="1975756522"/>
       </p:ext>
     </p:extLst>
   </p:cSld>
@@ -2251,7 +2247,7 @@
             <a:fld id="{A08AC9C0-284C-4CD9-8972-BFFC3F420DB7}" type="datetimeFigureOut">
               <a:rPr lang="en-US" smtClean="0"/>
               <a:pPr/>
-              <a:t>2/11/2014</a:t>
+              <a:t>2/18/2014</a:t>
             </a:fld>
             <a:endParaRPr lang="en-US"/>
           </a:p>
@@ -2303,7 +2299,7 @@
     </p:spTree>
     <p:extLst>
       <p:ext uri="{BB962C8B-B14F-4D97-AF65-F5344CB8AC3E}">
-        <p14:creationId xmlns="" xmlns:p14="http://schemas.microsoft.com/office/powerpoint/2010/main" val="3874859315"/>
+        <p14:creationId xmlns:p14="http://schemas.microsoft.com/office/powerpoint/2010/main" val="3874859315"/>
       </p:ext>
     </p:extLst>
   </p:cSld>
@@ -2374,7 +2370,7 @@
             <a:fld id="{A08AC9C0-284C-4CD9-8972-BFFC3F420DB7}" type="datetimeFigureOut">
               <a:rPr lang="en-US" smtClean="0"/>
               <a:pPr/>
-              <a:t>2/11/2014</a:t>
+              <a:t>2/18/2014</a:t>
             </a:fld>
             <a:endParaRPr lang="en-US"/>
           </a:p>
@@ -2426,7 +2422,7 @@
     </p:spTree>
     <p:extLst>
       <p:ext uri="{BB962C8B-B14F-4D97-AF65-F5344CB8AC3E}">
-        <p14:creationId xmlns="" xmlns:p14="http://schemas.microsoft.com/office/powerpoint/2010/main" val="2919489863"/>
+        <p14:creationId xmlns:p14="http://schemas.microsoft.com/office/powerpoint/2010/main" val="2919489863"/>
       </p:ext>
     </p:extLst>
   </p:cSld>
@@ -2474,7 +2470,7 @@
             <a:fld id="{A08AC9C0-284C-4CD9-8972-BFFC3F420DB7}" type="datetimeFigureOut">
               <a:rPr lang="en-US" smtClean="0"/>
               <a:pPr/>
-              <a:t>2/11/2014</a:t>
+              <a:t>2/18/2014</a:t>
             </a:fld>
             <a:endParaRPr lang="en-US"/>
           </a:p>
@@ -2526,7 +2522,7 @@
     </p:spTree>
     <p:extLst>
       <p:ext uri="{BB962C8B-B14F-4D97-AF65-F5344CB8AC3E}">
-        <p14:creationId xmlns="" xmlns:p14="http://schemas.microsoft.com/office/powerpoint/2010/main" val="1167458238"/>
+        <p14:creationId xmlns:p14="http://schemas.microsoft.com/office/powerpoint/2010/main" val="1167458238"/>
       </p:ext>
     </p:extLst>
   </p:cSld>
@@ -2756,7 +2752,7 @@
             <a:fld id="{A08AC9C0-284C-4CD9-8972-BFFC3F420DB7}" type="datetimeFigureOut">
               <a:rPr lang="en-US" smtClean="0"/>
               <a:pPr/>
-              <a:t>2/11/2014</a:t>
+              <a:t>2/18/2014</a:t>
             </a:fld>
             <a:endParaRPr lang="en-US"/>
           </a:p>
@@ -2808,7 +2804,7 @@
     </p:spTree>
     <p:extLst>
       <p:ext uri="{BB962C8B-B14F-4D97-AF65-F5344CB8AC3E}">
-        <p14:creationId xmlns="" xmlns:p14="http://schemas.microsoft.com/office/powerpoint/2010/main" val="2811716044"/>
+        <p14:creationId xmlns:p14="http://schemas.microsoft.com/office/powerpoint/2010/main" val="2811716044"/>
       </p:ext>
     </p:extLst>
   </p:cSld>
@@ -3014,7 +3010,7 @@
             <a:fld id="{A08AC9C0-284C-4CD9-8972-BFFC3F420DB7}" type="datetimeFigureOut">
               <a:rPr lang="en-US" smtClean="0"/>
               <a:pPr/>
-              <a:t>2/11/2014</a:t>
+              <a:t>2/18/2014</a:t>
             </a:fld>
             <a:endParaRPr lang="en-US"/>
           </a:p>
@@ -3066,7 +3062,7 @@
     </p:spTree>
     <p:extLst>
       <p:ext uri="{BB962C8B-B14F-4D97-AF65-F5344CB8AC3E}">
-        <p14:creationId xmlns="" xmlns:p14="http://schemas.microsoft.com/office/powerpoint/2010/main" val="2356666417"/>
+        <p14:creationId xmlns:p14="http://schemas.microsoft.com/office/powerpoint/2010/main" val="2356666417"/>
       </p:ext>
     </p:extLst>
   </p:cSld>
@@ -3232,7 +3228,7 @@
             <a:fld id="{A08AC9C0-284C-4CD9-8972-BFFC3F420DB7}" type="datetimeFigureOut">
               <a:rPr lang="en-US" smtClean="0"/>
               <a:pPr/>
-              <a:t>2/11/2014</a:t>
+              <a:t>2/18/2014</a:t>
             </a:fld>
             <a:endParaRPr lang="en-US"/>
           </a:p>
@@ -3320,7 +3316,7 @@
     </p:spTree>
     <p:extLst>
       <p:ext uri="{BB962C8B-B14F-4D97-AF65-F5344CB8AC3E}">
-        <p14:creationId xmlns="" xmlns:p14="http://schemas.microsoft.com/office/powerpoint/2010/main" val="957811692"/>
+        <p14:creationId xmlns:p14="http://schemas.microsoft.com/office/powerpoint/2010/main" val="957811692"/>
       </p:ext>
     </p:extLst>
   </p:cSld>
@@ -3647,16 +3643,9 @@
         <p:spPr/>
         <p:txBody>
           <a:bodyPr>
-            <a:normAutofit fontScale="70000" lnSpcReduction="20000"/>
+            <a:normAutofit fontScale="85000" lnSpcReduction="20000"/>
           </a:bodyPr>
           <a:lstStyle/>
-          <a:p>
-            <a:pPr algn="l"/>
-            <a:r>
-              <a:rPr lang="en-US" dirty="0" smtClean="0"/>
-              <a:t>Group Members:</a:t>
-            </a:r>
-          </a:p>
           <a:p>
             <a:pPr algn="r"/>
             <a:r>
@@ -3705,20 +3694,20 @@
     </p:spTree>
     <p:extLst>
       <p:ext uri="{BB962C8B-B14F-4D97-AF65-F5344CB8AC3E}">
-        <p14:creationId xmlns="" xmlns:p14="http://schemas.microsoft.com/office/powerpoint/2010/main" val="1079363708"/>
+        <p14:creationId xmlns:p14="http://schemas.microsoft.com/office/powerpoint/2010/main" val="1079363708"/>
       </p:ext>
     </p:extLst>
   </p:cSld>
   <p:clrMapOvr>
     <a:masterClrMapping/>
   </p:clrMapOvr>
-  <mc:AlternateContent xmlns:mc="http://schemas.openxmlformats.org/markup-compatibility/2006">
-    <mc:Choice xmlns="" xmlns:p14="http://schemas.microsoft.com/office/powerpoint/2010/main" Requires="p14">
+  <mc:AlternateContent xmlns:mc="http://schemas.openxmlformats.org/markup-compatibility/2006" xmlns:p14="http://schemas.microsoft.com/office/powerpoint/2010/main">
+    <mc:Choice Requires="p14">
       <p:transition spd="slow" p14:dur="1500">
         <p:split orient="vert"/>
       </p:transition>
     </mc:Choice>
-    <mc:Fallback>
+    <mc:Fallback xmlns="">
       <p:transition spd="slow">
         <p:split orient="vert"/>
       </p:transition>
@@ -3768,125 +3757,45 @@
           <a:p>
             <a:r>
               <a:rPr lang="en-US" b="1" dirty="0" smtClean="0"/>
-              <a:t>Selected Use Case 4</a:t>
+              <a:t>Class Diagrams</a:t>
             </a:r>
             <a:endParaRPr lang="en-US" b="1" dirty="0"/>
           </a:p>
         </p:txBody>
       </p:sp>
-      <p:sp>
-        <p:nvSpPr>
-          <p:cNvPr id="3" name="Content Placeholder 2"/>
-          <p:cNvSpPr>
-            <a:spLocks noGrp="1"/>
-          </p:cNvSpPr>
+      <p:pic>
+        <p:nvPicPr>
+          <p:cNvPr id="4" name="Content Placeholder 3"/>
+          <p:cNvPicPr>
+            <a:picLocks noGrp="1" noChangeAspect="1"/>
+          </p:cNvPicPr>
           <p:nvPr>
             <p:ph idx="1"/>
           </p:nvPr>
-        </p:nvSpPr>
-        <p:spPr/>
-        <p:txBody>
-          <a:bodyPr>
-            <a:normAutofit fontScale="70000" lnSpcReduction="20000"/>
-          </a:bodyPr>
-          <a:lstStyle/>
-          <a:p>
-            <a:r>
-              <a:rPr lang="en-US" dirty="0" smtClean="0"/>
-              <a:t>Name: Edit Cars</a:t>
-            </a:r>
-          </a:p>
-          <a:p>
-            <a:r>
-              <a:rPr lang="en-US" dirty="0" smtClean="0"/>
-              <a:t>Actor: Admin</a:t>
-            </a:r>
-          </a:p>
-          <a:p>
-            <a:r>
-              <a:rPr lang="en-US" dirty="0" smtClean="0"/>
-              <a:t>Entry Condition: </a:t>
-            </a:r>
-          </a:p>
-          <a:p>
-            <a:pPr lvl="1"/>
-            <a:r>
-              <a:rPr lang="en-US" dirty="0" smtClean="0"/>
-              <a:t>Logged in as admin </a:t>
-            </a:r>
-          </a:p>
-          <a:p>
-            <a:pPr lvl="1"/>
-            <a:r>
-              <a:rPr lang="en-US" dirty="0" smtClean="0"/>
-              <a:t>On the page with the “Edit Cars” function</a:t>
-            </a:r>
-          </a:p>
-          <a:p>
-            <a:r>
-              <a:rPr lang="en-US" dirty="0" smtClean="0"/>
-              <a:t>Event Flow: </a:t>
-            </a:r>
-          </a:p>
-          <a:p>
-            <a:pPr lvl="1"/>
-            <a:r>
-              <a:rPr lang="en-US" dirty="0" smtClean="0"/>
-              <a:t>Admin click the “Edit Cars” button</a:t>
-            </a:r>
-          </a:p>
-          <a:p>
-            <a:pPr lvl="1"/>
-            <a:r>
-              <a:rPr lang="en-US" dirty="0" smtClean="0"/>
-              <a:t>Edit the information of the cars in the inventory</a:t>
-            </a:r>
-          </a:p>
-          <a:p>
-            <a:pPr lvl="1"/>
-            <a:r>
-              <a:rPr lang="en-US" dirty="0" smtClean="0"/>
-              <a:t>Click “Save” button to update the car’s information</a:t>
-            </a:r>
-          </a:p>
-          <a:p>
-            <a:r>
-              <a:rPr lang="en-US" dirty="0" smtClean="0"/>
-              <a:t>Exit Condition: Admin updated a car information.</a:t>
-            </a:r>
-          </a:p>
-          <a:p>
-            <a:r>
-              <a:rPr lang="en-US" dirty="0" smtClean="0"/>
-              <a:t>Exceptions: </a:t>
-            </a:r>
-          </a:p>
-          <a:p>
-            <a:pPr lvl="1"/>
-            <a:r>
-              <a:rPr lang="en-US" dirty="0" smtClean="0"/>
-              <a:t>Cancel</a:t>
-            </a:r>
-          </a:p>
-          <a:p>
-            <a:pPr lvl="1"/>
-            <a:r>
-              <a:rPr lang="en-US" dirty="0" smtClean="0"/>
-              <a:t>Repeated Unique values</a:t>
-            </a:r>
-          </a:p>
-          <a:p>
-            <a:r>
-              <a:rPr lang="en-US" dirty="0"/>
-              <a:t>Special Requirements : User must be Logged in</a:t>
-            </a:r>
-          </a:p>
-        </p:txBody>
-      </p:sp>
+        </p:nvPicPr>
+        <p:blipFill>
+          <a:blip r:embed="rId2">
+            <a:extLst>
+              <a:ext uri="{28A0092B-C50C-407E-A947-70E740481C1C}">
+                <a14:useLocalDpi xmlns:a14="http://schemas.microsoft.com/office/drawing/2010/main" val="0"/>
+              </a:ext>
+            </a:extLst>
+          </a:blip>
+          <a:stretch>
+            <a:fillRect/>
+          </a:stretch>
+        </p:blipFill>
+        <p:spPr>
+          <a:xfrm>
+            <a:off x="-457200" y="1219200"/>
+            <a:ext cx="9829800" cy="6231467"/>
+          </a:xfrm>
+        </p:spPr>
+      </p:pic>
     </p:spTree>
     <p:extLst>
       <p:ext uri="{BB962C8B-B14F-4D97-AF65-F5344CB8AC3E}">
-        <p14:creationId xmlns="" xmlns:p14="http://schemas.microsoft.com/office/powerpoint/2010/main" val="1731634201"/>
+        <p14:creationId xmlns:p14="http://schemas.microsoft.com/office/powerpoint/2010/main" val="119344913"/>
       </p:ext>
     </p:extLst>
   </p:cSld>
@@ -3948,7 +3857,7 @@
       </p:sp>
       <p:pic>
         <p:nvPicPr>
-          <p:cNvPr id="4" name="Content Placeholder 3"/>
+          <p:cNvPr id="6" name="Content Placeholder 5" descr="Capture1.JPG"/>
           <p:cNvPicPr>
             <a:picLocks noGrp="1" noChangeAspect="1"/>
           </p:cNvPicPr>
@@ -3957,28 +3866,22 @@
           </p:nvPr>
         </p:nvPicPr>
         <p:blipFill>
-          <a:blip r:embed="rId2">
-            <a:extLst>
-              <a:ext uri="{28A0092B-C50C-407E-A947-70E740481C1C}">
-                <a14:useLocalDpi xmlns="" xmlns:a14="http://schemas.microsoft.com/office/drawing/2010/main" val="0"/>
-              </a:ext>
-            </a:extLst>
-          </a:blip>
+          <a:blip r:embed="rId2"/>
           <a:stretch>
             <a:fillRect/>
           </a:stretch>
         </p:blipFill>
         <p:spPr>
           <a:xfrm>
-            <a:off x="-457200" y="1219200"/>
-            <a:ext cx="9829800" cy="6231467"/>
+            <a:off x="-76200" y="1371600"/>
+            <a:ext cx="9677399" cy="5105400"/>
           </a:xfrm>
         </p:spPr>
       </p:pic>
     </p:spTree>
     <p:extLst>
       <p:ext uri="{BB962C8B-B14F-4D97-AF65-F5344CB8AC3E}">
-        <p14:creationId xmlns="" xmlns:p14="http://schemas.microsoft.com/office/powerpoint/2010/main" val="119344913"/>
+        <p14:creationId xmlns:p14="http://schemas.microsoft.com/office/powerpoint/2010/main" val="3373920446"/>
       </p:ext>
     </p:extLst>
   </p:cSld>
@@ -4040,31 +3943,41 @@
       </p:sp>
       <p:pic>
         <p:nvPicPr>
-          <p:cNvPr id="6" name="Content Placeholder 5" descr="Capture1.JPG"/>
+          <p:cNvPr id="1026" name="Picture 2"/>
           <p:cNvPicPr>
-            <a:picLocks noGrp="1" noChangeAspect="1"/>
+            <a:picLocks noChangeAspect="1" noChangeArrowheads="1"/>
           </p:cNvPicPr>
-          <p:nvPr>
-            <p:ph idx="1"/>
-          </p:nvPr>
+          <p:nvPr/>
         </p:nvPicPr>
         <p:blipFill>
           <a:blip r:embed="rId2"/>
+          <a:srcRect/>
           <a:stretch>
             <a:fillRect/>
           </a:stretch>
         </p:blipFill>
-        <p:spPr>
+        <p:spPr bwMode="auto">
           <a:xfrm>
-            <a:off x="-76200" y="1371600"/>
-            <a:ext cx="9677399" cy="5105400"/>
+            <a:off x="533400" y="1190625"/>
+            <a:ext cx="8610601" cy="5667375"/>
           </a:xfrm>
+          <a:prstGeom prst="rect">
+            <a:avLst/>
+          </a:prstGeom>
+          <a:noFill/>
+          <a:ln w="9525">
+            <a:noFill/>
+            <a:miter lim="800000"/>
+            <a:headEnd/>
+            <a:tailEnd/>
+          </a:ln>
+          <a:effectLst/>
         </p:spPr>
       </p:pic>
     </p:spTree>
     <p:extLst>
       <p:ext uri="{BB962C8B-B14F-4D97-AF65-F5344CB8AC3E}">
-        <p14:creationId xmlns="" xmlns:p14="http://schemas.microsoft.com/office/powerpoint/2010/main" val="3373920446"/>
+        <p14:creationId xmlns:p14="http://schemas.microsoft.com/office/powerpoint/2010/main" val="3373920446"/>
       </p:ext>
     </p:extLst>
   </p:cSld>
@@ -4101,66 +4014,107 @@
           <a:chExt cx="0" cy="0"/>
         </a:xfrm>
       </p:grpSpPr>
-      <p:sp>
-        <p:nvSpPr>
-          <p:cNvPr id="2" name="Title 1"/>
-          <p:cNvSpPr>
-            <a:spLocks noGrp="1"/>
-          </p:cNvSpPr>
-          <p:nvPr>
-            <p:ph type="title"/>
-          </p:nvPr>
-        </p:nvSpPr>
-        <p:spPr/>
-        <p:txBody>
-          <a:bodyPr/>
-          <a:lstStyle/>
-          <a:p>
-            <a:r>
-              <a:rPr lang="en-US" b="1" dirty="0" smtClean="0"/>
-              <a:t>Class Diagrams</a:t>
-            </a:r>
-            <a:endParaRPr lang="en-US" b="1" dirty="0"/>
-          </a:p>
-        </p:txBody>
-      </p:sp>
       <p:pic>
         <p:nvPicPr>
-          <p:cNvPr id="1026" name="Picture 2"/>
+          <p:cNvPr id="4" name="Content Placeholder 3" descr="Capture1.JPG"/>
           <p:cNvPicPr>
-            <a:picLocks noChangeAspect="1" noChangeArrowheads="1"/>
+            <a:picLocks noGrp="1" noChangeAspect="1"/>
           </p:cNvPicPr>
-          <p:nvPr/>
+          <p:nvPr>
+            <p:ph idx="1"/>
+          </p:nvPr>
         </p:nvPicPr>
         <p:blipFill>
           <a:blip r:embed="rId2"/>
-          <a:srcRect/>
           <a:stretch>
             <a:fillRect/>
           </a:stretch>
         </p:blipFill>
-        <p:spPr bwMode="auto">
+        <p:spPr>
           <a:xfrm>
-            <a:off x="533400" y="1190625"/>
-            <a:ext cx="8610601" cy="5667375"/>
+            <a:off x="0" y="1752600"/>
+            <a:ext cx="9208741" cy="5334000"/>
+          </a:xfrm>
+        </p:spPr>
+      </p:pic>
+      <p:sp>
+        <p:nvSpPr>
+          <p:cNvPr id="6" name="Title 1"/>
+          <p:cNvSpPr txBox="1">
+            <a:spLocks/>
+          </p:cNvSpPr>
+          <p:nvPr/>
+        </p:nvSpPr>
+        <p:spPr>
+          <a:xfrm>
+            <a:off x="609600" y="427038"/>
+            <a:ext cx="8229600" cy="1143000"/>
           </a:xfrm>
           <a:prstGeom prst="rect">
             <a:avLst/>
           </a:prstGeom>
-          <a:noFill/>
-          <a:ln w="9525">
-            <a:noFill/>
-            <a:miter lim="800000"/>
-            <a:headEnd/>
-            <a:tailEnd/>
-          </a:ln>
-          <a:effectLst/>
         </p:spPr>
-      </p:pic>
+        <p:txBody>
+          <a:bodyPr vert="horz" lIns="91440" tIns="45720" rIns="91440" bIns="45720" rtlCol="0" anchor="ctr">
+            <a:normAutofit/>
+          </a:bodyPr>
+          <a:lstStyle/>
+          <a:p>
+            <a:pPr marL="0" marR="0" lvl="0" indent="0" algn="ctr" defTabSz="914400" rtl="0" eaLnBrk="1" fontAlgn="auto" latinLnBrk="0" hangingPunct="1">
+              <a:lnSpc>
+                <a:spcPct val="100000"/>
+              </a:lnSpc>
+              <a:spcBef>
+                <a:spcPct val="0"/>
+              </a:spcBef>
+              <a:spcAft>
+                <a:spcPts val="0"/>
+              </a:spcAft>
+              <a:buClrTx/>
+              <a:buSzTx/>
+              <a:buFontTx/>
+              <a:buNone/>
+              <a:tabLst/>
+              <a:defRPr/>
+            </a:pPr>
+            <a:r>
+              <a:rPr kumimoji="0" lang="en-US" sz="4400" b="1" i="0" u="none" strike="noStrike" kern="1200" cap="none" spc="0" normalizeH="0" baseline="0" noProof="0" dirty="0" smtClean="0">
+                <a:ln>
+                  <a:noFill/>
+                </a:ln>
+                <a:solidFill>
+                  <a:schemeClr val="tx1"/>
+                </a:solidFill>
+                <a:effectLst/>
+                <a:uLnTx/>
+                <a:uFillTx/>
+                <a:latin typeface="+mj-lt"/>
+                <a:ea typeface="+mj-ea"/>
+                <a:cs typeface="+mj-cs"/>
+              </a:rPr>
+              <a:t>Class Diagrams</a:t>
+            </a:r>
+            <a:endParaRPr kumimoji="0" lang="en-US" sz="4400" b="1" i="0" u="none" strike="noStrike" kern="1200" cap="none" spc="0" normalizeH="0" baseline="0" noProof="0" dirty="0">
+              <a:ln>
+                <a:noFill/>
+              </a:ln>
+              <a:solidFill>
+                <a:schemeClr val="tx1"/>
+              </a:solidFill>
+              <a:effectLst/>
+              <a:uLnTx/>
+              <a:uFillTx/>
+              <a:latin typeface="+mj-lt"/>
+              <a:ea typeface="+mj-ea"/>
+              <a:cs typeface="+mj-cs"/>
+            </a:endParaRPr>
+          </a:p>
+        </p:txBody>
+      </p:sp>
     </p:spTree>
     <p:extLst>
       <p:ext uri="{BB962C8B-B14F-4D97-AF65-F5344CB8AC3E}">
-        <p14:creationId xmlns="" xmlns:p14="http://schemas.microsoft.com/office/powerpoint/2010/main" val="3373920446"/>
+        <p14:creationId xmlns:p14="http://schemas.microsoft.com/office/powerpoint/2010/main" val="3260999506"/>
       </p:ext>
     </p:extLst>
   </p:cSld>
@@ -4197,107 +4151,99 @@
           <a:chExt cx="0" cy="0"/>
         </a:xfrm>
       </p:grpSpPr>
+      <p:sp>
+        <p:nvSpPr>
+          <p:cNvPr id="2" name="Title 1"/>
+          <p:cNvSpPr>
+            <a:spLocks noGrp="1"/>
+          </p:cNvSpPr>
+          <p:nvPr>
+            <p:ph type="title"/>
+          </p:nvPr>
+        </p:nvSpPr>
+        <p:spPr/>
+        <p:txBody>
+          <a:bodyPr/>
+          <a:lstStyle/>
+          <a:p>
+            <a:r>
+              <a:rPr lang="en-US" b="1" dirty="0" smtClean="0"/>
+              <a:t>Selected Sequence Diagram 1</a:t>
+            </a:r>
+            <a:endParaRPr lang="en-US" b="1" dirty="0"/>
+          </a:p>
+        </p:txBody>
+      </p:sp>
       <p:pic>
         <p:nvPicPr>
-          <p:cNvPr id="4" name="Content Placeholder 3" descr="Capture1.JPG"/>
+          <p:cNvPr id="1026" name="Picture 2"/>
           <p:cNvPicPr>
-            <a:picLocks noGrp="1" noChangeAspect="1"/>
+            <a:picLocks noGrp="1" noChangeAspect="1" noChangeArrowheads="1"/>
           </p:cNvPicPr>
           <p:nvPr>
             <p:ph idx="1"/>
           </p:nvPr>
         </p:nvPicPr>
         <p:blipFill>
-          <a:blip r:embed="rId2"/>
+          <a:blip r:embed="rId2">
+            <a:extLst>
+              <a:ext uri="{28A0092B-C50C-407E-A947-70E740481C1C}">
+                <a14:useLocalDpi xmlns:a14="http://schemas.microsoft.com/office/drawing/2010/main" val="0"/>
+              </a:ext>
+            </a:extLst>
+          </a:blip>
+          <a:srcRect/>
           <a:stretch>
             <a:fillRect/>
           </a:stretch>
         </p:blipFill>
-        <p:spPr>
+        <p:spPr bwMode="auto">
           <a:xfrm>
-            <a:off x="0" y="1752600"/>
-            <a:ext cx="9208741" cy="5334000"/>
-          </a:xfrm>
-        </p:spPr>
-      </p:pic>
-      <p:sp>
-        <p:nvSpPr>
-          <p:cNvPr id="6" name="Title 1"/>
-          <p:cNvSpPr txBox="1">
-            <a:spLocks/>
-          </p:cNvSpPr>
-          <p:nvPr/>
-        </p:nvSpPr>
-        <p:spPr>
-          <a:xfrm>
-            <a:off x="609600" y="427038"/>
-            <a:ext cx="8229600" cy="1143000"/>
+            <a:off x="990600" y="1371600"/>
+            <a:ext cx="7239000" cy="4876799"/>
           </a:xfrm>
           <a:prstGeom prst="rect">
             <a:avLst/>
           </a:prstGeom>
-        </p:spPr>
-        <p:txBody>
-          <a:bodyPr vert="horz" lIns="91440" tIns="45720" rIns="91440" bIns="45720" rtlCol="0" anchor="ctr">
-            <a:normAutofit/>
-          </a:bodyPr>
-          <a:lstStyle/>
-          <a:p>
-            <a:pPr marL="0" marR="0" lvl="0" indent="0" algn="ctr" defTabSz="914400" rtl="0" eaLnBrk="1" fontAlgn="auto" latinLnBrk="0" hangingPunct="1">
-              <a:lnSpc>
-                <a:spcPct val="100000"/>
-              </a:lnSpc>
-              <a:spcBef>
-                <a:spcPct val="0"/>
-              </a:spcBef>
-              <a:spcAft>
-                <a:spcPts val="0"/>
-              </a:spcAft>
-              <a:buClrTx/>
-              <a:buSzTx/>
-              <a:buFontTx/>
-              <a:buNone/>
-              <a:tabLst/>
-              <a:defRPr/>
-            </a:pPr>
-            <a:r>
-              <a:rPr kumimoji="0" lang="en-US" sz="4400" b="1" i="0" u="none" strike="noStrike" kern="1200" cap="none" spc="0" normalizeH="0" baseline="0" noProof="0" dirty="0" smtClean="0">
-                <a:ln>
-                  <a:noFill/>
-                </a:ln>
+          <a:noFill/>
+          <a:ln>
+            <a:noFill/>
+          </a:ln>
+          <a:effectLst/>
+          <a:extLst>
+            <a:ext uri="{909E8E84-426E-40DD-AFC4-6F175D3DCCD1}">
+              <a14:hiddenFill xmlns:a14="http://schemas.microsoft.com/office/drawing/2010/main">
+                <a:solidFill>
+                  <a:schemeClr val="accent1"/>
+                </a:solidFill>
+              </a14:hiddenFill>
+            </a:ext>
+            <a:ext uri="{91240B29-F687-4F45-9708-019B960494DF}">
+              <a14:hiddenLine xmlns:a14="http://schemas.microsoft.com/office/drawing/2010/main" w="9525">
                 <a:solidFill>
                   <a:schemeClr val="tx1"/>
                 </a:solidFill>
-                <a:effectLst/>
-                <a:uLnTx/>
-                <a:uFillTx/>
-                <a:latin typeface="+mj-lt"/>
-                <a:ea typeface="+mj-ea"/>
-                <a:cs typeface="+mj-cs"/>
-              </a:rPr>
-              <a:t>Class Diagrams</a:t>
-            </a:r>
-            <a:endParaRPr kumimoji="0" lang="en-US" sz="4400" b="1" i="0" u="none" strike="noStrike" kern="1200" cap="none" spc="0" normalizeH="0" baseline="0" noProof="0" dirty="0">
-              <a:ln>
-                <a:noFill/>
-              </a:ln>
-              <a:solidFill>
-                <a:schemeClr val="tx1"/>
-              </a:solidFill>
-              <a:effectLst/>
-              <a:uLnTx/>
-              <a:uFillTx/>
-              <a:latin typeface="+mj-lt"/>
-              <a:ea typeface="+mj-ea"/>
-              <a:cs typeface="+mj-cs"/>
-            </a:endParaRPr>
-          </a:p>
-        </p:txBody>
-      </p:sp>
+                <a:miter lim="800000"/>
+                <a:headEnd/>
+                <a:tailEnd/>
+              </a14:hiddenLine>
+            </a:ext>
+            <a:ext uri="{AF507438-7753-43E0-B8FC-AC1667EBCBE1}">
+              <a14:hiddenEffects xmlns:a14="http://schemas.microsoft.com/office/drawing/2010/main">
+                <a:effectLst>
+                  <a:outerShdw dist="35921" dir="2700000" algn="ctr" rotWithShape="0">
+                    <a:schemeClr val="bg2"/>
+                  </a:outerShdw>
+                </a:effectLst>
+              </a14:hiddenEffects>
+            </a:ext>
+          </a:extLst>
+        </p:spPr>
+      </p:pic>
     </p:spTree>
     <p:extLst>
       <p:ext uri="{BB962C8B-B14F-4D97-AF65-F5344CB8AC3E}">
-        <p14:creationId xmlns="" xmlns:p14="http://schemas.microsoft.com/office/powerpoint/2010/main" val="3260999506"/>
+        <p14:creationId xmlns:p14="http://schemas.microsoft.com/office/powerpoint/2010/main" val="560217405"/>
       </p:ext>
     </p:extLst>
   </p:cSld>
@@ -4351,7 +4297,7 @@
           <a:p>
             <a:r>
               <a:rPr lang="en-US" b="1" dirty="0" smtClean="0"/>
-              <a:t>Selected Sequence Diagram 1</a:t>
+              <a:t>Selected Sequence Diagram 2</a:t>
             </a:r>
             <a:endParaRPr lang="en-US" b="1" dirty="0"/>
           </a:p>
@@ -4359,31 +4305,74 @@
       </p:sp>
       <p:pic>
         <p:nvPicPr>
-          <p:cNvPr id="6" name="Content Placeholder 5" descr="SeqDiag1.PNG"/>
+          <p:cNvPr id="2050" name="Picture 2"/>
           <p:cNvPicPr>
-            <a:picLocks noGrp="1" noChangeAspect="1"/>
+            <a:picLocks noGrp="1" noChangeAspect="1" noChangeArrowheads="1"/>
           </p:cNvPicPr>
           <p:nvPr>
             <p:ph idx="1"/>
           </p:nvPr>
         </p:nvPicPr>
         <p:blipFill>
-          <a:blip r:embed="rId2"/>
+          <a:blip r:embed="rId2">
+            <a:extLst>
+              <a:ext uri="{28A0092B-C50C-407E-A947-70E740481C1C}">
+                <a14:useLocalDpi xmlns:a14="http://schemas.microsoft.com/office/drawing/2010/main" val="0"/>
+              </a:ext>
+            </a:extLst>
+          </a:blip>
+          <a:srcRect/>
           <a:stretch>
             <a:fillRect/>
           </a:stretch>
         </p:blipFill>
-        <p:spPr>
+        <p:spPr bwMode="auto">
           <a:xfrm>
-            <a:off x="457200" y="1371600"/>
-            <a:ext cx="8153400" cy="5181600"/>
+            <a:off x="990600" y="1371600"/>
+            <a:ext cx="7315200" cy="4876799"/>
           </a:xfrm>
+          <a:prstGeom prst="rect">
+            <a:avLst/>
+          </a:prstGeom>
+          <a:noFill/>
+          <a:ln>
+            <a:noFill/>
+          </a:ln>
+          <a:effectLst/>
+          <a:extLst>
+            <a:ext uri="{909E8E84-426E-40DD-AFC4-6F175D3DCCD1}">
+              <a14:hiddenFill xmlns:a14="http://schemas.microsoft.com/office/drawing/2010/main">
+                <a:solidFill>
+                  <a:schemeClr val="accent1"/>
+                </a:solidFill>
+              </a14:hiddenFill>
+            </a:ext>
+            <a:ext uri="{91240B29-F687-4F45-9708-019B960494DF}">
+              <a14:hiddenLine xmlns:a14="http://schemas.microsoft.com/office/drawing/2010/main" w="9525">
+                <a:solidFill>
+                  <a:schemeClr val="tx1"/>
+                </a:solidFill>
+                <a:miter lim="800000"/>
+                <a:headEnd/>
+                <a:tailEnd/>
+              </a14:hiddenLine>
+            </a:ext>
+            <a:ext uri="{AF507438-7753-43E0-B8FC-AC1667EBCBE1}">
+              <a14:hiddenEffects xmlns:a14="http://schemas.microsoft.com/office/drawing/2010/main">
+                <a:effectLst>
+                  <a:outerShdw dist="35921" dir="2700000" algn="ctr" rotWithShape="0">
+                    <a:schemeClr val="bg2"/>
+                  </a:outerShdw>
+                </a:effectLst>
+              </a14:hiddenEffects>
+            </a:ext>
+          </a:extLst>
         </p:spPr>
       </p:pic>
     </p:spTree>
     <p:extLst>
       <p:ext uri="{BB962C8B-B14F-4D97-AF65-F5344CB8AC3E}">
-        <p14:creationId xmlns="" xmlns:p14="http://schemas.microsoft.com/office/powerpoint/2010/main" val="560217405"/>
+        <p14:creationId xmlns:p14="http://schemas.microsoft.com/office/powerpoint/2010/main" val="560217405"/>
       </p:ext>
     </p:extLst>
   </p:cSld>
@@ -4437,161 +4426,85 @@
           <a:p>
             <a:r>
               <a:rPr lang="en-US" b="1" dirty="0" smtClean="0"/>
-              <a:t>Selected Sequence Diagram 2</a:t>
+              <a:t>Summary</a:t>
             </a:r>
             <a:endParaRPr lang="en-US" b="1" dirty="0"/>
           </a:p>
         </p:txBody>
       </p:sp>
-      <p:pic>
-        <p:nvPicPr>
-          <p:cNvPr id="6" name="Content Placeholder 5" descr="SeqDiag2.PNG"/>
-          <p:cNvPicPr>
-            <a:picLocks noGrp="1" noChangeAspect="1"/>
-          </p:cNvPicPr>
+      <p:sp>
+        <p:nvSpPr>
+          <p:cNvPr id="5" name="Content Placeholder 4"/>
+          <p:cNvSpPr>
+            <a:spLocks noGrp="1"/>
+          </p:cNvSpPr>
           <p:nvPr>
             <p:ph idx="1"/>
           </p:nvPr>
-        </p:nvPicPr>
-        <p:blipFill>
-          <a:blip r:embed="rId2"/>
-          <a:stretch>
-            <a:fillRect/>
-          </a:stretch>
-        </p:blipFill>
-        <p:spPr>
-          <a:xfrm>
-            <a:off x="381000" y="1295400"/>
-            <a:ext cx="8305800" cy="5181600"/>
-          </a:xfrm>
-        </p:spPr>
-      </p:pic>
+        </p:nvSpPr>
+        <p:spPr/>
+        <p:txBody>
+          <a:bodyPr>
+            <a:normAutofit lnSpcReduction="10000"/>
+          </a:bodyPr>
+          <a:lstStyle/>
+          <a:p>
+            <a:r>
+              <a:rPr lang="en-US" dirty="0" smtClean="0"/>
+              <a:t>Provide a tool for </a:t>
+            </a:r>
+            <a:r>
+              <a:rPr lang="en-US" dirty="0"/>
+              <a:t>Sunshine Online Car Dealer System to </a:t>
+            </a:r>
+            <a:r>
+              <a:rPr lang="en-US" dirty="0" smtClean="0"/>
+              <a:t>stay competitive </a:t>
+            </a:r>
+          </a:p>
+          <a:p>
+            <a:r>
+              <a:rPr lang="en-US" dirty="0" smtClean="0"/>
+              <a:t>Functional and Non-Functional requirements</a:t>
+            </a:r>
+          </a:p>
+          <a:p>
+            <a:r>
+              <a:rPr lang="en-US" dirty="0" smtClean="0"/>
+              <a:t>Examples of Uses Cases</a:t>
+            </a:r>
+          </a:p>
+          <a:p>
+            <a:r>
+              <a:rPr lang="en-US" dirty="0" smtClean="0"/>
+              <a:t>Constrains</a:t>
+            </a:r>
+          </a:p>
+          <a:p>
+            <a:r>
+              <a:rPr lang="en-US" dirty="0" smtClean="0"/>
+              <a:t>Object Model</a:t>
+            </a:r>
+          </a:p>
+          <a:p>
+            <a:r>
+              <a:rPr lang="en-US" dirty="0" smtClean="0"/>
+              <a:t>Dynamic Model</a:t>
+            </a:r>
+          </a:p>
+          <a:p>
+            <a:r>
+              <a:rPr lang="en-US" dirty="0" smtClean="0"/>
+              <a:t>Questions?</a:t>
+            </a:r>
+            <a:endParaRPr lang="en-US" dirty="0"/>
+          </a:p>
+        </p:txBody>
+      </p:sp>
     </p:spTree>
     <p:extLst>
       <p:ext uri="{BB962C8B-B14F-4D97-AF65-F5344CB8AC3E}">
-        <p14:creationId xmlns="" xmlns:p14="http://schemas.microsoft.com/office/powerpoint/2010/main" val="560217405"/>
-      </p:ext>
-    </p:extLst>
-  </p:cSld>
-  <p:clrMapOvr>
-    <a:masterClrMapping/>
-  </p:clrMapOvr>
-  <p:transition spd="slow">
-    <p:push dir="u"/>
-  </p:transition>
-  <p:timing>
-    <p:tnLst>
-      <p:par>
-        <p:cTn id="1" dur="indefinite" restart="never" nodeType="tmRoot"/>
-      </p:par>
-    </p:tnLst>
-  </p:timing>
-</p:sld>
-</file>
-
-<file path=ppt/slides/slide17.xml><?xml version="1.0" encoding="utf-8"?>
-<p:sld xmlns:a="http://schemas.openxmlformats.org/drawingml/2006/main" xmlns:r="http://schemas.openxmlformats.org/officeDocument/2006/relationships" xmlns:p="http://schemas.openxmlformats.org/presentationml/2006/main">
-  <p:cSld>
-    <p:spTree>
-      <p:nvGrpSpPr>
-        <p:cNvPr id="1" name=""/>
-        <p:cNvGrpSpPr/>
-        <p:nvPr/>
-      </p:nvGrpSpPr>
-      <p:grpSpPr>
-        <a:xfrm>
-          <a:off x="0" y="0"/>
-          <a:ext cx="0" cy="0"/>
-          <a:chOff x="0" y="0"/>
-          <a:chExt cx="0" cy="0"/>
-        </a:xfrm>
-      </p:grpSpPr>
-      <p:sp>
-        <p:nvSpPr>
-          <p:cNvPr id="2" name="Title 1"/>
-          <p:cNvSpPr>
-            <a:spLocks noGrp="1"/>
-          </p:cNvSpPr>
-          <p:nvPr>
-            <p:ph type="title"/>
-          </p:nvPr>
-        </p:nvSpPr>
-        <p:spPr/>
-        <p:txBody>
-          <a:bodyPr/>
-          <a:lstStyle/>
-          <a:p>
-            <a:r>
-              <a:rPr lang="en-US" b="1" dirty="0" smtClean="0"/>
-              <a:t>Summary</a:t>
-            </a:r>
-            <a:endParaRPr lang="en-US" b="1" dirty="0"/>
-          </a:p>
-        </p:txBody>
-      </p:sp>
-      <p:sp>
-        <p:nvSpPr>
-          <p:cNvPr id="5" name="Content Placeholder 4"/>
-          <p:cNvSpPr>
-            <a:spLocks noGrp="1"/>
-          </p:cNvSpPr>
-          <p:nvPr>
-            <p:ph idx="1"/>
-          </p:nvPr>
-        </p:nvSpPr>
-        <p:spPr/>
-        <p:txBody>
-          <a:bodyPr/>
-          <a:lstStyle/>
-          <a:p>
-            <a:r>
-              <a:rPr lang="en-US" dirty="0" smtClean="0"/>
-              <a:t>Provide a tool for SOCD to stay competitive </a:t>
-            </a:r>
-          </a:p>
-          <a:p>
-            <a:r>
-              <a:rPr lang="en-US" dirty="0" smtClean="0"/>
-              <a:t>Functional and Non-Functional requirements</a:t>
-            </a:r>
-          </a:p>
-          <a:p>
-            <a:r>
-              <a:rPr lang="en-US" dirty="0" smtClean="0"/>
-              <a:t>Examples of Uses Cases</a:t>
-            </a:r>
-          </a:p>
-          <a:p>
-            <a:r>
-              <a:rPr lang="en-US" dirty="0" smtClean="0"/>
-              <a:t>Constrains</a:t>
-            </a:r>
-          </a:p>
-          <a:p>
-            <a:r>
-              <a:rPr lang="en-US" dirty="0" smtClean="0"/>
-              <a:t>Object Model</a:t>
-            </a:r>
-          </a:p>
-          <a:p>
-            <a:r>
-              <a:rPr lang="en-US" dirty="0" smtClean="0"/>
-              <a:t>Dynamic Model</a:t>
-            </a:r>
-          </a:p>
-          <a:p>
-            <a:r>
-              <a:rPr lang="en-US" dirty="0" smtClean="0"/>
-              <a:t>Questions?</a:t>
-            </a:r>
-            <a:endParaRPr lang="en-US" dirty="0"/>
-          </a:p>
-        </p:txBody>
-      </p:sp>
-    </p:spTree>
-    <p:extLst>
-      <p:ext uri="{BB962C8B-B14F-4D97-AF65-F5344CB8AC3E}">
-        <p14:creationId xmlns="" xmlns:p14="http://schemas.microsoft.com/office/powerpoint/2010/main" val="650407036"/>
+        <p14:creationId xmlns:p14="http://schemas.microsoft.com/office/powerpoint/2010/main" val="650407036"/>
       </p:ext>
     </p:extLst>
   </p:cSld>
@@ -4741,7 +4654,7 @@
     </p:spTree>
     <p:extLst>
       <p:ext uri="{BB962C8B-B14F-4D97-AF65-F5344CB8AC3E}">
-        <p14:creationId xmlns="" xmlns:p14="http://schemas.microsoft.com/office/powerpoint/2010/main" val="1904782738"/>
+        <p14:creationId xmlns:p14="http://schemas.microsoft.com/office/powerpoint/2010/main" val="1904782738"/>
       </p:ext>
     </p:extLst>
   </p:cSld>
@@ -4821,11 +4734,11 @@
         </p:spPr>
         <p:txBody>
           <a:bodyPr>
-            <a:normAutofit fontScale="47500" lnSpcReduction="20000"/>
+            <a:normAutofit fontScale="55000" lnSpcReduction="20000"/>
           </a:bodyPr>
           <a:lstStyle/>
           <a:p>
-            <a:pPr>
+            <a:pPr marL="0" indent="0">
               <a:buNone/>
             </a:pPr>
             <a:endParaRPr lang="en-US" dirty="0" smtClean="0"/>
@@ -4833,9 +4746,8 @@
           <a:p>
             <a:r>
               <a:rPr lang="en-US" dirty="0" smtClean="0"/>
-              <a:t>Definition:</a:t>
-            </a:r>
-            <a:endParaRPr lang="en-US" dirty="0"/>
+              <a:t>Usability </a:t>
+            </a:r>
           </a:p>
           <a:p>
             <a:pPr lvl="1">
@@ -4853,7 +4765,17 @@
             </a:r>
             <a:r>
               <a:rPr lang="en-US" dirty="0" smtClean="0"/>
-              <a:t>sell vehicles online to user. </a:t>
+              <a:t>be available at all times and accessible from any computer connected to the internet with a browser.</a:t>
+            </a:r>
+          </a:p>
+          <a:p>
+            <a:pPr lvl="1"/>
+            <a:endParaRPr lang="en-US" dirty="0"/>
+          </a:p>
+          <a:p>
+            <a:r>
+              <a:rPr lang="en-US" dirty="0"/>
+              <a:t>Reliability</a:t>
             </a:r>
           </a:p>
           <a:p>
@@ -4864,63 +4786,6 @@
             </a:pPr>
             <a:r>
               <a:rPr lang="en-US" dirty="0" smtClean="0"/>
-              <a:t>The sell process will occurred unattended from human supervision until car is ready to be shipped.</a:t>
-            </a:r>
-          </a:p>
-          <a:p>
-            <a:pPr lvl="1">
-              <a:lnSpc>
-                <a:spcPct val="80000"/>
-              </a:lnSpc>
-            </a:pPr>
-            <a:endParaRPr lang="en-US" dirty="0"/>
-          </a:p>
-          <a:p>
-            <a:endParaRPr lang="en-US" dirty="0" smtClean="0"/>
-          </a:p>
-          <a:p>
-            <a:r>
-              <a:rPr lang="en-US" dirty="0" smtClean="0"/>
-              <a:t>Usability </a:t>
-            </a:r>
-          </a:p>
-          <a:p>
-            <a:pPr lvl="1">
-              <a:lnSpc>
-                <a:spcPct val="80000"/>
-              </a:lnSpc>
-            </a:pPr>
-            <a:r>
-              <a:rPr lang="en-US" dirty="0" smtClean="0"/>
-              <a:t>The </a:t>
-            </a:r>
-            <a:r>
-              <a:rPr lang="en-US" dirty="0"/>
-              <a:t>Sunshine Online Car Dealer System will </a:t>
-            </a:r>
-            <a:r>
-              <a:rPr lang="en-US" dirty="0" smtClean="0"/>
-              <a:t>be available at all times and accessible from any computer connected to the internet with a browser.</a:t>
-            </a:r>
-          </a:p>
-          <a:p>
-            <a:pPr lvl="1"/>
-            <a:endParaRPr lang="en-US" dirty="0"/>
-          </a:p>
-          <a:p>
-            <a:r>
-              <a:rPr lang="en-US" dirty="0"/>
-              <a:t>Reliability</a:t>
-            </a:r>
-          </a:p>
-          <a:p>
-            <a:pPr lvl="1">
-              <a:lnSpc>
-                <a:spcPct val="80000"/>
-              </a:lnSpc>
-            </a:pPr>
-            <a:r>
-              <a:rPr lang="en-US" dirty="0" smtClean="0"/>
               <a:t>The system will be a secure reliable source to make a vehicle purchase.</a:t>
             </a:r>
           </a:p>
@@ -5022,7 +4887,7 @@
     </p:spTree>
     <p:extLst>
       <p:ext uri="{BB962C8B-B14F-4D97-AF65-F5344CB8AC3E}">
-        <p14:creationId xmlns="" xmlns:p14="http://schemas.microsoft.com/office/powerpoint/2010/main" val="1366422554"/>
+        <p14:creationId xmlns:p14="http://schemas.microsoft.com/office/powerpoint/2010/main" val="1366422554"/>
       </p:ext>
     </p:extLst>
   </p:cSld>
@@ -5094,13 +4959,13 @@
         </p:nvSpPr>
         <p:spPr>
           <a:xfrm>
-            <a:off x="457200" y="1447800"/>
-            <a:ext cx="8229600" cy="5029200"/>
+            <a:off x="457200" y="1295400"/>
+            <a:ext cx="8229600" cy="5181600"/>
           </a:xfrm>
         </p:spPr>
         <p:txBody>
           <a:bodyPr>
-            <a:normAutofit fontScale="40000" lnSpcReduction="20000"/>
+            <a:noAutofit/>
           </a:bodyPr>
           <a:lstStyle/>
           <a:p>
@@ -5108,39 +4973,50 @@
               <a:buNone/>
             </a:pPr>
             <a:r>
-              <a:rPr lang="en-US" dirty="0"/>
-              <a:t>1- A Home page </a:t>
-            </a:r>
+              <a:rPr lang="en-US" sz="1600" dirty="0"/>
+              <a:t>1- The system shall have a function to search cars from the available car inventory.  The search criteria will be through selectable values, no free format input from the user</a:t>
+            </a:r>
+            <a:r>
+              <a:rPr lang="en-US" sz="1600" dirty="0" smtClean="0"/>
+              <a:t>.</a:t>
+            </a:r>
+            <a:endParaRPr lang="en-US" sz="1600" dirty="0"/>
           </a:p>
           <a:p>
             <a:pPr marL="0" indent="0">
               <a:buNone/>
             </a:pPr>
             <a:r>
-              <a:rPr lang="en-US" dirty="0"/>
-              <a:t>	a-  Function to search</a:t>
-            </a:r>
-          </a:p>
-          <a:p>
-            <a:pPr marL="0" lvl="0" indent="0">
+              <a:rPr lang="en-US" sz="1600" dirty="0"/>
+              <a:t>2 – The system shall have a function to route a user to register or login</a:t>
+            </a:r>
+            <a:r>
+              <a:rPr lang="en-US" sz="1600" dirty="0" smtClean="0"/>
+              <a:t>.</a:t>
+            </a:r>
+            <a:endParaRPr lang="en-US" sz="1600" dirty="0"/>
+          </a:p>
+          <a:p>
+            <a:pPr marL="0" indent="0">
               <a:buNone/>
             </a:pPr>
             <a:r>
-              <a:rPr lang="en-US" dirty="0" smtClean="0"/>
-              <a:t>		Make</a:t>
-            </a:r>
-            <a:r>
-              <a:rPr lang="en-US" dirty="0"/>
-              <a:t>, Model, Year, Price Range , Mileage Range, Condition(New/Used).</a:t>
-            </a:r>
+              <a:rPr lang="en-US" sz="1600" dirty="0"/>
+              <a:t>3 - The system shall display the search result (from requirement 1) with the basic car information</a:t>
+            </a:r>
+            <a:r>
+              <a:rPr lang="en-US" sz="1600" dirty="0" smtClean="0"/>
+              <a:t>.</a:t>
+            </a:r>
+            <a:endParaRPr lang="en-US" sz="1600" dirty="0"/>
           </a:p>
           <a:p>
             <a:pPr marL="0" indent="0">
               <a:buNone/>
             </a:pPr>
             <a:r>
-              <a:rPr lang="en-US" dirty="0"/>
-              <a:t>	b-  Function to route user to register/login.</a:t>
+              <a:rPr lang="en-US" sz="1600" dirty="0"/>
+              <a:t>4 - The system shall allow the user to request a more detailed car information per car within the search results from functional requirement 3, which will return a page with pictures of the car, basic car information and additional notes.  </a:t>
             </a:r>
           </a:p>
           <a:p>
@@ -5148,17 +5024,22 @@
               <a:buNone/>
             </a:pPr>
             <a:r>
-              <a:rPr lang="en-US" dirty="0"/>
-              <a:t>2- A Search Results Page</a:t>
-            </a:r>
+              <a:rPr lang="en-US" sz="1600" dirty="0"/>
+              <a:t>5 - The system shall have a function to purchase a car.  To purchase a car, a user must be registered and logged in</a:t>
+            </a:r>
+            <a:r>
+              <a:rPr lang="en-US" sz="1600" dirty="0" smtClean="0"/>
+              <a:t>.</a:t>
+            </a:r>
+            <a:endParaRPr lang="en-US" sz="1600" dirty="0"/>
           </a:p>
           <a:p>
             <a:pPr marL="0" indent="0">
               <a:buNone/>
             </a:pPr>
             <a:r>
-              <a:rPr lang="en-US" dirty="0"/>
-              <a:t>	a- List of cars with basic car information Year, Model, Condition, Make, Model, Price, Mileage,  </a:t>
+              <a:rPr lang="en-US" sz="1600" dirty="0"/>
+              <a:t>6 – The system shall allow a user to register and/or login.</a:t>
             </a:r>
           </a:p>
           <a:p>
@@ -5166,16 +5047,8 @@
               <a:buNone/>
             </a:pPr>
             <a:r>
-              <a:rPr lang="en-US" dirty="0"/>
-              <a:t>	b- A detailed selected car information page with pictures of the car.  Will show all of the basic information </a:t>
-            </a:r>
-            <a:r>
-              <a:rPr lang="en-US" dirty="0" smtClean="0"/>
-              <a:t>		as </a:t>
-            </a:r>
-            <a:r>
-              <a:rPr lang="en-US" dirty="0"/>
-              <a:t>well as pictures and additional notes.</a:t>
+              <a:rPr lang="en-US" sz="1600" dirty="0"/>
+              <a:t>7 – The system shall allow a user to reset the login password in case it is forgotten.</a:t>
             </a:r>
           </a:p>
           <a:p>
@@ -5183,8 +5056,8 @@
               <a:buNone/>
             </a:pPr>
             <a:r>
-              <a:rPr lang="en-US" dirty="0"/>
-              <a:t>	c- Button to select car and continue to purchase.</a:t>
+              <a:rPr lang="en-US" sz="1600" dirty="0"/>
+              <a:t>8 – The system shall display an order confirmation after the user submits the payment information.</a:t>
             </a:r>
           </a:p>
           <a:p>
@@ -5192,24 +5065,8 @@
               <a:buNone/>
             </a:pPr>
             <a:r>
-              <a:rPr lang="en-US" dirty="0"/>
-              <a:t>	d- If user is not logged in, the user will be taken to register/login page.  Car selection must be saved in the </a:t>
-            </a:r>
-            <a:r>
-              <a:rPr lang="en-US" dirty="0" smtClean="0"/>
-              <a:t>		user </a:t>
-            </a:r>
-            <a:r>
-              <a:rPr lang="en-US" dirty="0"/>
-              <a:t>session so that </a:t>
-            </a:r>
-            <a:r>
-              <a:rPr lang="en-US" dirty="0" smtClean="0"/>
-              <a:t>once </a:t>
-            </a:r>
-            <a:r>
-              <a:rPr lang="en-US" dirty="0"/>
-              <a:t>logged in/registered the user can see the car selected previously.</a:t>
+              <a:rPr lang="en-US" sz="1600" dirty="0"/>
+              <a:t>9 - The system shall allow the user to update its profile information.</a:t>
             </a:r>
           </a:p>
           <a:p>
@@ -5217,30 +5074,26 @@
               <a:buNone/>
             </a:pPr>
             <a:r>
-              <a:rPr lang="en-US" dirty="0"/>
-              <a:t>3-  A Login page</a:t>
-            </a:r>
-          </a:p>
-          <a:p>
-            <a:pPr marL="457200" lvl="1" indent="0">
+              <a:rPr lang="en-US" sz="1600" dirty="0"/>
+              <a:t>10 – The system shall provide and administration portal.</a:t>
+            </a:r>
+          </a:p>
+          <a:p>
+            <a:pPr marL="0" indent="0">
               <a:buNone/>
             </a:pPr>
             <a:r>
-              <a:rPr lang="en-US" dirty="0"/>
-              <a:t>Fields to enter User Name and password.  Links to forgot username/password and to register.</a:t>
-            </a:r>
-          </a:p>
-          <a:p>
-            <a:pPr marL="457200" lvl="1" indent="0">
+              <a:rPr lang="en-US" sz="1600" dirty="0"/>
+              <a:t>11 – The system shall allow the creation of additional administrators.</a:t>
+            </a:r>
+          </a:p>
+          <a:p>
+            <a:pPr marL="0" indent="0">
               <a:buNone/>
             </a:pPr>
             <a:r>
-              <a:rPr lang="en-US" b="1" dirty="0"/>
-              <a:t>Note:</a:t>
-            </a:r>
-            <a:r>
-              <a:rPr lang="en-US" dirty="0"/>
-              <a:t> Both regular users or site administrator users can log in through this page.</a:t>
+              <a:rPr lang="en-US" sz="1600" dirty="0"/>
+              <a:t>12 – The system shall allow the administrator to view/edit/delete all registered users.</a:t>
             </a:r>
           </a:p>
           <a:p>
@@ -5248,94 +5101,25 @@
               <a:buNone/>
             </a:pPr>
             <a:r>
-              <a:rPr lang="en-US" dirty="0"/>
-              <a:t>4- A Registration page</a:t>
-            </a:r>
-          </a:p>
-          <a:p>
-            <a:pPr marL="457200" lvl="1" indent="0">
+              <a:rPr lang="en-US" sz="1600" dirty="0"/>
+              <a:t>13 – The system shall allow the administrator to view/edit/delete the car inventory.</a:t>
+            </a:r>
+          </a:p>
+          <a:p>
+            <a:pPr marL="0" indent="0">
               <a:buNone/>
             </a:pPr>
             <a:r>
-              <a:rPr lang="en-US" dirty="0"/>
-              <a:t>Fields:  first name, last name, date of birth, phone, billing address,  shipping address, email,</a:t>
-            </a:r>
-          </a:p>
-          <a:p>
-            <a:pPr marL="457200" lvl="1" indent="0">
-              <a:buNone/>
-            </a:pPr>
-            <a:r>
-              <a:rPr lang="en-US" dirty="0"/>
-              <a:t>user name, password, password confirmation.</a:t>
-            </a:r>
-          </a:p>
-          <a:p>
-            <a:pPr marL="0" indent="0">
-              <a:buNone/>
-            </a:pPr>
-            <a:r>
-              <a:rPr lang="en-US" dirty="0"/>
-              <a:t>5- A purchase page</a:t>
-            </a:r>
-          </a:p>
-          <a:p>
-            <a:pPr marL="457200" lvl="1" indent="0">
-              <a:buNone/>
-            </a:pPr>
-            <a:r>
-              <a:rPr lang="en-US" dirty="0"/>
-              <a:t>Car details information, Car price, Delivery charges, taxes, grand total, Shipping Address,  Payment information(Card holder's full Name, Card type, Card Number, Expiration Date, CVV code, Billing address.),  confirmation/cancel buttons.</a:t>
-            </a:r>
-          </a:p>
-          <a:p>
-            <a:pPr marL="0" indent="0">
-              <a:buNone/>
-            </a:pPr>
-            <a:r>
-              <a:rPr lang="en-US" dirty="0"/>
-              <a:t>6- A Payment confirmation Page.</a:t>
-            </a:r>
-          </a:p>
-          <a:p>
-            <a:pPr marL="0" lvl="0" indent="0">
-              <a:buNone/>
-            </a:pPr>
-            <a:r>
-              <a:rPr lang="en-US" dirty="0"/>
-              <a:t>Car detail information, Total amount paid, receipt number, delivery date, delivery address.</a:t>
-            </a:r>
-          </a:p>
-          <a:p>
-            <a:pPr marL="0" indent="0">
-              <a:buNone/>
-            </a:pPr>
-            <a:r>
-              <a:rPr lang="en-US" dirty="0"/>
-              <a:t>7- A customer profile page</a:t>
-            </a:r>
-          </a:p>
-          <a:p>
-            <a:pPr marL="457200" lvl="1" indent="0">
-              <a:buNone/>
-            </a:pPr>
-            <a:r>
-              <a:rPr lang="en-US" dirty="0"/>
-              <a:t>Customer details, change password option,  option to update customer details information.</a:t>
-            </a:r>
-          </a:p>
-          <a:p>
-            <a:pPr marL="0" indent="0">
-              <a:buNone/>
-            </a:pPr>
-            <a:endParaRPr lang="en-US" dirty="0"/>
+              <a:rPr lang="en-US" sz="1600" dirty="0"/>
+              <a:t>14 – The system shall allow the administrator to generate a sales report in a valid date range.</a:t>
+            </a:r>
           </a:p>
         </p:txBody>
       </p:sp>
     </p:spTree>
     <p:extLst>
       <p:ext uri="{BB962C8B-B14F-4D97-AF65-F5344CB8AC3E}">
-        <p14:creationId xmlns="" xmlns:p14="http://schemas.microsoft.com/office/powerpoint/2010/main" val="1018291567"/>
+        <p14:creationId xmlns:p14="http://schemas.microsoft.com/office/powerpoint/2010/main" val="1018291567"/>
       </p:ext>
     </p:extLst>
   </p:cSld>
@@ -5389,7 +5173,7 @@
           <a:p>
             <a:r>
               <a:rPr lang="en-US" b="1" dirty="0" smtClean="0"/>
-              <a:t>Functional Requirements</a:t>
+              <a:t>Constraints</a:t>
             </a:r>
             <a:endParaRPr lang="en-US" b="1" dirty="0"/>
           </a:p>
@@ -5405,251 +5189,104 @@
             <p:ph idx="1"/>
           </p:nvPr>
         </p:nvSpPr>
-        <p:spPr>
-          <a:xfrm>
-            <a:off x="457200" y="1447800"/>
-            <a:ext cx="8229600" cy="5029200"/>
-          </a:xfrm>
-        </p:spPr>
+        <p:spPr/>
         <p:txBody>
           <a:bodyPr>
-            <a:normAutofit fontScale="40000" lnSpcReduction="20000"/>
+            <a:normAutofit/>
           </a:bodyPr>
           <a:lstStyle/>
           <a:p>
-            <a:pPr marL="0" indent="0">
-              <a:buNone/>
+            <a:pPr lvl="1">
+              <a:lnSpc>
+                <a:spcPct val="80000"/>
+              </a:lnSpc>
             </a:pPr>
             <a:r>
+              <a:rPr lang="en-US" dirty="0" smtClean="0"/>
+              <a:t>The </a:t>
+            </a:r>
+            <a:r>
+              <a:rPr lang="en-US" dirty="0" smtClean="0"/>
+              <a:t>systems interface must be any web browser.</a:t>
+            </a:r>
+          </a:p>
+          <a:p>
+            <a:pPr lvl="1">
+              <a:lnSpc>
+                <a:spcPct val="80000"/>
+              </a:lnSpc>
+            </a:pPr>
+            <a:r>
               <a:rPr lang="en-US" dirty="0"/>
-              <a:t>8- Logged in Admin home page</a:t>
-            </a:r>
-          </a:p>
-          <a:p>
-            <a:pPr marL="457200" lvl="1" indent="0">
-              <a:buNone/>
+              <a:t>Sunshine Online Car Dealer System must </a:t>
+            </a:r>
+            <a:r>
+              <a:rPr lang="en-US" dirty="0" smtClean="0"/>
+              <a:t>contain a </a:t>
+            </a:r>
+            <a:r>
+              <a:rPr lang="en-US" dirty="0" err="1" smtClean="0"/>
+              <a:t>mySQL</a:t>
+            </a:r>
+            <a:r>
+              <a:rPr lang="en-US" dirty="0" smtClean="0"/>
+              <a:t> database  with at least one user as Administrator.</a:t>
+            </a:r>
+          </a:p>
+          <a:p>
+            <a:pPr lvl="1">
+              <a:lnSpc>
+                <a:spcPct val="80000"/>
+              </a:lnSpc>
             </a:pPr>
             <a:r>
+              <a:rPr lang="en-US" dirty="0" smtClean="0"/>
+              <a:t>It will assign a session to every user accessing a domain web page.</a:t>
+            </a:r>
+          </a:p>
+          <a:p>
+            <a:pPr lvl="1">
+              <a:lnSpc>
+                <a:spcPct val="80000"/>
+              </a:lnSpc>
+            </a:pPr>
+            <a:r>
+              <a:rPr lang="en-US" dirty="0" smtClean="0"/>
+              <a:t>It has to be capable to support three types of user (Guest,  Customer &amp; Admin)</a:t>
+            </a:r>
+          </a:p>
+          <a:p>
+            <a:pPr lvl="1">
+              <a:lnSpc>
+                <a:spcPct val="80000"/>
+              </a:lnSpc>
+            </a:pPr>
+            <a:r>
+              <a:rPr lang="en-US" dirty="0" smtClean="0"/>
+              <a:t>The </a:t>
+            </a:r>
+            <a:r>
               <a:rPr lang="en-US" dirty="0"/>
-              <a:t>Buttons:  Add Admin user, Registered Users, Car Inventory, Reports.</a:t>
-            </a:r>
-          </a:p>
-          <a:p>
-            <a:pPr marL="0" indent="0">
-              <a:buNone/>
+              <a:t>Sunshine Online Car Dealer System will </a:t>
+            </a:r>
+            <a:r>
+              <a:rPr lang="en-US" dirty="0" smtClean="0"/>
+              <a:t>sell cars with minimal human supervision.</a:t>
+            </a:r>
+          </a:p>
+          <a:p>
+            <a:pPr lvl="1">
+              <a:lnSpc>
+                <a:spcPct val="80000"/>
+              </a:lnSpc>
             </a:pPr>
             <a:r>
-              <a:rPr lang="en-US" dirty="0"/>
-              <a:t>9-Add Admin page</a:t>
-            </a:r>
-          </a:p>
-          <a:p>
-            <a:pPr marL="457200" lvl="1" indent="0">
-              <a:buNone/>
-            </a:pPr>
-            <a:r>
-              <a:rPr lang="en-US" dirty="0"/>
-              <a:t>Fields:  first name, last name, description, active/inactive. Password, password confirmation.</a:t>
-            </a:r>
-          </a:p>
-          <a:p>
-            <a:pPr marL="0" indent="0">
-              <a:buNone/>
-            </a:pPr>
-            <a:r>
-              <a:rPr lang="en-US" dirty="0"/>
-              <a:t>10- Registered User page</a:t>
-            </a:r>
-          </a:p>
-          <a:p>
-            <a:pPr marL="457200" lvl="1" indent="0">
-              <a:buNone/>
-            </a:pPr>
-            <a:r>
-              <a:rPr lang="en-US" dirty="0"/>
-              <a:t>List of all users, user name, first name, last name, type of user, buttons to delete or update selected user.</a:t>
-            </a:r>
-          </a:p>
-          <a:p>
-            <a:pPr marL="0" indent="0">
-              <a:buNone/>
-            </a:pPr>
-            <a:r>
-              <a:rPr lang="en-US" dirty="0"/>
-              <a:t>11- Car Inventory</a:t>
-            </a:r>
-          </a:p>
-          <a:p>
-            <a:pPr marL="457200" lvl="1" indent="0">
-              <a:buNone/>
-            </a:pPr>
-            <a:r>
-              <a:rPr lang="en-US" dirty="0"/>
-              <a:t>Displays list of all available inventory (Sorted by make, model, condition).  Option to</a:t>
-            </a:r>
-          </a:p>
-          <a:p>
-            <a:pPr marL="0" indent="0">
-              <a:buNone/>
-            </a:pPr>
-            <a:r>
-              <a:rPr lang="en-US" dirty="0"/>
-              <a:t>	update/delete selected inventory item.  Option to add a new car to inventory.</a:t>
-            </a:r>
-          </a:p>
-          <a:p>
-            <a:pPr marL="0" indent="0">
-              <a:buNone/>
-            </a:pPr>
-            <a:r>
-              <a:rPr lang="en-US" dirty="0"/>
-              <a:t>12- Add Car inventory page</a:t>
-            </a:r>
-          </a:p>
-          <a:p>
-            <a:pPr marL="457200" lvl="1" indent="0">
-              <a:buNone/>
-            </a:pPr>
-            <a:r>
-              <a:rPr lang="en-US" dirty="0"/>
-              <a:t>Fields:  Car details, car pictures path.</a:t>
-            </a:r>
-          </a:p>
-          <a:p>
-            <a:pPr marL="0" indent="0">
-              <a:buNone/>
-            </a:pPr>
-            <a:r>
-              <a:rPr lang="en-US" dirty="0"/>
-              <a:t> </a:t>
-            </a:r>
-          </a:p>
-          <a:p>
-            <a:pPr marL="0" indent="0">
-              <a:buNone/>
-            </a:pPr>
-            <a:r>
-              <a:rPr lang="en-US" dirty="0"/>
-              <a:t>13- Reports page</a:t>
-            </a:r>
-          </a:p>
-          <a:p>
-            <a:pPr marL="0" lvl="0" indent="0">
-              <a:buNone/>
-            </a:pPr>
-            <a:r>
-              <a:rPr lang="en-US" dirty="0" smtClean="0"/>
-              <a:t>	Option </a:t>
-            </a:r>
-            <a:r>
-              <a:rPr lang="en-US" dirty="0"/>
-              <a:t>to print Sales made current day, week, current month, current year, date range.</a:t>
-            </a:r>
-          </a:p>
-          <a:p>
-            <a:pPr marL="0" indent="0">
-              <a:buNone/>
-            </a:pPr>
-            <a:r>
-              <a:rPr lang="en-US" dirty="0"/>
-              <a:t> </a:t>
-            </a:r>
-          </a:p>
-          <a:p>
-            <a:pPr marL="0" indent="0">
-              <a:buNone/>
-            </a:pPr>
-            <a:r>
-              <a:rPr lang="en-US" b="1" dirty="0"/>
-              <a:t>Definitions:</a:t>
+              <a:rPr lang="en-US" dirty="0" smtClean="0"/>
+              <a:t>The system will sell 1 car a time.</a:t>
             </a:r>
             <a:endParaRPr lang="en-US" dirty="0"/>
           </a:p>
           <a:p>
-            <a:pPr marL="0" indent="0">
-              <a:buNone/>
-            </a:pPr>
-            <a:r>
-              <a:rPr lang="en-US" dirty="0"/>
-              <a:t> </a:t>
-            </a:r>
-          </a:p>
-          <a:p>
-            <a:r>
-              <a:rPr lang="en-US" dirty="0"/>
-              <a:t>Car Details:   Includes all of the following fields:  Make, Model, Year, Condition, Mileage, Price</a:t>
-            </a:r>
-            <a:r>
-              <a:rPr lang="en-US" dirty="0" smtClean="0"/>
-              <a:t>, Color,  </a:t>
-            </a:r>
-            <a:r>
-              <a:rPr lang="en-US" dirty="0"/>
-              <a:t>Car item Number(car id).</a:t>
-            </a:r>
-          </a:p>
-          <a:p>
-            <a:pPr marL="0" indent="0">
-              <a:buNone/>
-            </a:pPr>
-            <a:endParaRPr lang="en-US" dirty="0"/>
-          </a:p>
-          <a:p>
-            <a:r>
-              <a:rPr lang="en-US" dirty="0"/>
-              <a:t>Customer Details:  Includes all of the following fields:  User Name, First Name, Last Name, Billing/Shipping address, email address, Date of </a:t>
-            </a:r>
-            <a:r>
-              <a:rPr lang="en-US" dirty="0" smtClean="0"/>
-              <a:t>Birth.</a:t>
-            </a:r>
-          </a:p>
-          <a:p>
-            <a:pPr marL="0" indent="0">
-              <a:buNone/>
-            </a:pPr>
-            <a:r>
-              <a:rPr lang="en-US" dirty="0" smtClean="0"/>
-              <a:t> </a:t>
-            </a:r>
-          </a:p>
-          <a:p>
-            <a:r>
-              <a:rPr lang="en-US" dirty="0" smtClean="0"/>
-              <a:t>Global </a:t>
-            </a:r>
-            <a:r>
-              <a:rPr lang="en-US" dirty="0"/>
-              <a:t>page features:   Back to home button, Logo of the </a:t>
-            </a:r>
-            <a:r>
-              <a:rPr lang="en-US" dirty="0" smtClean="0"/>
-              <a:t>company (On </a:t>
-            </a:r>
-            <a:r>
-              <a:rPr lang="en-US" dirty="0"/>
-              <a:t>the upper right hand corner of </a:t>
-            </a:r>
-            <a:r>
-              <a:rPr lang="en-US" dirty="0" smtClean="0"/>
-              <a:t>page) and </a:t>
-            </a:r>
-            <a:r>
-              <a:rPr lang="en-US" dirty="0"/>
-              <a:t>option to </a:t>
-            </a:r>
-            <a:r>
-              <a:rPr lang="en-US" dirty="0" smtClean="0"/>
-              <a:t>update the profile of a  </a:t>
-            </a:r>
-            <a:r>
-              <a:rPr lang="en-US" dirty="0"/>
-              <a:t>logged in </a:t>
-            </a:r>
-            <a:r>
-              <a:rPr lang="en-US" dirty="0" smtClean="0"/>
-              <a:t>user.</a:t>
-            </a:r>
             <a:endParaRPr lang="en-US" dirty="0"/>
           </a:p>
         </p:txBody>
@@ -5657,7 +5294,7 @@
     </p:spTree>
     <p:extLst>
       <p:ext uri="{BB962C8B-B14F-4D97-AF65-F5344CB8AC3E}">
-        <p14:creationId xmlns="" xmlns:p14="http://schemas.microsoft.com/office/powerpoint/2010/main" val="2400752179"/>
+        <p14:creationId xmlns:p14="http://schemas.microsoft.com/office/powerpoint/2010/main" val="1457262062"/>
       </p:ext>
     </p:extLst>
   </p:cSld>
@@ -5711,7 +5348,7 @@
           <a:p>
             <a:r>
               <a:rPr lang="en-US" b="1" dirty="0" smtClean="0"/>
-              <a:t>Constraints</a:t>
+              <a:t>Selected Use Case 1</a:t>
             </a:r>
             <a:endParaRPr lang="en-US" b="1" dirty="0"/>
           </a:p>
@@ -5727,93 +5364,177 @@
             <p:ph idx="1"/>
           </p:nvPr>
         </p:nvSpPr>
-        <p:spPr/>
+        <p:spPr>
+          <a:xfrm>
+            <a:off x="457200" y="1371600"/>
+            <a:ext cx="8229600" cy="5334000"/>
+          </a:xfrm>
+        </p:spPr>
         <p:txBody>
           <a:bodyPr>
-            <a:normAutofit fontScale="92500"/>
+            <a:normAutofit fontScale="62500" lnSpcReduction="20000"/>
           </a:bodyPr>
           <a:lstStyle/>
           <a:p>
             <a:r>
               <a:rPr lang="en-US" dirty="0" smtClean="0"/>
-              <a:t>Client Constraints:</a:t>
-            </a:r>
-          </a:p>
-          <a:p>
-            <a:pPr lvl="1">
-              <a:lnSpc>
-                <a:spcPct val="80000"/>
-              </a:lnSpc>
+              <a:t>Name: Login</a:t>
+            </a:r>
+          </a:p>
+          <a:p>
+            <a:r>
+              <a:rPr lang="en-US" dirty="0" smtClean="0"/>
+              <a:t>Actor: User/Admin</a:t>
+            </a:r>
+          </a:p>
+          <a:p>
+            <a:r>
+              <a:rPr lang="en-US" dirty="0" smtClean="0"/>
+              <a:t>Entry Condition: </a:t>
+            </a:r>
+          </a:p>
+          <a:p>
+            <a:pPr lvl="1"/>
+            <a:r>
+              <a:rPr lang="en-US" dirty="0" smtClean="0"/>
+              <a:t>User/Admin must be at the login web page of Sunshine Online Car Dealer System.</a:t>
+            </a:r>
+          </a:p>
+          <a:p>
+            <a:pPr lvl="1"/>
+            <a:r>
+              <a:rPr lang="en-US" dirty="0" smtClean="0"/>
+              <a:t>User/Admin has a valid username and password.</a:t>
+            </a:r>
+          </a:p>
+          <a:p>
+            <a:r>
+              <a:rPr lang="en-US" dirty="0" smtClean="0"/>
+              <a:t>Event Flow: </a:t>
+            </a:r>
+          </a:p>
+          <a:p>
+            <a:pPr lvl="1"/>
+            <a:r>
+              <a:rPr lang="en-US" dirty="0" smtClean="0"/>
+              <a:t>User/Admin input username and password into the Login web page.</a:t>
+            </a:r>
+          </a:p>
+          <a:p>
+            <a:pPr lvl="1"/>
+            <a:r>
+              <a:rPr lang="en-US" dirty="0" smtClean="0"/>
+              <a:t>Sunshine Online Car Dealer System </a:t>
+            </a:r>
+            <a:r>
+              <a:rPr lang="en-US" dirty="0"/>
+              <a:t>match username/password entered with list of stored </a:t>
+            </a:r>
+            <a:r>
+              <a:rPr lang="en-US" dirty="0" smtClean="0"/>
+              <a:t>users/admin.</a:t>
+            </a:r>
+          </a:p>
+          <a:p>
+            <a:pPr lvl="1"/>
+            <a:r>
+              <a:rPr lang="en-US" dirty="0"/>
+              <a:t>Sunshine </a:t>
+            </a:r>
+            <a:r>
+              <a:rPr lang="en-US" dirty="0" smtClean="0"/>
+              <a:t>Online Car Dealer System logs User/Admin</a:t>
+            </a:r>
+            <a:r>
+              <a:rPr lang="en-US" dirty="0"/>
+              <a:t> into the system</a:t>
+            </a:r>
+            <a:r>
+              <a:rPr lang="en-US" dirty="0" smtClean="0"/>
+              <a:t>.</a:t>
+            </a:r>
+          </a:p>
+          <a:p>
+            <a:pPr lvl="1"/>
+            <a:r>
+              <a:rPr lang="en-US" dirty="0" smtClean="0"/>
+              <a:t>User/Admin </a:t>
+            </a:r>
+            <a:r>
+              <a:rPr lang="en-US" dirty="0"/>
+              <a:t> are </a:t>
+            </a:r>
+            <a:r>
+              <a:rPr lang="en-US" dirty="0" smtClean="0"/>
+              <a:t>redirected </a:t>
+            </a:r>
+            <a:r>
+              <a:rPr lang="en-US" dirty="0"/>
+              <a:t>to home/index </a:t>
+            </a:r>
+            <a:r>
+              <a:rPr lang="en-US" dirty="0" smtClean="0"/>
+              <a:t>web </a:t>
+            </a:r>
+            <a:r>
+              <a:rPr lang="en-US" dirty="0"/>
+              <a:t>page </a:t>
+            </a:r>
+            <a:r>
+              <a:rPr lang="en-US" dirty="0" smtClean="0"/>
+              <a:t>or into the requested page showing </a:t>
+            </a:r>
+            <a:r>
+              <a:rPr lang="en-US" dirty="0"/>
+              <a:t>a logged in status.</a:t>
+            </a:r>
+            <a:endParaRPr lang="en-US" dirty="0" smtClean="0"/>
+          </a:p>
+          <a:p>
+            <a:r>
+              <a:rPr lang="en-US" dirty="0" smtClean="0"/>
+              <a:t>Exit Condition: User/Admin</a:t>
+            </a:r>
+            <a:r>
+              <a:rPr lang="en-US" dirty="0"/>
+              <a:t> is logged into Sunshine </a:t>
+            </a:r>
+            <a:r>
+              <a:rPr lang="en-US" dirty="0" smtClean="0"/>
+              <a:t>Online Car Dealer System.</a:t>
+            </a:r>
+          </a:p>
+          <a:p>
+            <a:r>
+              <a:rPr lang="en-US" dirty="0" smtClean="0"/>
+              <a:t>Exceptions: </a:t>
+            </a:r>
+          </a:p>
+          <a:p>
+            <a:pPr lvl="1"/>
+            <a:r>
+              <a:rPr lang="en-US" dirty="0" smtClean="0"/>
+              <a:t>Cancel</a:t>
+            </a:r>
+          </a:p>
+          <a:p>
+            <a:pPr lvl="1"/>
+            <a:r>
+              <a:rPr lang="en-US" dirty="0" smtClean="0"/>
+              <a:t>“Wrong Username/Password”</a:t>
+            </a:r>
+          </a:p>
+          <a:p>
+            <a:pPr lvl="1"/>
+            <a:r>
+              <a:rPr lang="en-US" dirty="0" smtClean="0"/>
+              <a:t>“No connectivity”</a:t>
+            </a:r>
+          </a:p>
+          <a:p>
+            <a:pPr marL="0" indent="0">
+              <a:buNone/>
             </a:pPr>
-            <a:r>
-              <a:rPr lang="en-US" dirty="0" smtClean="0"/>
-              <a:t>The systems interface must be any web browser.</a:t>
-            </a:r>
-          </a:p>
-          <a:p>
-            <a:pPr lvl="1">
-              <a:lnSpc>
-                <a:spcPct val="80000"/>
-              </a:lnSpc>
-            </a:pPr>
-            <a:r>
-              <a:rPr lang="en-US" dirty="0" smtClean="0"/>
-              <a:t>Sunshine Online Car Dealer System must contain a </a:t>
-            </a:r>
-            <a:r>
-              <a:rPr lang="en-US" dirty="0" err="1" smtClean="0"/>
-              <a:t>mySQL</a:t>
-            </a:r>
-            <a:r>
-              <a:rPr lang="en-US" dirty="0" smtClean="0"/>
-              <a:t> database  with at least one user as Administrator.</a:t>
-            </a:r>
-          </a:p>
-          <a:p>
-            <a:pPr lvl="1">
-              <a:lnSpc>
-                <a:spcPct val="80000"/>
-              </a:lnSpc>
-            </a:pPr>
-            <a:r>
-              <a:rPr lang="en-US" dirty="0" smtClean="0"/>
-              <a:t>It must assign a session to every user accessing a domain web page.</a:t>
-            </a:r>
-          </a:p>
-          <a:p>
-            <a:pPr lvl="1">
-              <a:lnSpc>
-                <a:spcPct val="80000"/>
-              </a:lnSpc>
-            </a:pPr>
-            <a:r>
-              <a:rPr lang="en-US" dirty="0" smtClean="0"/>
-              <a:t>It has to be capable to support three types of user (Guest,  Customer &amp; Admin)</a:t>
-            </a:r>
-          </a:p>
-          <a:p>
-            <a:pPr lvl="1">
-              <a:lnSpc>
-                <a:spcPct val="80000"/>
-              </a:lnSpc>
-            </a:pPr>
-            <a:r>
-              <a:rPr lang="en-US" dirty="0" smtClean="0"/>
-              <a:t>The Sunshine Online Car Dealer System has to sell cars with minimal human supervision.</a:t>
-            </a:r>
-          </a:p>
-          <a:p>
-            <a:pPr lvl="1">
-              <a:lnSpc>
-                <a:spcPct val="80000"/>
-              </a:lnSpc>
-            </a:pPr>
-            <a:r>
-              <a:rPr lang="en-US" dirty="0" smtClean="0"/>
-              <a:t>The system sells 1 car at a time per user transaction.</a:t>
-            </a:r>
-          </a:p>
-          <a:p>
             <a:endParaRPr lang="en-US" dirty="0"/>
           </a:p>
         </p:txBody>
@@ -5821,7 +5542,7 @@
     </p:spTree>
     <p:extLst>
       <p:ext uri="{BB962C8B-B14F-4D97-AF65-F5344CB8AC3E}">
-        <p14:creationId xmlns="" xmlns:p14="http://schemas.microsoft.com/office/powerpoint/2010/main" val="1457262062"/>
+        <p14:creationId xmlns:p14="http://schemas.microsoft.com/office/powerpoint/2010/main" val="2554732056"/>
       </p:ext>
     </p:extLst>
   </p:cSld>
@@ -5875,7 +5596,7 @@
           <a:p>
             <a:r>
               <a:rPr lang="en-US" b="1" dirty="0" smtClean="0"/>
-              <a:t>Selected Use Case 1</a:t>
+              <a:t>Selected Use Case 2</a:t>
             </a:r>
             <a:endParaRPr lang="en-US" b="1" dirty="0"/>
           </a:p>
@@ -5893,73 +5614,82 @@
         </p:nvSpPr>
         <p:spPr>
           <a:xfrm>
-            <a:off x="457200" y="1371600"/>
-            <a:ext cx="8229600" cy="5334000"/>
+            <a:off x="457200" y="1447800"/>
+            <a:ext cx="8229600" cy="5181600"/>
           </a:xfrm>
         </p:spPr>
         <p:txBody>
           <a:bodyPr>
-            <a:normAutofit fontScale="62500" lnSpcReduction="20000"/>
+            <a:normAutofit fontScale="55000" lnSpcReduction="20000"/>
           </a:bodyPr>
           <a:lstStyle/>
           <a:p>
             <a:r>
               <a:rPr lang="en-US" dirty="0" smtClean="0"/>
-              <a:t>Name: Login</a:t>
-            </a:r>
-          </a:p>
-          <a:p>
-            <a:r>
-              <a:rPr lang="en-US" dirty="0" smtClean="0"/>
-              <a:t>Actor: User/Admin</a:t>
-            </a:r>
-          </a:p>
-          <a:p>
-            <a:r>
-              <a:rPr lang="en-US" dirty="0" smtClean="0"/>
-              <a:t>Entry Condition: </a:t>
+              <a:t>Name: Purchase A Car</a:t>
+            </a:r>
+          </a:p>
+          <a:p>
+            <a:r>
+              <a:rPr lang="en-US" dirty="0" smtClean="0"/>
+              <a:t>Actor: User</a:t>
+            </a:r>
+          </a:p>
+          <a:p>
+            <a:r>
+              <a:rPr lang="en-US" dirty="0" smtClean="0"/>
+              <a:t>Entry Condition:</a:t>
             </a:r>
           </a:p>
           <a:p>
             <a:pPr lvl="1"/>
             <a:r>
-              <a:rPr lang="en-US" dirty="0" smtClean="0"/>
-              <a:t>User/Admin must be at the login web page of Sunshine Online Car Dealer System.</a:t>
+              <a:rPr lang="en-US" dirty="0"/>
+              <a:t>User must be at a web page of Sunshine </a:t>
+            </a:r>
+            <a:r>
+              <a:rPr lang="en-US" dirty="0" smtClean="0"/>
+              <a:t>Online Car Dealer System </a:t>
+            </a:r>
+            <a:r>
+              <a:rPr lang="en-US" dirty="0"/>
+              <a:t>displaying a list of cars</a:t>
+            </a:r>
+            <a:r>
+              <a:rPr lang="en-US" dirty="0" smtClean="0"/>
+              <a:t>.</a:t>
             </a:r>
           </a:p>
           <a:p>
             <a:pPr lvl="1"/>
             <a:r>
-              <a:rPr lang="en-US" dirty="0" smtClean="0"/>
-              <a:t>User/Admin has a valid username and password.</a:t>
-            </a:r>
-          </a:p>
-          <a:p>
-            <a:r>
-              <a:rPr lang="en-US" dirty="0" smtClean="0"/>
-              <a:t>Event Flow: </a:t>
+              <a:rPr lang="en-US" dirty="0"/>
+              <a:t>User must be logged in</a:t>
+            </a:r>
+            <a:r>
+              <a:rPr lang="en-US" dirty="0" smtClean="0"/>
+              <a:t>.</a:t>
+            </a:r>
+          </a:p>
+          <a:p>
+            <a:r>
+              <a:rPr lang="en-US" dirty="0" smtClean="0"/>
+              <a:t>Event Flow:</a:t>
             </a:r>
           </a:p>
           <a:p>
             <a:pPr lvl="1"/>
             <a:r>
               <a:rPr lang="en-US" dirty="0" smtClean="0"/>
-              <a:t>User/Admin input username and password into the Login web page.</a:t>
-            </a:r>
-          </a:p>
-          <a:p>
-            <a:pPr lvl="1"/>
-            <a:r>
-              <a:rPr lang="en-US" dirty="0" smtClean="0"/>
-              <a:t>Sunshine Online Car Dealer System </a:t>
+              <a:t>User </a:t>
             </a:r>
             <a:r>
               <a:rPr lang="en-US" dirty="0"/>
-              <a:t>match username/password entered with list of stored </a:t>
-            </a:r>
-            <a:r>
-              <a:rPr lang="en-US" dirty="0" smtClean="0"/>
-              <a:t>users/admin.</a:t>
+              <a:t>selects car to be purchased</a:t>
+            </a:r>
+            <a:r>
+              <a:rPr lang="en-US" dirty="0" smtClean="0"/>
+              <a:t>.</a:t>
             </a:r>
           </a:p>
           <a:p>
@@ -5970,11 +5700,11 @@
             </a:r>
             <a:r>
               <a:rPr lang="en-US" dirty="0" smtClean="0"/>
-              <a:t>Online Car Dealer System logs User/Admin</a:t>
+              <a:t>Online Car Dealer System displays </a:t>
             </a:r>
             <a:r>
               <a:rPr lang="en-US" dirty="0"/>
-              <a:t> into the system</a:t>
+              <a:t>the car details including price</a:t>
             </a:r>
             <a:r>
               <a:rPr lang="en-US" dirty="0" smtClean="0"/>
@@ -5984,57 +5714,65 @@
           <a:p>
             <a:pPr lvl="1"/>
             <a:r>
-              <a:rPr lang="en-US" dirty="0" smtClean="0"/>
-              <a:t>User/Admin </a:t>
-            </a:r>
-            <a:r>
               <a:rPr lang="en-US" dirty="0"/>
-              <a:t> are </a:t>
-            </a:r>
-            <a:r>
-              <a:rPr lang="en-US" dirty="0" smtClean="0"/>
-              <a:t>redirected </a:t>
-            </a:r>
+              <a:t>User selects Purchase option</a:t>
+            </a:r>
+            <a:r>
+              <a:rPr lang="en-US" dirty="0" smtClean="0"/>
+              <a:t>.</a:t>
+            </a:r>
+          </a:p>
+          <a:p>
+            <a:pPr lvl="1"/>
             <a:r>
               <a:rPr lang="en-US" dirty="0"/>
-              <a:t>to home/index </a:t>
-            </a:r>
-            <a:r>
-              <a:rPr lang="en-US" dirty="0" smtClean="0"/>
-              <a:t>web </a:t>
-            </a:r>
+              <a:t>User </a:t>
+            </a:r>
+            <a:r>
+              <a:rPr lang="en-US" dirty="0" smtClean="0"/>
+              <a:t>enters the credit card information to purchase the selected car.</a:t>
+            </a:r>
+          </a:p>
+          <a:p>
+            <a:pPr lvl="1"/>
             <a:r>
               <a:rPr lang="en-US" dirty="0"/>
-              <a:t>page </a:t>
-            </a:r>
-            <a:r>
-              <a:rPr lang="en-US" dirty="0" smtClean="0"/>
-              <a:t>or into the requested page showing </a:t>
+              <a:t>Sunshine </a:t>
+            </a:r>
+            <a:r>
+              <a:rPr lang="en-US" dirty="0" smtClean="0"/>
+              <a:t>Online Car Dealer System shows </a:t>
             </a:r>
             <a:r>
               <a:rPr lang="en-US" dirty="0"/>
-              <a:t>a logged in status.</a:t>
-            </a:r>
-            <a:endParaRPr lang="en-US" dirty="0" smtClean="0"/>
-          </a:p>
-          <a:p>
-            <a:r>
-              <a:rPr lang="en-US" dirty="0" smtClean="0"/>
-              <a:t>Exit Condition: User/Admin</a:t>
+              <a:t>a confirmation web page with transaction details and delivery </a:t>
+            </a:r>
+            <a:r>
+              <a:rPr lang="en-US" dirty="0" smtClean="0"/>
+              <a:t>date.</a:t>
+            </a:r>
+            <a:endParaRPr lang="en-US" b="0" dirty="0" smtClean="0">
+              <a:effectLst/>
+            </a:endParaRPr>
+          </a:p>
+          <a:p>
+            <a:r>
+              <a:rPr lang="en-US" dirty="0" smtClean="0"/>
+              <a:t>Exit Condition: </a:t>
             </a:r>
             <a:r>
               <a:rPr lang="en-US" dirty="0"/>
-              <a:t> is logged into Sunshine </a:t>
-            </a:r>
-            <a:r>
-              <a:rPr lang="en-US" dirty="0" smtClean="0"/>
-              <a:t>Online Car Dealer System.</a:t>
-            </a:r>
-          </a:p>
-          <a:p>
-            <a:r>
-              <a:rPr lang="en-US" dirty="0" smtClean="0"/>
-              <a:t>Exceptions: </a:t>
+              <a:t>User purchased a car</a:t>
+            </a:r>
+            <a:r>
+              <a:rPr lang="en-US" dirty="0" smtClean="0"/>
+              <a:t>.</a:t>
+            </a:r>
+          </a:p>
+          <a:p>
+            <a:r>
+              <a:rPr lang="en-US" dirty="0" smtClean="0"/>
+              <a:t>Exceptions:</a:t>
             </a:r>
           </a:p>
           <a:p>
@@ -6048,20 +5786,18 @@
             <a:pPr lvl="1"/>
             <a:r>
               <a:rPr lang="en-US" dirty="0" smtClean="0"/>
-              <a:t>“Wrong Username/Password”</a:t>
+              <a:t>Invalid Credit Card Information</a:t>
             </a:r>
           </a:p>
           <a:p>
             <a:pPr lvl="1"/>
             <a:r>
               <a:rPr lang="en-US" dirty="0" smtClean="0"/>
-              <a:t>“No connectivity”</a:t>
-            </a:r>
-          </a:p>
-          <a:p>
-            <a:pPr marL="0" indent="0">
-              <a:buNone/>
-            </a:pPr>
+              <a:t>Sold to another faster customer</a:t>
+            </a:r>
+            <a:br>
+              <a:rPr lang="en-US" dirty="0" smtClean="0"/>
+            </a:br>
             <a:endParaRPr lang="en-US" dirty="0"/>
           </a:p>
         </p:txBody>
@@ -6069,7 +5805,7 @@
     </p:spTree>
     <p:extLst>
       <p:ext uri="{BB962C8B-B14F-4D97-AF65-F5344CB8AC3E}">
-        <p14:creationId xmlns="" xmlns:p14="http://schemas.microsoft.com/office/powerpoint/2010/main" val="2554732056"/>
+        <p14:creationId xmlns:p14="http://schemas.microsoft.com/office/powerpoint/2010/main" val="3930061998"/>
       </p:ext>
     </p:extLst>
   </p:cSld>
@@ -6123,7 +5859,7 @@
           <a:p>
             <a:r>
               <a:rPr lang="en-US" b="1" dirty="0" smtClean="0"/>
-              <a:t>Selected Use Case 2</a:t>
+              <a:t>Selected Use Case 3</a:t>
             </a:r>
             <a:endParaRPr lang="en-US" b="1" dirty="0"/>
           </a:p>
@@ -6139,214 +5875,109 @@
             <p:ph idx="1"/>
           </p:nvPr>
         </p:nvSpPr>
-        <p:spPr>
-          <a:xfrm>
-            <a:off x="457200" y="1447800"/>
-            <a:ext cx="8229600" cy="5181600"/>
-          </a:xfrm>
-        </p:spPr>
+        <p:spPr/>
         <p:txBody>
           <a:bodyPr>
-            <a:normAutofit fontScale="55000" lnSpcReduction="20000"/>
+            <a:normAutofit fontScale="70000" lnSpcReduction="20000"/>
           </a:bodyPr>
           <a:lstStyle/>
           <a:p>
-            <a:r>
-              <a:rPr lang="en-US" dirty="0" smtClean="0"/>
-              <a:t>Name: Purchase A Car</a:t>
-            </a:r>
-          </a:p>
-          <a:p>
-            <a:r>
-              <a:rPr lang="en-US" dirty="0" smtClean="0"/>
-              <a:t>Actor: User</a:t>
-            </a:r>
-          </a:p>
-          <a:p>
-            <a:r>
-              <a:rPr lang="en-US" dirty="0" smtClean="0"/>
-              <a:t>Entry Condition:</a:t>
+            <a:pPr lvl="0"/>
+            <a:r>
+              <a:rPr lang="en-US" dirty="0"/>
+              <a:t>Name: Add Admin</a:t>
+            </a:r>
+          </a:p>
+          <a:p>
+            <a:pPr lvl="0"/>
+            <a:r>
+              <a:rPr lang="en-US" dirty="0"/>
+              <a:t>Actor: Admin</a:t>
+            </a:r>
+          </a:p>
+          <a:p>
+            <a:pPr lvl="0"/>
+            <a:r>
+              <a:rPr lang="en-US" dirty="0"/>
+              <a:t>Entry Condition: </a:t>
             </a:r>
           </a:p>
           <a:p>
             <a:pPr lvl="1"/>
             <a:r>
               <a:rPr lang="en-US" dirty="0"/>
-              <a:t>User must be at a web page of Sunshine </a:t>
-            </a:r>
-            <a:r>
-              <a:rPr lang="en-US" dirty="0" smtClean="0"/>
-              <a:t>Online Car Dealer System </a:t>
-            </a:r>
+              <a:t>Logged in as admin </a:t>
+            </a:r>
+          </a:p>
+          <a:p>
+            <a:pPr lvl="1"/>
             <a:r>
               <a:rPr lang="en-US" dirty="0"/>
-              <a:t>displaying a list of cars</a:t>
-            </a:r>
-            <a:r>
-              <a:rPr lang="en-US" dirty="0" smtClean="0"/>
-              <a:t>.</a:t>
+              <a:t>On the page with the “Add Admin” function</a:t>
+            </a:r>
+          </a:p>
+          <a:p>
+            <a:pPr lvl="0"/>
+            <a:r>
+              <a:rPr lang="en-US" dirty="0"/>
+              <a:t>Event Flow: </a:t>
             </a:r>
           </a:p>
           <a:p>
             <a:pPr lvl="1"/>
             <a:r>
               <a:rPr lang="en-US" dirty="0"/>
-              <a:t>User must be logged in</a:t>
-            </a:r>
-            <a:r>
-              <a:rPr lang="en-US" dirty="0" smtClean="0"/>
-              <a:t>.</a:t>
-            </a:r>
-          </a:p>
-          <a:p>
-            <a:r>
-              <a:rPr lang="en-US" dirty="0" smtClean="0"/>
-              <a:t>Event Flow:</a:t>
+              <a:t>Admin choose to do the “Add Admin” </a:t>
             </a:r>
           </a:p>
           <a:p>
             <a:pPr lvl="1"/>
             <a:r>
-              <a:rPr lang="en-US" dirty="0" smtClean="0"/>
-              <a:t>User </a:t>
-            </a:r>
-            <a:r>
               <a:rPr lang="en-US" dirty="0"/>
-              <a:t>selects car to be purchased</a:t>
-            </a:r>
-            <a:r>
-              <a:rPr lang="en-US" dirty="0" smtClean="0"/>
-              <a:t>.</a:t>
+              <a:t>Enter the information of the new admin that needs to be added</a:t>
             </a:r>
           </a:p>
           <a:p>
             <a:pPr lvl="1"/>
             <a:r>
               <a:rPr lang="en-US" dirty="0"/>
-              <a:t>Sunshine </a:t>
-            </a:r>
-            <a:r>
-              <a:rPr lang="en-US" dirty="0" smtClean="0"/>
-              <a:t>Online Car Dealer System displays </a:t>
-            </a:r>
+              <a:t>Submit it to create the new admin</a:t>
+            </a:r>
+          </a:p>
+          <a:p>
+            <a:pPr lvl="0"/>
             <a:r>
               <a:rPr lang="en-US" dirty="0"/>
-              <a:t>the car details including price</a:t>
-            </a:r>
-            <a:r>
-              <a:rPr lang="en-US" dirty="0" smtClean="0"/>
-              <a:t>.</a:t>
+              <a:t>Exit Condition: A new admin user is created in the system.</a:t>
+            </a:r>
+          </a:p>
+          <a:p>
+            <a:pPr lvl="0"/>
+            <a:r>
+              <a:rPr lang="en-US" dirty="0"/>
+              <a:t>Exceptions: </a:t>
             </a:r>
           </a:p>
           <a:p>
             <a:pPr lvl="1"/>
             <a:r>
               <a:rPr lang="en-US" dirty="0"/>
-              <a:t>User selects Purchase option</a:t>
-            </a:r>
-            <a:r>
-              <a:rPr lang="en-US" dirty="0" smtClean="0"/>
-              <a:t>.</a:t>
-            </a:r>
-          </a:p>
-          <a:p>
-            <a:pPr lvl="1"/>
+              <a:t>Cancel</a:t>
+            </a:r>
+          </a:p>
+          <a:p>
             <a:r>
               <a:rPr lang="en-US" dirty="0"/>
-              <a:t>User </a:t>
-            </a:r>
-            <a:r>
-              <a:rPr lang="en-US" dirty="0" smtClean="0"/>
-              <a:t>enters the credit car information to purchase the selected car.</a:t>
-            </a:r>
-          </a:p>
-          <a:p>
-            <a:pPr lvl="1"/>
-            <a:r>
-              <a:rPr lang="en-US" dirty="0"/>
-              <a:t>Sunshine </a:t>
-            </a:r>
-            <a:r>
-              <a:rPr lang="en-US" dirty="0" smtClean="0"/>
-              <a:t>Online Car Dealer System shows </a:t>
-            </a:r>
-            <a:r>
-              <a:rPr lang="en-US" dirty="0"/>
-              <a:t>a confirmation web page with transaction details and delivery </a:t>
-            </a:r>
-            <a:r>
-              <a:rPr lang="en-US" dirty="0" smtClean="0"/>
-              <a:t>date.</a:t>
-            </a:r>
-            <a:endParaRPr lang="en-US" b="0" dirty="0" smtClean="0">
-              <a:effectLst/>
-            </a:endParaRPr>
-          </a:p>
-          <a:p>
-            <a:r>
-              <a:rPr lang="en-US" dirty="0" smtClean="0"/>
-              <a:t>Exit Condition: </a:t>
-            </a:r>
-            <a:r>
-              <a:rPr lang="en-US" dirty="0"/>
-              <a:t>User purchased a car</a:t>
-            </a:r>
-            <a:r>
-              <a:rPr lang="en-US" dirty="0" smtClean="0"/>
-              <a:t>.</a:t>
-            </a:r>
-          </a:p>
-          <a:p>
-            <a:r>
-              <a:rPr lang="en-US" dirty="0" smtClean="0"/>
-              <a:t>Exceptions:</a:t>
-            </a:r>
-          </a:p>
-          <a:p>
-            <a:pPr lvl="1"/>
-            <a:r>
-              <a:rPr lang="en-US" dirty="0" smtClean="0"/>
-              <a:t>Cancel</a:t>
-            </a:r>
-          </a:p>
-          <a:p>
-            <a:pPr lvl="1"/>
-            <a:r>
-              <a:rPr lang="en-US" dirty="0" smtClean="0"/>
-              <a:t>Invalid Credit Card Information</a:t>
-            </a:r>
-          </a:p>
-          <a:p>
-            <a:pPr lvl="1"/>
-            <a:r>
-              <a:rPr lang="en-US" dirty="0" smtClean="0"/>
-              <a:t>Sold to another faster customer</a:t>
-            </a:r>
-          </a:p>
-          <a:p>
-            <a:r>
-              <a:rPr lang="en-US" dirty="0" smtClean="0"/>
-              <a:t>Special </a:t>
-            </a:r>
-            <a:r>
-              <a:rPr lang="en-US" dirty="0"/>
-              <a:t>Requirements : </a:t>
-            </a:r>
-            <a:r>
-              <a:rPr lang="en-US" dirty="0" smtClean="0"/>
-              <a:t>User must be Logged in</a:t>
-            </a:r>
-            <a:br>
-              <a:rPr lang="en-US" dirty="0" smtClean="0"/>
-            </a:br>
-            <a:endParaRPr lang="en-US" dirty="0"/>
+              <a:t>“Username already exists”</a:t>
+            </a:r>
+            <a:endParaRPr lang="en-US" dirty="0" smtClean="0"/>
           </a:p>
         </p:txBody>
       </p:sp>
     </p:spTree>
     <p:extLst>
       <p:ext uri="{BB962C8B-B14F-4D97-AF65-F5344CB8AC3E}">
-        <p14:creationId xmlns="" xmlns:p14="http://schemas.microsoft.com/office/powerpoint/2010/main" val="3930061998"/>
+        <p14:creationId xmlns:p14="http://schemas.microsoft.com/office/powerpoint/2010/main" val="3369059010"/>
       </p:ext>
     </p:extLst>
   </p:cSld>
@@ -6400,7 +6031,7 @@
           <a:p>
             <a:r>
               <a:rPr lang="en-US" b="1" dirty="0" smtClean="0"/>
-              <a:t>Selected Use Case 3</a:t>
+              <a:t>Selected Use Case 4</a:t>
             </a:r>
             <a:endParaRPr lang="en-US" b="1" dirty="0"/>
           </a:p>
@@ -6425,7 +6056,7 @@
           <a:p>
             <a:r>
               <a:rPr lang="en-US" dirty="0" smtClean="0"/>
-              <a:t>Name: Add Admin</a:t>
+              <a:t>Name: Edit Cars</a:t>
             </a:r>
           </a:p>
           <a:p>
@@ -6446,13 +6077,12 @@
               <a:rPr lang="en-US" dirty="0" smtClean="0"/>
               <a:t>Logged in as admin </a:t>
             </a:r>
-            <a:endParaRPr lang="en-US" dirty="0"/>
           </a:p>
           <a:p>
             <a:pPr lvl="1"/>
             <a:r>
               <a:rPr lang="en-US" dirty="0" smtClean="0"/>
-              <a:t>On the page with the “Add Admin” function</a:t>
+              <a:t>On the page with the “Edit Cars” function</a:t>
             </a:r>
           </a:p>
           <a:p>
@@ -6465,27 +6095,27 @@
             <a:pPr lvl="1"/>
             <a:r>
               <a:rPr lang="en-US" dirty="0" smtClean="0"/>
-              <a:t>Admin click the “Add Admin” button</a:t>
+              <a:t>Admin choose to do “Edit Cars” </a:t>
             </a:r>
           </a:p>
           <a:p>
             <a:pPr lvl="1"/>
             <a:r>
               <a:rPr lang="en-US" dirty="0" smtClean="0"/>
-              <a:t>Enter the information of the new admin that needs to be added</a:t>
+              <a:t>Edit the information of the cars in the inventory</a:t>
             </a:r>
           </a:p>
           <a:p>
             <a:pPr lvl="1"/>
             <a:r>
               <a:rPr lang="en-US" dirty="0" smtClean="0"/>
-              <a:t>Click “Save” button to create the new admin</a:t>
-            </a:r>
-          </a:p>
-          <a:p>
-            <a:r>
-              <a:rPr lang="en-US" dirty="0" smtClean="0"/>
-              <a:t>Exit Condition: A new Admin User is created in the system.</a:t>
+              <a:t>Submit to update the car’s information</a:t>
+            </a:r>
+          </a:p>
+          <a:p>
+            <a:r>
+              <a:rPr lang="en-US" dirty="0" smtClean="0"/>
+              <a:t>Exit Condition: Admin updated a car information.</a:t>
             </a:r>
           </a:p>
           <a:p>
@@ -6505,13 +6135,11 @@
             <a:pPr lvl="1"/>
             <a:r>
               <a:rPr lang="en-US" dirty="0" smtClean="0"/>
-              <a:t>“Username already exists”</a:t>
-            </a:r>
-          </a:p>
-          <a:p>
-            <a:r>
-              <a:rPr lang="en-US" dirty="0"/>
-              <a:t>Special Requirements : User must be Logged in</a:t>
+              <a:t>Repeated </a:t>
+            </a:r>
+            <a:r>
+              <a:rPr lang="en-US" smtClean="0"/>
+              <a:t>Unique values</a:t>
             </a:r>
             <a:endParaRPr lang="en-US" dirty="0" smtClean="0"/>
           </a:p>
@@ -6520,7 +6148,7 @@
     </p:spTree>
     <p:extLst>
       <p:ext uri="{BB962C8B-B14F-4D97-AF65-F5344CB8AC3E}">
-        <p14:creationId xmlns="" xmlns:p14="http://schemas.microsoft.com/office/powerpoint/2010/main" val="3369059010"/>
+        <p14:creationId xmlns:p14="http://schemas.microsoft.com/office/powerpoint/2010/main" val="1731634201"/>
       </p:ext>
     </p:extLst>
   </p:cSld>

</xml_diff>